<commit_message>
ISIS-2062: docs on command and interaction
</commit_message>
<xml_diff>
--- a/api/applib/src/main/adoc/modules/applib-svc/images/reference-services/commands-and-events.pptx
+++ b/api/applib/src/main/adoc/modules/applib-svc/images/reference-services/commands-and-events.pptx
@@ -243,7 +243,7 @@
           <a:p>
             <a:fld id="{F855B3F0-BB84-4743-96EB-565470B6C0EB}" type="datetimeFigureOut">
               <a:rPr lang="en-GB" smtClean="0"/>
-              <a:t>06/06/2016</a:t>
+              <a:t>21/02/2020</a:t>
             </a:fld>
             <a:endParaRPr lang="en-GB"/>
           </a:p>
@@ -413,7 +413,7 @@
           <a:p>
             <a:fld id="{F855B3F0-BB84-4743-96EB-565470B6C0EB}" type="datetimeFigureOut">
               <a:rPr lang="en-GB" smtClean="0"/>
-              <a:t>06/06/2016</a:t>
+              <a:t>21/02/2020</a:t>
             </a:fld>
             <a:endParaRPr lang="en-GB"/>
           </a:p>
@@ -593,7 +593,7 @@
           <a:p>
             <a:fld id="{F855B3F0-BB84-4743-96EB-565470B6C0EB}" type="datetimeFigureOut">
               <a:rPr lang="en-GB" smtClean="0"/>
-              <a:t>06/06/2016</a:t>
+              <a:t>21/02/2020</a:t>
             </a:fld>
             <a:endParaRPr lang="en-GB"/>
           </a:p>
@@ -763,7 +763,7 @@
           <a:p>
             <a:fld id="{F855B3F0-BB84-4743-96EB-565470B6C0EB}" type="datetimeFigureOut">
               <a:rPr lang="en-GB" smtClean="0"/>
-              <a:t>06/06/2016</a:t>
+              <a:t>21/02/2020</a:t>
             </a:fld>
             <a:endParaRPr lang="en-GB"/>
           </a:p>
@@ -1009,7 +1009,7 @@
           <a:p>
             <a:fld id="{F855B3F0-BB84-4743-96EB-565470B6C0EB}" type="datetimeFigureOut">
               <a:rPr lang="en-GB" smtClean="0"/>
-              <a:t>06/06/2016</a:t>
+              <a:t>21/02/2020</a:t>
             </a:fld>
             <a:endParaRPr lang="en-GB"/>
           </a:p>
@@ -1241,7 +1241,7 @@
           <a:p>
             <a:fld id="{F855B3F0-BB84-4743-96EB-565470B6C0EB}" type="datetimeFigureOut">
               <a:rPr lang="en-GB" smtClean="0"/>
-              <a:t>06/06/2016</a:t>
+              <a:t>21/02/2020</a:t>
             </a:fld>
             <a:endParaRPr lang="en-GB"/>
           </a:p>
@@ -1608,7 +1608,7 @@
           <a:p>
             <a:fld id="{F855B3F0-BB84-4743-96EB-565470B6C0EB}" type="datetimeFigureOut">
               <a:rPr lang="en-GB" smtClean="0"/>
-              <a:t>06/06/2016</a:t>
+              <a:t>21/02/2020</a:t>
             </a:fld>
             <a:endParaRPr lang="en-GB"/>
           </a:p>
@@ -1726,7 +1726,7 @@
           <a:p>
             <a:fld id="{F855B3F0-BB84-4743-96EB-565470B6C0EB}" type="datetimeFigureOut">
               <a:rPr lang="en-GB" smtClean="0"/>
-              <a:t>06/06/2016</a:t>
+              <a:t>21/02/2020</a:t>
             </a:fld>
             <a:endParaRPr lang="en-GB"/>
           </a:p>
@@ -1821,7 +1821,7 @@
           <a:p>
             <a:fld id="{F855B3F0-BB84-4743-96EB-565470B6C0EB}" type="datetimeFigureOut">
               <a:rPr lang="en-GB" smtClean="0"/>
-              <a:t>06/06/2016</a:t>
+              <a:t>21/02/2020</a:t>
             </a:fld>
             <a:endParaRPr lang="en-GB"/>
           </a:p>
@@ -2098,7 +2098,7 @@
           <a:p>
             <a:fld id="{F855B3F0-BB84-4743-96EB-565470B6C0EB}" type="datetimeFigureOut">
               <a:rPr lang="en-GB" smtClean="0"/>
-              <a:t>06/06/2016</a:t>
+              <a:t>21/02/2020</a:t>
             </a:fld>
             <a:endParaRPr lang="en-GB"/>
           </a:p>
@@ -2355,7 +2355,7 @@
           <a:p>
             <a:fld id="{F855B3F0-BB84-4743-96EB-565470B6C0EB}" type="datetimeFigureOut">
               <a:rPr lang="en-GB" smtClean="0"/>
-              <a:t>06/06/2016</a:t>
+              <a:t>21/02/2020</a:t>
             </a:fld>
             <a:endParaRPr lang="en-GB"/>
           </a:p>
@@ -2568,7 +2568,7 @@
           <a:p>
             <a:fld id="{F855B3F0-BB84-4743-96EB-565470B6C0EB}" type="datetimeFigureOut">
               <a:rPr lang="en-GB" smtClean="0"/>
-              <a:t>06/06/2016</a:t>
+              <a:t>21/02/2020</a:t>
             </a:fld>
             <a:endParaRPr lang="en-GB"/>
           </a:p>
@@ -2981,7 +2981,7 @@
         </p:nvSpPr>
         <p:spPr>
           <a:xfrm>
-            <a:off x="8296353" y="3029112"/>
+            <a:off x="8296353" y="3188643"/>
             <a:ext cx="1649759" cy="550678"/>
           </a:xfrm>
           <a:prstGeom prst="rect">
@@ -3023,7 +3023,7 @@
         </p:nvSpPr>
         <p:spPr>
           <a:xfrm>
-            <a:off x="2002634" y="5250141"/>
+            <a:off x="2002634" y="5145084"/>
             <a:ext cx="3944691" cy="1048662"/>
           </a:xfrm>
           <a:prstGeom prst="rect">
@@ -3067,14 +3067,203 @@
       </p:sp>
       <p:sp>
         <p:nvSpPr>
-          <p:cNvPr id="83" name="Rectangle 82"/>
+          <p:cNvPr id="84" name="Rectangle 83"/>
           <p:cNvSpPr/>
           <p:nvPr/>
         </p:nvSpPr>
         <p:spPr>
           <a:xfrm>
-            <a:off x="4614477" y="5495868"/>
-            <a:ext cx="1116419" cy="489972"/>
+            <a:off x="2233446" y="1963584"/>
+            <a:ext cx="3569661" cy="2678962"/>
+          </a:xfrm>
+          <a:prstGeom prst="rect">
+            <a:avLst/>
+          </a:prstGeom>
+        </p:spPr>
+        <p:style>
+          <a:lnRef idx="1">
+            <a:schemeClr val="accent1"/>
+          </a:lnRef>
+          <a:fillRef idx="2">
+            <a:schemeClr val="accent1"/>
+          </a:fillRef>
+          <a:effectRef idx="1">
+            <a:schemeClr val="accent1"/>
+          </a:effectRef>
+          <a:fontRef idx="minor">
+            <a:schemeClr val="dk1"/>
+          </a:fontRef>
+        </p:style>
+        <p:txBody>
+          <a:bodyPr rtlCol="0" anchor="t" anchorCtr="0"/>
+          <a:lstStyle/>
+          <a:p>
+            <a:r>
+              <a:rPr lang="en-GB" sz="1600" dirty="0">
+                <a:solidFill>
+                  <a:schemeClr val="tx2"/>
+                </a:solidFill>
+              </a:rPr>
+              <a:t>Interaction</a:t>
+            </a:r>
+          </a:p>
+        </p:txBody>
+      </p:sp>
+      <p:sp>
+        <p:nvSpPr>
+          <p:cNvPr id="85" name="Rectangle 84"/>
+          <p:cNvSpPr/>
+          <p:nvPr/>
+        </p:nvSpPr>
+        <p:spPr>
+          <a:xfrm>
+            <a:off x="335440" y="1963584"/>
+            <a:ext cx="1408904" cy="2678962"/>
+          </a:xfrm>
+          <a:prstGeom prst="rect">
+            <a:avLst/>
+          </a:prstGeom>
+        </p:spPr>
+        <p:style>
+          <a:lnRef idx="1">
+            <a:schemeClr val="dk1"/>
+          </a:lnRef>
+          <a:fillRef idx="2">
+            <a:schemeClr val="dk1"/>
+          </a:fillRef>
+          <a:effectRef idx="1">
+            <a:schemeClr val="dk1"/>
+          </a:effectRef>
+          <a:fontRef idx="minor">
+            <a:schemeClr val="dk1"/>
+          </a:fontRef>
+        </p:style>
+        <p:txBody>
+          <a:bodyPr rtlCol="0" anchor="ctr"/>
+          <a:lstStyle/>
+          <a:p>
+            <a:pPr algn="ctr"/>
+            <a:r>
+              <a:rPr lang="en-GB" sz="1600" dirty="0">
+                <a:solidFill>
+                  <a:schemeClr val="bg1"/>
+                </a:solidFill>
+              </a:rPr>
+              <a:t>Command</a:t>
+            </a:r>
+          </a:p>
+          <a:p>
+            <a:pPr algn="ctr"/>
+            <a:endParaRPr lang="en-GB" sz="1600" dirty="0">
+              <a:solidFill>
+                <a:schemeClr val="bg1"/>
+              </a:solidFill>
+            </a:endParaRPr>
+          </a:p>
+          <a:p>
+            <a:pPr algn="ctr"/>
+            <a:r>
+              <a:rPr lang="en-GB" sz="1200" dirty="0">
+                <a:solidFill>
+                  <a:schemeClr val="bg1"/>
+                </a:solidFill>
+              </a:rPr>
+              <a:t>(intention to execute)</a:t>
+            </a:r>
+            <a:endParaRPr lang="en-GB" sz="1100" dirty="0">
+              <a:solidFill>
+                <a:schemeClr val="bg1"/>
+              </a:solidFill>
+            </a:endParaRPr>
+          </a:p>
+        </p:txBody>
+      </p:sp>
+      <p:sp>
+        <p:nvSpPr>
+          <p:cNvPr id="86" name="Rectangle 85"/>
+          <p:cNvSpPr/>
+          <p:nvPr/>
+        </p:nvSpPr>
+        <p:spPr>
+          <a:xfrm>
+            <a:off x="2900657" y="2411922"/>
+            <a:ext cx="1116419" cy="2029047"/>
+          </a:xfrm>
+          <a:prstGeom prst="rect">
+            <a:avLst/>
+          </a:prstGeom>
+        </p:spPr>
+        <p:style>
+          <a:lnRef idx="2">
+            <a:schemeClr val="accent1">
+              <a:shade val="50000"/>
+            </a:schemeClr>
+          </a:lnRef>
+          <a:fillRef idx="1">
+            <a:schemeClr val="accent1"/>
+          </a:fillRef>
+          <a:effectRef idx="0">
+            <a:schemeClr val="accent1"/>
+          </a:effectRef>
+          <a:fontRef idx="minor">
+            <a:schemeClr val="lt1"/>
+          </a:fontRef>
+        </p:style>
+        <p:txBody>
+          <a:bodyPr rtlCol="0" anchor="ctr"/>
+          <a:lstStyle/>
+          <a:p>
+            <a:pPr algn="ctr"/>
+            <a:r>
+              <a:rPr lang="en-GB" sz="1600" dirty="0"/>
+              <a:t>Member</a:t>
+            </a:r>
+            <a:br>
+              <a:rPr lang="en-GB" sz="1600" dirty="0"/>
+            </a:br>
+            <a:r>
+              <a:rPr lang="en-GB" sz="1600" dirty="0"/>
+              <a:t>Execution</a:t>
+            </a:r>
+            <a:br>
+              <a:rPr lang="en-GB" sz="1600" dirty="0"/>
+            </a:br>
+            <a:endParaRPr lang="en-GB" sz="1600" dirty="0"/>
+          </a:p>
+          <a:p>
+            <a:pPr algn="ctr"/>
+            <a:r>
+              <a:rPr lang="en-GB" sz="1200" dirty="0"/>
+              <a:t>action invocation</a:t>
+            </a:r>
+            <a:br>
+              <a:rPr lang="en-GB" sz="1200" dirty="0"/>
+            </a:br>
+            <a:r>
+              <a:rPr lang="en-GB" sz="1200" dirty="0"/>
+              <a:t>or</a:t>
+            </a:r>
+            <a:br>
+              <a:rPr lang="en-GB" sz="1200" dirty="0"/>
+            </a:br>
+            <a:r>
+              <a:rPr lang="en-GB" sz="1200" dirty="0"/>
+              <a:t>property edit</a:t>
+            </a:r>
+            <a:endParaRPr lang="en-GB" sz="1400" dirty="0"/>
+          </a:p>
+        </p:txBody>
+      </p:sp>
+      <p:sp>
+        <p:nvSpPr>
+          <p:cNvPr id="89" name="Rectangle 88"/>
+          <p:cNvSpPr/>
+          <p:nvPr/>
+        </p:nvSpPr>
+        <p:spPr>
+          <a:xfrm>
+            <a:off x="2900655" y="5280943"/>
+            <a:ext cx="1116419" cy="522347"/>
           </a:xfrm>
           <a:prstGeom prst="rect">
             <a:avLst/>
@@ -3101,137 +3290,35 @@
           <a:lstStyle/>
           <a:p>
             <a:pPr algn="ctr"/>
-            <a:endParaRPr lang="en-GB" sz="1600" dirty="0"/>
-          </a:p>
-        </p:txBody>
-      </p:sp>
-      <p:sp>
-        <p:nvSpPr>
-          <p:cNvPr id="84" name="Rectangle 83"/>
+            <a:r>
+              <a:rPr lang="en-GB" sz="1400" dirty="0"/>
+              <a:t>Domain</a:t>
+            </a:r>
+          </a:p>
+          <a:p>
+            <a:pPr algn="ctr"/>
+            <a:r>
+              <a:rPr lang="en-GB" sz="1400" dirty="0"/>
+              <a:t>Event</a:t>
+            </a:r>
+          </a:p>
+        </p:txBody>
+      </p:sp>
+      <p:sp>
+        <p:nvSpPr>
+          <p:cNvPr id="91" name="Rectangle 90"/>
           <p:cNvSpPr/>
           <p:nvPr/>
         </p:nvSpPr>
         <p:spPr>
           <a:xfrm>
-            <a:off x="2233446" y="2068641"/>
-            <a:ext cx="3569661" cy="2678962"/>
+            <a:off x="2013706" y="315219"/>
+            <a:ext cx="3933616" cy="1005107"/>
           </a:xfrm>
           <a:prstGeom prst="rect">
             <a:avLst/>
           </a:prstGeom>
-        </p:spPr>
-        <p:style>
-          <a:lnRef idx="1">
-            <a:schemeClr val="accent1"/>
-          </a:lnRef>
-          <a:fillRef idx="2">
-            <a:schemeClr val="accent1"/>
-          </a:fillRef>
-          <a:effectRef idx="1">
-            <a:schemeClr val="accent1"/>
-          </a:effectRef>
-          <a:fontRef idx="minor">
-            <a:schemeClr val="dk1"/>
-          </a:fontRef>
-        </p:style>
-        <p:txBody>
-          <a:bodyPr rtlCol="0" anchor="t" anchorCtr="0"/>
-          <a:lstStyle/>
-          <a:p>
-            <a:r>
-              <a:rPr lang="en-GB" sz="1600" dirty="0">
-                <a:solidFill>
-                  <a:schemeClr val="tx2"/>
-                </a:solidFill>
-              </a:rPr>
-              <a:t>Interaction</a:t>
-            </a:r>
-          </a:p>
-        </p:txBody>
-      </p:sp>
-      <p:sp>
-        <p:nvSpPr>
-          <p:cNvPr id="85" name="Rectangle 84"/>
-          <p:cNvSpPr/>
-          <p:nvPr/>
-        </p:nvSpPr>
-        <p:spPr>
-          <a:xfrm>
-            <a:off x="335440" y="2068641"/>
-            <a:ext cx="1408904" cy="2678962"/>
-          </a:xfrm>
-          <a:prstGeom prst="rect">
-            <a:avLst/>
-          </a:prstGeom>
-        </p:spPr>
-        <p:style>
-          <a:lnRef idx="1">
-            <a:schemeClr val="dk1"/>
-          </a:lnRef>
-          <a:fillRef idx="2">
-            <a:schemeClr val="dk1"/>
-          </a:fillRef>
-          <a:effectRef idx="1">
-            <a:schemeClr val="dk1"/>
-          </a:effectRef>
-          <a:fontRef idx="minor">
-            <a:schemeClr val="dk1"/>
-          </a:fontRef>
-        </p:style>
-        <p:txBody>
-          <a:bodyPr rtlCol="0" anchor="ctr"/>
-          <a:lstStyle/>
-          <a:p>
-            <a:pPr algn="ctr"/>
-            <a:r>
-              <a:rPr lang="en-GB" sz="1600" dirty="0">
-                <a:solidFill>
-                  <a:schemeClr val="bg1"/>
-                </a:solidFill>
-              </a:rPr>
-              <a:t>Command</a:t>
-            </a:r>
-          </a:p>
-          <a:p>
-            <a:pPr algn="ctr"/>
-            <a:endParaRPr lang="en-GB" sz="1600" dirty="0">
-              <a:solidFill>
-                <a:schemeClr val="bg1"/>
-              </a:solidFill>
-            </a:endParaRPr>
-          </a:p>
-          <a:p>
-            <a:pPr algn="ctr"/>
-            <a:r>
-              <a:rPr lang="en-GB" sz="1200" dirty="0">
-                <a:solidFill>
-                  <a:schemeClr val="bg1"/>
-                </a:solidFill>
-              </a:rPr>
-              <a:t>(intention to execute)</a:t>
-            </a:r>
-            <a:endParaRPr lang="en-GB" sz="1100" dirty="0">
-              <a:solidFill>
-                <a:schemeClr val="bg1"/>
-              </a:solidFill>
-            </a:endParaRPr>
-          </a:p>
-        </p:txBody>
-      </p:sp>
-      <p:sp>
-        <p:nvSpPr>
-          <p:cNvPr id="86" name="Rectangle 85"/>
-          <p:cNvSpPr/>
-          <p:nvPr/>
-        </p:nvSpPr>
-        <p:spPr>
-          <a:xfrm>
-            <a:off x="2453187" y="2516979"/>
-            <a:ext cx="1116419" cy="2029047"/>
-          </a:xfrm>
-          <a:prstGeom prst="rect">
-            <a:avLst/>
-          </a:prstGeom>
+          <a:noFill/>
         </p:spPr>
         <p:style>
           <a:lnRef idx="2">
@@ -3250,64 +3337,199 @@
           </a:fontRef>
         </p:style>
         <p:txBody>
-          <a:bodyPr rtlCol="0" anchor="ctr"/>
+          <a:bodyPr rtlCol="0" anchor="t" anchorCtr="0"/>
           <a:lstStyle/>
           <a:p>
             <a:pPr algn="ctr"/>
             <a:r>
-              <a:rPr lang="en-GB" sz="1600" dirty="0"/>
-              <a:t>Member</a:t>
-            </a:r>
-            <a:br>
-              <a:rPr lang="en-GB" sz="1600" dirty="0"/>
-            </a:br>
-            <a:r>
-              <a:rPr lang="en-GB" sz="1600" dirty="0"/>
-              <a:t>Execution</a:t>
-            </a:r>
-            <a:br>
-              <a:rPr lang="en-GB" sz="1600" dirty="0"/>
-            </a:br>
-            <a:endParaRPr lang="en-GB" sz="1600" dirty="0"/>
-          </a:p>
-          <a:p>
-            <a:pPr algn="ctr"/>
-            <a:r>
-              <a:rPr lang="en-GB" sz="1200" dirty="0"/>
-              <a:t>action invocation</a:t>
-            </a:r>
-            <a:br>
-              <a:rPr lang="en-GB" sz="1200" dirty="0"/>
-            </a:br>
-            <a:r>
-              <a:rPr lang="en-GB" sz="1200" dirty="0"/>
-              <a:t>or</a:t>
-            </a:r>
-            <a:br>
-              <a:rPr lang="en-GB" sz="1200" dirty="0"/>
-            </a:br>
-            <a:r>
-              <a:rPr lang="en-GB" sz="1200" dirty="0"/>
-              <a:t>property edit</a:t>
-            </a:r>
-            <a:endParaRPr lang="en-GB" sz="1400" dirty="0"/>
-          </a:p>
-        </p:txBody>
-      </p:sp>
-      <p:sp>
-        <p:nvSpPr>
-          <p:cNvPr id="87" name="Rectangle 86"/>
+              <a:rPr lang="en-GB" sz="1600" i="1" dirty="0" err="1">
+                <a:solidFill>
+                  <a:schemeClr val="accent6"/>
+                </a:solidFill>
+              </a:rPr>
+              <a:t>ChangedObjectService</a:t>
+            </a:r>
+            <a:endParaRPr lang="en-GB" sz="1600" i="1" dirty="0">
+              <a:solidFill>
+                <a:schemeClr val="accent6"/>
+              </a:solidFill>
+            </a:endParaRPr>
+          </a:p>
+        </p:txBody>
+      </p:sp>
+      <p:cxnSp>
+        <p:nvCxnSpPr>
+          <p:cNvPr id="92" name="Straight Arrow Connector 91"/>
+          <p:cNvCxnSpPr/>
+          <p:nvPr/>
+        </p:nvCxnSpPr>
+        <p:spPr>
+          <a:xfrm flipH="1">
+            <a:off x="3047154" y="4413680"/>
+            <a:ext cx="2" cy="839974"/>
+          </a:xfrm>
+          <a:prstGeom prst="straightConnector1">
+            <a:avLst/>
+          </a:prstGeom>
+          <a:ln w="19050">
+            <a:solidFill>
+              <a:schemeClr val="bg1">
+                <a:lumMod val="50000"/>
+              </a:schemeClr>
+            </a:solidFill>
+            <a:prstDash val="sysDash"/>
+            <a:tailEnd type="triangle"/>
+          </a:ln>
+        </p:spPr>
+        <p:style>
+          <a:lnRef idx="1">
+            <a:schemeClr val="accent1"/>
+          </a:lnRef>
+          <a:fillRef idx="0">
+            <a:schemeClr val="accent1"/>
+          </a:fillRef>
+          <a:effectRef idx="0">
+            <a:schemeClr val="accent1"/>
+          </a:effectRef>
+          <a:fontRef idx="minor">
+            <a:schemeClr val="tx1"/>
+          </a:fontRef>
+        </p:style>
+      </p:cxnSp>
+      <p:sp>
+        <p:nvSpPr>
+          <p:cNvPr id="94" name="Rectangle 93"/>
           <p:cNvSpPr/>
           <p:nvPr/>
         </p:nvSpPr>
         <p:spPr>
           <a:xfrm>
-            <a:off x="4515242" y="2786334"/>
-            <a:ext cx="1116419" cy="655674"/>
+            <a:off x="2453183" y="684352"/>
+            <a:ext cx="3178477" cy="467623"/>
           </a:xfrm>
           <a:prstGeom prst="rect">
             <a:avLst/>
           </a:prstGeom>
+        </p:spPr>
+        <p:style>
+          <a:lnRef idx="2">
+            <a:schemeClr val="accent6">
+              <a:shade val="50000"/>
+            </a:schemeClr>
+          </a:lnRef>
+          <a:fillRef idx="1">
+            <a:schemeClr val="accent6"/>
+          </a:fillRef>
+          <a:effectRef idx="0">
+            <a:schemeClr val="accent6"/>
+          </a:effectRef>
+          <a:fontRef idx="minor">
+            <a:schemeClr val="lt1"/>
+          </a:fontRef>
+        </p:style>
+        <p:txBody>
+          <a:bodyPr rtlCol="0" anchor="ctr"/>
+          <a:lstStyle/>
+          <a:p>
+            <a:pPr algn="ctr"/>
+            <a:r>
+              <a:rPr lang="en-GB" sz="1600" dirty="0" err="1"/>
+              <a:t>ChangedObjects</a:t>
+            </a:r>
+            <a:endParaRPr lang="en-GB" sz="1600" dirty="0"/>
+          </a:p>
+        </p:txBody>
+      </p:sp>
+      <p:cxnSp>
+        <p:nvCxnSpPr>
+          <p:cNvPr id="97" name="Straight Arrow Connector 96"/>
+          <p:cNvCxnSpPr>
+            <a:stCxn id="86" idx="0"/>
+          </p:cNvCxnSpPr>
+          <p:nvPr/>
+        </p:nvCxnSpPr>
+        <p:spPr>
+          <a:xfrm flipH="1" flipV="1">
+            <a:off x="3458864" y="1173309"/>
+            <a:ext cx="3" cy="1238610"/>
+          </a:xfrm>
+          <a:prstGeom prst="straightConnector1">
+            <a:avLst/>
+          </a:prstGeom>
+          <a:ln w="19050">
+            <a:solidFill>
+              <a:schemeClr val="accent6">
+                <a:lumMod val="60000"/>
+                <a:lumOff val="40000"/>
+              </a:schemeClr>
+            </a:solidFill>
+            <a:prstDash val="sysDash"/>
+            <a:tailEnd type="triangle"/>
+          </a:ln>
+        </p:spPr>
+        <p:style>
+          <a:lnRef idx="1">
+            <a:schemeClr val="accent1"/>
+          </a:lnRef>
+          <a:fillRef idx="0">
+            <a:schemeClr val="accent1"/>
+          </a:fillRef>
+          <a:effectRef idx="0">
+            <a:schemeClr val="accent1"/>
+          </a:effectRef>
+          <a:fontRef idx="minor">
+            <a:schemeClr val="tx1"/>
+          </a:fontRef>
+        </p:style>
+      </p:cxnSp>
+      <p:sp>
+        <p:nvSpPr>
+          <p:cNvPr id="98" name="TextBox 97"/>
+          <p:cNvSpPr txBox="1"/>
+          <p:nvPr/>
+        </p:nvSpPr>
+        <p:spPr>
+          <a:xfrm>
+            <a:off x="3453351" y="1298139"/>
+            <a:ext cx="2141933" cy="261610"/>
+          </a:xfrm>
+          <a:prstGeom prst="rect">
+            <a:avLst/>
+          </a:prstGeom>
+          <a:noFill/>
+        </p:spPr>
+        <p:txBody>
+          <a:bodyPr wrap="none" rtlCol="0">
+            <a:spAutoFit/>
+          </a:bodyPr>
+          <a:lstStyle/>
+          <a:p>
+            <a:r>
+              <a:rPr lang="en-GB" sz="1100" dirty="0">
+                <a:solidFill>
+                  <a:schemeClr val="accent6"/>
+                </a:solidFill>
+              </a:rPr>
+              <a:t>enlist objects as they are modified</a:t>
+            </a:r>
+          </a:p>
+        </p:txBody>
+      </p:sp>
+      <p:sp>
+        <p:nvSpPr>
+          <p:cNvPr id="99" name="Rectangle 98"/>
+          <p:cNvSpPr/>
+          <p:nvPr/>
+        </p:nvSpPr>
+        <p:spPr>
+          <a:xfrm>
+            <a:off x="2013708" y="1595876"/>
+            <a:ext cx="3933617" cy="3174087"/>
+          </a:xfrm>
+          <a:prstGeom prst="rect">
+            <a:avLst/>
+          </a:prstGeom>
+          <a:noFill/>
         </p:spPr>
         <p:style>
           <a:lnRef idx="2">
@@ -3326,64 +3548,35 @@
           </a:fontRef>
         </p:style>
         <p:txBody>
-          <a:bodyPr rtlCol="0" anchor="ctr"/>
-          <a:lstStyle/>
-          <a:p>
-            <a:pPr algn="ctr"/>
-            <a:r>
-              <a:rPr lang="en-GB" sz="1600" dirty="0"/>
-              <a:t>Sub-execution</a:t>
-            </a:r>
-          </a:p>
-        </p:txBody>
-      </p:sp>
-      <p:cxnSp>
-        <p:nvCxnSpPr>
-          <p:cNvPr id="88" name="Straight Arrow Connector 87"/>
-          <p:cNvCxnSpPr>
-            <a:stCxn id="86" idx="3"/>
-            <a:endCxn id="96" idx="1"/>
-          </p:cNvCxnSpPr>
-          <p:nvPr/>
-        </p:nvCxnSpPr>
-        <p:spPr>
-          <a:xfrm>
-            <a:off x="3569606" y="3531503"/>
-            <a:ext cx="945637" cy="437707"/>
-          </a:xfrm>
-          <a:prstGeom prst="straightConnector1">
-            <a:avLst/>
-          </a:prstGeom>
-          <a:ln w="22225">
-            <a:prstDash val="sysDash"/>
-            <a:tailEnd type="triangle"/>
-          </a:ln>
-        </p:spPr>
-        <p:style>
-          <a:lnRef idx="1">
-            <a:schemeClr val="accent1"/>
-          </a:lnRef>
-          <a:fillRef idx="0">
-            <a:schemeClr val="accent1"/>
-          </a:fillRef>
-          <a:effectRef idx="0">
-            <a:schemeClr val="accent1"/>
-          </a:effectRef>
-          <a:fontRef idx="minor">
-            <a:schemeClr val="tx1"/>
-          </a:fontRef>
-        </p:style>
-      </p:cxnSp>
-      <p:sp>
-        <p:nvSpPr>
-          <p:cNvPr id="89" name="Rectangle 88"/>
+          <a:bodyPr rtlCol="0" anchor="t" anchorCtr="0"/>
+          <a:lstStyle/>
+          <a:p>
+            <a:r>
+              <a:rPr lang="en-GB" sz="1600" dirty="0" err="1">
+                <a:solidFill>
+                  <a:schemeClr val="tx2"/>
+                </a:solidFill>
+              </a:rPr>
+              <a:t>InteractionContext</a:t>
+            </a:r>
+            <a:endParaRPr lang="en-GB" sz="1600" dirty="0">
+              <a:solidFill>
+                <a:schemeClr val="tx2"/>
+              </a:solidFill>
+            </a:endParaRPr>
+          </a:p>
+        </p:txBody>
+      </p:sp>
+      <p:sp>
+        <p:nvSpPr>
+          <p:cNvPr id="100" name="Rectangle 99"/>
           <p:cNvSpPr/>
           <p:nvPr/>
         </p:nvSpPr>
         <p:spPr>
           <a:xfrm>
-            <a:off x="2453185" y="5386000"/>
-            <a:ext cx="1116419" cy="522347"/>
+            <a:off x="6150645" y="2286384"/>
+            <a:ext cx="1696533" cy="600163"/>
           </a:xfrm>
           <a:prstGeom prst="rect">
             <a:avLst/>
@@ -3391,49 +3584,63 @@
         </p:spPr>
         <p:style>
           <a:lnRef idx="2">
-            <a:schemeClr val="accent5">
-              <a:shade val="50000"/>
-            </a:schemeClr>
+            <a:schemeClr val="accent2"/>
           </a:lnRef>
           <a:fillRef idx="1">
-            <a:schemeClr val="accent5"/>
+            <a:schemeClr val="lt1"/>
           </a:fillRef>
           <a:effectRef idx="0">
-            <a:schemeClr val="accent5"/>
+            <a:schemeClr val="accent2"/>
           </a:effectRef>
           <a:fontRef idx="minor">
-            <a:schemeClr val="lt1"/>
+            <a:schemeClr val="dk1"/>
           </a:fontRef>
         </p:style>
         <p:txBody>
-          <a:bodyPr rtlCol="0" anchor="ctr"/>
-          <a:lstStyle/>
-          <a:p>
-            <a:pPr algn="ctr"/>
-            <a:r>
-              <a:rPr lang="en-GB" sz="1400" dirty="0"/>
-              <a:t>Domain</a:t>
-            </a:r>
-          </a:p>
-          <a:p>
-            <a:pPr algn="ctr"/>
-            <a:r>
-              <a:rPr lang="en-GB" sz="1400" dirty="0"/>
-              <a:t>Event</a:t>
-            </a:r>
-          </a:p>
-        </p:txBody>
-      </p:sp>
-      <p:sp>
-        <p:nvSpPr>
-          <p:cNvPr id="90" name="Rectangle 89"/>
+          <a:bodyPr rtlCol="0" anchor="t" anchorCtr="0"/>
+          <a:lstStyle/>
+          <a:p>
+            <a:r>
+              <a:rPr lang="en-GB" sz="1600" i="1" dirty="0">
+                <a:solidFill>
+                  <a:schemeClr val="accent2"/>
+                </a:solidFill>
+              </a:rPr>
+              <a:t>Publisher</a:t>
+            </a:r>
+            <a:br>
+              <a:rPr lang="en-GB" sz="1600" i="1" dirty="0">
+                <a:solidFill>
+                  <a:schemeClr val="accent2"/>
+                </a:solidFill>
+              </a:rPr>
+            </a:br>
+            <a:r>
+              <a:rPr lang="en-GB" sz="1600" i="1" dirty="0" err="1">
+                <a:solidFill>
+                  <a:schemeClr val="accent2"/>
+                </a:solidFill>
+              </a:rPr>
+              <a:t>DispatchService</a:t>
+            </a:r>
+            <a:endParaRPr lang="en-GB" sz="1600" i="1" dirty="0">
+              <a:solidFill>
+                <a:schemeClr val="accent2"/>
+              </a:solidFill>
+            </a:endParaRPr>
+          </a:p>
+        </p:txBody>
+      </p:sp>
+      <p:sp>
+        <p:nvSpPr>
+          <p:cNvPr id="101" name="Rectangle 100"/>
           <p:cNvSpPr/>
           <p:nvPr/>
         </p:nvSpPr>
         <p:spPr>
           <a:xfrm>
-            <a:off x="4515241" y="5386000"/>
-            <a:ext cx="1116419" cy="522348"/>
+            <a:off x="6150646" y="272748"/>
+            <a:ext cx="1633864" cy="550678"/>
           </a:xfrm>
           <a:prstGeom prst="rect">
             <a:avLst/>
@@ -3441,49 +3648,124 @@
         </p:spPr>
         <p:style>
           <a:lnRef idx="2">
-            <a:schemeClr val="accent5">
-              <a:shade val="50000"/>
-            </a:schemeClr>
+            <a:schemeClr val="accent4"/>
           </a:lnRef>
           <a:fillRef idx="1">
-            <a:schemeClr val="accent5"/>
+            <a:schemeClr val="lt1"/>
           </a:fillRef>
           <a:effectRef idx="0">
-            <a:schemeClr val="accent5"/>
+            <a:schemeClr val="accent4"/>
           </a:effectRef>
           <a:fontRef idx="minor">
-            <a:schemeClr val="lt1"/>
+            <a:schemeClr val="dk1"/>
           </a:fontRef>
         </p:style>
         <p:txBody>
-          <a:bodyPr rtlCol="0" anchor="ctr"/>
-          <a:lstStyle/>
-          <a:p>
-            <a:pPr algn="ctr"/>
-            <a:r>
-              <a:rPr lang="en-GB" sz="1400" dirty="0"/>
-              <a:t>Domain</a:t>
-            </a:r>
-          </a:p>
-          <a:p>
-            <a:pPr algn="ctr"/>
-            <a:r>
-              <a:rPr lang="en-GB" sz="1400" dirty="0"/>
-              <a:t>Event</a:t>
-            </a:r>
-          </a:p>
-        </p:txBody>
-      </p:sp>
-      <p:sp>
-        <p:nvSpPr>
-          <p:cNvPr id="91" name="Rectangle 90"/>
+          <a:bodyPr rtlCol="0" anchor="t" anchorCtr="0"/>
+          <a:lstStyle/>
+          <a:p>
+            <a:r>
+              <a:rPr lang="en-GB" sz="1600" i="1" dirty="0">
+                <a:solidFill>
+                  <a:schemeClr val="accent4"/>
+                </a:solidFill>
+              </a:rPr>
+              <a:t>Auditing</a:t>
+            </a:r>
+            <a:br>
+              <a:rPr lang="en-GB" sz="1600" i="1" dirty="0">
+                <a:solidFill>
+                  <a:schemeClr val="accent4"/>
+                </a:solidFill>
+              </a:rPr>
+            </a:br>
+            <a:r>
+              <a:rPr lang="en-GB" sz="1600" i="1" dirty="0" err="1">
+                <a:solidFill>
+                  <a:schemeClr val="accent4"/>
+                </a:solidFill>
+              </a:rPr>
+              <a:t>DispatchService</a:t>
+            </a:r>
+            <a:endParaRPr lang="en-GB" sz="1600" i="1" dirty="0">
+              <a:solidFill>
+                <a:schemeClr val="accent4"/>
+              </a:solidFill>
+            </a:endParaRPr>
+          </a:p>
+        </p:txBody>
+      </p:sp>
+      <p:sp>
+        <p:nvSpPr>
+          <p:cNvPr id="102" name="Rectangle 101"/>
           <p:cNvSpPr/>
           <p:nvPr/>
         </p:nvSpPr>
         <p:spPr>
           <a:xfrm>
-            <a:off x="2013706" y="420276"/>
-            <a:ext cx="3933616" cy="1005107"/>
+            <a:off x="8220733" y="3099063"/>
+            <a:ext cx="1649759" cy="550678"/>
+          </a:xfrm>
+          <a:prstGeom prst="rect">
+            <a:avLst/>
+          </a:prstGeom>
+        </p:spPr>
+        <p:style>
+          <a:lnRef idx="1">
+            <a:schemeClr val="accent3"/>
+          </a:lnRef>
+          <a:fillRef idx="2">
+            <a:schemeClr val="accent3"/>
+          </a:fillRef>
+          <a:effectRef idx="1">
+            <a:schemeClr val="accent3"/>
+          </a:effectRef>
+          <a:fontRef idx="minor">
+            <a:schemeClr val="dk1"/>
+          </a:fontRef>
+        </p:style>
+        <p:txBody>
+          <a:bodyPr rtlCol="0" anchor="t" anchorCtr="0"/>
+          <a:lstStyle/>
+          <a:p>
+            <a:pPr algn="ctr"/>
+            <a:r>
+              <a:rPr lang="en-GB" sz="1600" dirty="0" err="1">
+                <a:solidFill>
+                  <a:schemeClr val="tx1"/>
+                </a:solidFill>
+              </a:rPr>
+              <a:t>PublisherService</a:t>
+            </a:r>
+            <a:endParaRPr lang="en-GB" sz="1600" dirty="0">
+              <a:solidFill>
+                <a:schemeClr val="tx1"/>
+              </a:solidFill>
+            </a:endParaRPr>
+          </a:p>
+          <a:p>
+            <a:pPr algn="ctr"/>
+            <a:r>
+              <a:rPr lang="en-GB" sz="1600" dirty="0">
+                <a:solidFill>
+                  <a:schemeClr val="tx1"/>
+                </a:solidFill>
+              </a:rPr>
+              <a:t>SPI</a:t>
+            </a:r>
+          </a:p>
+        </p:txBody>
+      </p:sp>
+      <p:sp>
+        <p:nvSpPr>
+          <p:cNvPr id="103" name="Rectangle 102"/>
+          <p:cNvSpPr/>
+          <p:nvPr/>
+        </p:nvSpPr>
+        <p:spPr>
+          <a:xfrm>
+            <a:off x="197299" y="1595876"/>
+            <a:ext cx="1697674" cy="3174087"/>
           </a:xfrm>
           <a:prstGeom prst="rect">
             <a:avLst/>
@@ -3510,572 +3792,6 @@
           <a:bodyPr rtlCol="0" anchor="t" anchorCtr="0"/>
           <a:lstStyle/>
           <a:p>
-            <a:pPr algn="ctr"/>
-            <a:r>
-              <a:rPr lang="en-GB" sz="1600" i="1" dirty="0" err="1">
-                <a:solidFill>
-                  <a:schemeClr val="accent6"/>
-                </a:solidFill>
-              </a:rPr>
-              <a:t>ChangedObjectServiceInternal</a:t>
-            </a:r>
-            <a:endParaRPr lang="en-GB" sz="1600" i="1" dirty="0">
-              <a:solidFill>
-                <a:schemeClr val="accent6"/>
-              </a:solidFill>
-            </a:endParaRPr>
-          </a:p>
-        </p:txBody>
-      </p:sp>
-      <p:cxnSp>
-        <p:nvCxnSpPr>
-          <p:cNvPr id="92" name="Straight Arrow Connector 91"/>
-          <p:cNvCxnSpPr/>
-          <p:nvPr/>
-        </p:nvCxnSpPr>
-        <p:spPr>
-          <a:xfrm flipH="1">
-            <a:off x="2599684" y="4518737"/>
-            <a:ext cx="2" cy="839974"/>
-          </a:xfrm>
-          <a:prstGeom prst="straightConnector1">
-            <a:avLst/>
-          </a:prstGeom>
-          <a:ln w="19050">
-            <a:solidFill>
-              <a:schemeClr val="bg1">
-                <a:lumMod val="50000"/>
-              </a:schemeClr>
-            </a:solidFill>
-            <a:prstDash val="sysDash"/>
-            <a:tailEnd type="triangle"/>
-          </a:ln>
-        </p:spPr>
-        <p:style>
-          <a:lnRef idx="1">
-            <a:schemeClr val="accent1"/>
-          </a:lnRef>
-          <a:fillRef idx="0">
-            <a:schemeClr val="accent1"/>
-          </a:fillRef>
-          <a:effectRef idx="0">
-            <a:schemeClr val="accent1"/>
-          </a:effectRef>
-          <a:fontRef idx="minor">
-            <a:schemeClr val="tx1"/>
-          </a:fontRef>
-        </p:style>
-      </p:cxnSp>
-      <p:cxnSp>
-        <p:nvCxnSpPr>
-          <p:cNvPr id="93" name="Straight Arrow Connector 92"/>
-          <p:cNvCxnSpPr>
-            <a:stCxn id="86" idx="3"/>
-            <a:endCxn id="87" idx="1"/>
-          </p:cNvCxnSpPr>
-          <p:nvPr/>
-        </p:nvCxnSpPr>
-        <p:spPr>
-          <a:xfrm flipV="1">
-            <a:off x="3569606" y="3114174"/>
-            <a:ext cx="945637" cy="417329"/>
-          </a:xfrm>
-          <a:prstGeom prst="straightConnector1">
-            <a:avLst/>
-          </a:prstGeom>
-          <a:ln w="22225">
-            <a:prstDash val="sysDash"/>
-            <a:tailEnd type="triangle"/>
-          </a:ln>
-        </p:spPr>
-        <p:style>
-          <a:lnRef idx="1">
-            <a:schemeClr val="accent1"/>
-          </a:lnRef>
-          <a:fillRef idx="0">
-            <a:schemeClr val="accent1"/>
-          </a:fillRef>
-          <a:effectRef idx="0">
-            <a:schemeClr val="accent1"/>
-          </a:effectRef>
-          <a:fontRef idx="minor">
-            <a:schemeClr val="tx1"/>
-          </a:fontRef>
-        </p:style>
-      </p:cxnSp>
-      <p:sp>
-        <p:nvSpPr>
-          <p:cNvPr id="94" name="Rectangle 93"/>
-          <p:cNvSpPr/>
-          <p:nvPr/>
-        </p:nvSpPr>
-        <p:spPr>
-          <a:xfrm>
-            <a:off x="2453183" y="789409"/>
-            <a:ext cx="3178477" cy="467623"/>
-          </a:xfrm>
-          <a:prstGeom prst="rect">
-            <a:avLst/>
-          </a:prstGeom>
-        </p:spPr>
-        <p:style>
-          <a:lnRef idx="2">
-            <a:schemeClr val="accent6">
-              <a:shade val="50000"/>
-            </a:schemeClr>
-          </a:lnRef>
-          <a:fillRef idx="1">
-            <a:schemeClr val="accent6"/>
-          </a:fillRef>
-          <a:effectRef idx="0">
-            <a:schemeClr val="accent6"/>
-          </a:effectRef>
-          <a:fontRef idx="minor">
-            <a:schemeClr val="lt1"/>
-          </a:fontRef>
-        </p:style>
-        <p:txBody>
-          <a:bodyPr rtlCol="0" anchor="ctr"/>
-          <a:lstStyle/>
-          <a:p>
-            <a:pPr algn="ctr"/>
-            <a:r>
-              <a:rPr lang="en-GB" sz="1600" dirty="0" err="1"/>
-              <a:t>ChangedObjects</a:t>
-            </a:r>
-            <a:endParaRPr lang="en-GB" sz="1600" dirty="0"/>
-          </a:p>
-        </p:txBody>
-      </p:sp>
-      <p:cxnSp>
-        <p:nvCxnSpPr>
-          <p:cNvPr id="95" name="Straight Arrow Connector 94"/>
-          <p:cNvCxnSpPr/>
-          <p:nvPr/>
-        </p:nvCxnSpPr>
-        <p:spPr>
-          <a:xfrm flipH="1">
-            <a:off x="4654684" y="4312996"/>
-            <a:ext cx="1" cy="1088952"/>
-          </a:xfrm>
-          <a:prstGeom prst="straightConnector1">
-            <a:avLst/>
-          </a:prstGeom>
-          <a:ln w="19050">
-            <a:solidFill>
-              <a:schemeClr val="bg1">
-                <a:lumMod val="50000"/>
-              </a:schemeClr>
-            </a:solidFill>
-            <a:prstDash val="sysDash"/>
-            <a:tailEnd type="triangle"/>
-          </a:ln>
-        </p:spPr>
-        <p:style>
-          <a:lnRef idx="1">
-            <a:schemeClr val="accent1"/>
-          </a:lnRef>
-          <a:fillRef idx="0">
-            <a:schemeClr val="accent1"/>
-          </a:fillRef>
-          <a:effectRef idx="0">
-            <a:schemeClr val="accent1"/>
-          </a:effectRef>
-          <a:fontRef idx="minor">
-            <a:schemeClr val="tx1"/>
-          </a:fontRef>
-        </p:style>
-      </p:cxnSp>
-      <p:sp>
-        <p:nvSpPr>
-          <p:cNvPr id="96" name="Rectangle 95"/>
-          <p:cNvSpPr/>
-          <p:nvPr/>
-        </p:nvSpPr>
-        <p:spPr>
-          <a:xfrm>
-            <a:off x="4515242" y="3641370"/>
-            <a:ext cx="1116419" cy="655674"/>
-          </a:xfrm>
-          <a:prstGeom prst="rect">
-            <a:avLst/>
-          </a:prstGeom>
-        </p:spPr>
-        <p:style>
-          <a:lnRef idx="2">
-            <a:schemeClr val="accent1">
-              <a:shade val="50000"/>
-            </a:schemeClr>
-          </a:lnRef>
-          <a:fillRef idx="1">
-            <a:schemeClr val="accent1"/>
-          </a:fillRef>
-          <a:effectRef idx="0">
-            <a:schemeClr val="accent1"/>
-          </a:effectRef>
-          <a:fontRef idx="minor">
-            <a:schemeClr val="lt1"/>
-          </a:fontRef>
-        </p:style>
-        <p:txBody>
-          <a:bodyPr rtlCol="0" anchor="ctr"/>
-          <a:lstStyle/>
-          <a:p>
-            <a:pPr algn="ctr"/>
-            <a:r>
-              <a:rPr lang="en-GB" sz="1600" dirty="0"/>
-              <a:t>Sub-execution</a:t>
-            </a:r>
-          </a:p>
-        </p:txBody>
-      </p:sp>
-      <p:cxnSp>
-        <p:nvCxnSpPr>
-          <p:cNvPr id="97" name="Straight Arrow Connector 96"/>
-          <p:cNvCxnSpPr>
-            <a:stCxn id="86" idx="0"/>
-          </p:cNvCxnSpPr>
-          <p:nvPr/>
-        </p:nvCxnSpPr>
-        <p:spPr>
-          <a:xfrm flipH="1" flipV="1">
-            <a:off x="3011394" y="1278366"/>
-            <a:ext cx="3" cy="1238610"/>
-          </a:xfrm>
-          <a:prstGeom prst="straightConnector1">
-            <a:avLst/>
-          </a:prstGeom>
-          <a:ln w="19050">
-            <a:solidFill>
-              <a:schemeClr val="accent6">
-                <a:lumMod val="60000"/>
-                <a:lumOff val="40000"/>
-              </a:schemeClr>
-            </a:solidFill>
-            <a:prstDash val="sysDash"/>
-            <a:tailEnd type="triangle"/>
-          </a:ln>
-        </p:spPr>
-        <p:style>
-          <a:lnRef idx="1">
-            <a:schemeClr val="accent1"/>
-          </a:lnRef>
-          <a:fillRef idx="0">
-            <a:schemeClr val="accent1"/>
-          </a:fillRef>
-          <a:effectRef idx="0">
-            <a:schemeClr val="accent1"/>
-          </a:effectRef>
-          <a:fontRef idx="minor">
-            <a:schemeClr val="tx1"/>
-          </a:fontRef>
-        </p:style>
-      </p:cxnSp>
-      <p:sp>
-        <p:nvSpPr>
-          <p:cNvPr id="98" name="TextBox 97"/>
-          <p:cNvSpPr txBox="1"/>
-          <p:nvPr/>
-        </p:nvSpPr>
-        <p:spPr>
-          <a:xfrm>
-            <a:off x="2990318" y="1403196"/>
-            <a:ext cx="2141933" cy="261610"/>
-          </a:xfrm>
-          <a:prstGeom prst="rect">
-            <a:avLst/>
-          </a:prstGeom>
-          <a:noFill/>
-        </p:spPr>
-        <p:txBody>
-          <a:bodyPr wrap="none" rtlCol="0">
-            <a:spAutoFit/>
-          </a:bodyPr>
-          <a:lstStyle/>
-          <a:p>
-            <a:r>
-              <a:rPr lang="en-GB" sz="1100" dirty="0">
-                <a:solidFill>
-                  <a:schemeClr val="accent6"/>
-                </a:solidFill>
-              </a:rPr>
-              <a:t>enlist objects as they are modified</a:t>
-            </a:r>
-          </a:p>
-        </p:txBody>
-      </p:sp>
-      <p:sp>
-        <p:nvSpPr>
-          <p:cNvPr id="99" name="Rectangle 98"/>
-          <p:cNvSpPr/>
-          <p:nvPr/>
-        </p:nvSpPr>
-        <p:spPr>
-          <a:xfrm>
-            <a:off x="2013708" y="1700933"/>
-            <a:ext cx="3933617" cy="3174087"/>
-          </a:xfrm>
-          <a:prstGeom prst="rect">
-            <a:avLst/>
-          </a:prstGeom>
-          <a:noFill/>
-        </p:spPr>
-        <p:style>
-          <a:lnRef idx="2">
-            <a:schemeClr val="accent1">
-              <a:shade val="50000"/>
-            </a:schemeClr>
-          </a:lnRef>
-          <a:fillRef idx="1">
-            <a:schemeClr val="accent1"/>
-          </a:fillRef>
-          <a:effectRef idx="0">
-            <a:schemeClr val="accent1"/>
-          </a:effectRef>
-          <a:fontRef idx="minor">
-            <a:schemeClr val="lt1"/>
-          </a:fontRef>
-        </p:style>
-        <p:txBody>
-          <a:bodyPr rtlCol="0" anchor="t" anchorCtr="0"/>
-          <a:lstStyle/>
-          <a:p>
-            <a:r>
-              <a:rPr lang="en-GB" sz="1600" dirty="0" err="1">
-                <a:solidFill>
-                  <a:schemeClr val="tx2"/>
-                </a:solidFill>
-              </a:rPr>
-              <a:t>InteractionContext</a:t>
-            </a:r>
-            <a:endParaRPr lang="en-GB" sz="1600" dirty="0">
-              <a:solidFill>
-                <a:schemeClr val="tx2"/>
-              </a:solidFill>
-            </a:endParaRPr>
-          </a:p>
-        </p:txBody>
-      </p:sp>
-      <p:sp>
-        <p:nvSpPr>
-          <p:cNvPr id="100" name="Rectangle 99"/>
-          <p:cNvSpPr/>
-          <p:nvPr/>
-        </p:nvSpPr>
-        <p:spPr>
-          <a:xfrm>
-            <a:off x="6150646" y="2126854"/>
-            <a:ext cx="1569187" cy="500616"/>
-          </a:xfrm>
-          <a:prstGeom prst="rect">
-            <a:avLst/>
-          </a:prstGeom>
-        </p:spPr>
-        <p:style>
-          <a:lnRef idx="2">
-            <a:schemeClr val="accent2"/>
-          </a:lnRef>
-          <a:fillRef idx="1">
-            <a:schemeClr val="lt1"/>
-          </a:fillRef>
-          <a:effectRef idx="0">
-            <a:schemeClr val="accent2"/>
-          </a:effectRef>
-          <a:fontRef idx="minor">
-            <a:schemeClr val="dk1"/>
-          </a:fontRef>
-        </p:style>
-        <p:txBody>
-          <a:bodyPr rtlCol="0" anchor="t" anchorCtr="0"/>
-          <a:lstStyle/>
-          <a:p>
-            <a:r>
-              <a:rPr lang="en-GB" sz="1600" i="1" dirty="0" err="1">
-                <a:solidFill>
-                  <a:schemeClr val="accent2"/>
-                </a:solidFill>
-              </a:rPr>
-              <a:t>PublisherService</a:t>
-            </a:r>
-            <a:br>
-              <a:rPr lang="en-GB" sz="1600" i="1" dirty="0">
-                <a:solidFill>
-                  <a:schemeClr val="accent2"/>
-                </a:solidFill>
-              </a:rPr>
-            </a:br>
-            <a:r>
-              <a:rPr lang="en-GB" sz="1600" i="1" dirty="0">
-                <a:solidFill>
-                  <a:schemeClr val="accent2"/>
-                </a:solidFill>
-              </a:rPr>
-              <a:t>Internal</a:t>
-            </a:r>
-          </a:p>
-        </p:txBody>
-      </p:sp>
-      <p:sp>
-        <p:nvSpPr>
-          <p:cNvPr id="101" name="Rectangle 100"/>
-          <p:cNvSpPr/>
-          <p:nvPr/>
-        </p:nvSpPr>
-        <p:spPr>
-          <a:xfrm>
-            <a:off x="6150646" y="113217"/>
-            <a:ext cx="1633864" cy="550678"/>
-          </a:xfrm>
-          <a:prstGeom prst="rect">
-            <a:avLst/>
-          </a:prstGeom>
-        </p:spPr>
-        <p:style>
-          <a:lnRef idx="2">
-            <a:schemeClr val="accent4"/>
-          </a:lnRef>
-          <a:fillRef idx="1">
-            <a:schemeClr val="lt1"/>
-          </a:fillRef>
-          <a:effectRef idx="0">
-            <a:schemeClr val="accent4"/>
-          </a:effectRef>
-          <a:fontRef idx="minor">
-            <a:schemeClr val="dk1"/>
-          </a:fontRef>
-        </p:style>
-        <p:txBody>
-          <a:bodyPr rtlCol="0" anchor="t" anchorCtr="0"/>
-          <a:lstStyle/>
-          <a:p>
-            <a:r>
-              <a:rPr lang="en-GB" sz="1600" i="1" dirty="0">
-                <a:solidFill>
-                  <a:schemeClr val="accent4"/>
-                </a:solidFill>
-              </a:rPr>
-              <a:t>Auditing</a:t>
-            </a:r>
-            <a:br>
-              <a:rPr lang="en-GB" sz="1600" i="1" dirty="0">
-                <a:solidFill>
-                  <a:schemeClr val="accent4"/>
-                </a:solidFill>
-              </a:rPr>
-            </a:br>
-            <a:r>
-              <a:rPr lang="en-GB" sz="1600" i="1" dirty="0" err="1">
-                <a:solidFill>
-                  <a:schemeClr val="accent4"/>
-                </a:solidFill>
-              </a:rPr>
-              <a:t>ServiceInternal</a:t>
-            </a:r>
-            <a:endParaRPr lang="en-GB" sz="1600" i="1" dirty="0">
-              <a:solidFill>
-                <a:schemeClr val="accent4"/>
-              </a:solidFill>
-            </a:endParaRPr>
-          </a:p>
-        </p:txBody>
-      </p:sp>
-      <p:sp>
-        <p:nvSpPr>
-          <p:cNvPr id="102" name="Rectangle 101"/>
-          <p:cNvSpPr/>
-          <p:nvPr/>
-        </p:nvSpPr>
-        <p:spPr>
-          <a:xfrm>
-            <a:off x="8220733" y="2939532"/>
-            <a:ext cx="1649759" cy="550678"/>
-          </a:xfrm>
-          <a:prstGeom prst="rect">
-            <a:avLst/>
-          </a:prstGeom>
-        </p:spPr>
-        <p:style>
-          <a:lnRef idx="1">
-            <a:schemeClr val="accent3"/>
-          </a:lnRef>
-          <a:fillRef idx="2">
-            <a:schemeClr val="accent3"/>
-          </a:fillRef>
-          <a:effectRef idx="1">
-            <a:schemeClr val="accent3"/>
-          </a:effectRef>
-          <a:fontRef idx="minor">
-            <a:schemeClr val="dk1"/>
-          </a:fontRef>
-        </p:style>
-        <p:txBody>
-          <a:bodyPr rtlCol="0" anchor="t" anchorCtr="0"/>
-          <a:lstStyle/>
-          <a:p>
-            <a:pPr algn="ctr"/>
-            <a:r>
-              <a:rPr lang="en-GB" sz="1600" dirty="0" err="1">
-                <a:solidFill>
-                  <a:schemeClr val="tx1"/>
-                </a:solidFill>
-              </a:rPr>
-              <a:t>PublisherService</a:t>
-            </a:r>
-            <a:endParaRPr lang="en-GB" sz="1600" dirty="0">
-              <a:solidFill>
-                <a:schemeClr val="tx1"/>
-              </a:solidFill>
-            </a:endParaRPr>
-          </a:p>
-          <a:p>
-            <a:pPr algn="ctr"/>
-            <a:r>
-              <a:rPr lang="en-GB" sz="1600" dirty="0">
-                <a:solidFill>
-                  <a:schemeClr val="tx1"/>
-                </a:solidFill>
-              </a:rPr>
-              <a:t>SPI</a:t>
-            </a:r>
-          </a:p>
-        </p:txBody>
-      </p:sp>
-      <p:sp>
-        <p:nvSpPr>
-          <p:cNvPr id="103" name="Rectangle 102"/>
-          <p:cNvSpPr/>
-          <p:nvPr/>
-        </p:nvSpPr>
-        <p:spPr>
-          <a:xfrm>
-            <a:off x="197299" y="1700933"/>
-            <a:ext cx="1697674" cy="3174087"/>
-          </a:xfrm>
-          <a:prstGeom prst="rect">
-            <a:avLst/>
-          </a:prstGeom>
-          <a:noFill/>
-        </p:spPr>
-        <p:style>
-          <a:lnRef idx="2">
-            <a:schemeClr val="accent1">
-              <a:shade val="50000"/>
-            </a:schemeClr>
-          </a:lnRef>
-          <a:fillRef idx="1">
-            <a:schemeClr val="accent1"/>
-          </a:fillRef>
-          <a:effectRef idx="0">
-            <a:schemeClr val="accent1"/>
-          </a:effectRef>
-          <a:fontRef idx="minor">
-            <a:schemeClr val="lt1"/>
-          </a:fontRef>
-        </p:style>
-        <p:txBody>
-          <a:bodyPr rtlCol="0" anchor="t" anchorCtr="0"/>
-          <a:lstStyle/>
-          <a:p>
             <a:r>
               <a:rPr lang="en-GB" sz="1600" dirty="0" err="1">
                 <a:solidFill>
@@ -4098,99 +3814,17 @@
       </p:sp>
       <p:cxnSp>
         <p:nvCxnSpPr>
-          <p:cNvPr id="104" name="Straight Arrow Connector 103"/>
-          <p:cNvCxnSpPr/>
-          <p:nvPr/>
-        </p:nvCxnSpPr>
-        <p:spPr>
-          <a:xfrm flipV="1">
-            <a:off x="5064592" y="1293156"/>
-            <a:ext cx="8856" cy="1467999"/>
-          </a:xfrm>
-          <a:prstGeom prst="straightConnector1">
-            <a:avLst/>
-          </a:prstGeom>
-          <a:ln w="19050">
-            <a:solidFill>
-              <a:schemeClr val="accent6">
-                <a:lumMod val="60000"/>
-                <a:lumOff val="40000"/>
-              </a:schemeClr>
-            </a:solidFill>
-            <a:prstDash val="sysDash"/>
-            <a:tailEnd type="triangle"/>
-          </a:ln>
-        </p:spPr>
-        <p:style>
-          <a:lnRef idx="1">
-            <a:schemeClr val="accent1"/>
-          </a:lnRef>
-          <a:fillRef idx="0">
-            <a:schemeClr val="accent1"/>
-          </a:fillRef>
-          <a:effectRef idx="0">
-            <a:schemeClr val="accent1"/>
-          </a:effectRef>
-          <a:fontRef idx="minor">
-            <a:schemeClr val="tx1"/>
-          </a:fontRef>
-        </p:style>
-      </p:cxnSp>
-      <p:cxnSp>
-        <p:nvCxnSpPr>
           <p:cNvPr id="105" name="Curved Connector 104"/>
           <p:cNvCxnSpPr>
+            <a:cxnSpLocks/>
             <a:endCxn id="100" idx="1"/>
           </p:cNvCxnSpPr>
           <p:nvPr/>
         </p:nvCxnSpPr>
         <p:spPr>
           <a:xfrm flipV="1">
-            <a:off x="3590682" y="2377162"/>
-            <a:ext cx="2559964" cy="206846"/>
-          </a:xfrm>
-          <a:prstGeom prst="curvedConnector3">
-            <a:avLst>
-              <a:gd name="adj1" fmla="val 50000"/>
-            </a:avLst>
-          </a:prstGeom>
-          <a:ln w="19050">
-            <a:solidFill>
-              <a:schemeClr val="accent2">
-                <a:lumMod val="75000"/>
-              </a:schemeClr>
-            </a:solidFill>
-            <a:prstDash val="sysDash"/>
-            <a:tailEnd type="triangle"/>
-          </a:ln>
-        </p:spPr>
-        <p:style>
-          <a:lnRef idx="1">
-            <a:schemeClr val="accent1"/>
-          </a:lnRef>
-          <a:fillRef idx="0">
-            <a:schemeClr val="accent1"/>
-          </a:fillRef>
-          <a:effectRef idx="0">
-            <a:schemeClr val="accent1"/>
-          </a:effectRef>
-          <a:fontRef idx="minor">
-            <a:schemeClr val="tx1"/>
-          </a:fontRef>
-        </p:style>
-      </p:cxnSp>
-      <p:cxnSp>
-        <p:nvCxnSpPr>
-          <p:cNvPr id="106" name="Curved Connector 105"/>
-          <p:cNvCxnSpPr>
-            <a:endCxn id="100" idx="1"/>
-          </p:cNvCxnSpPr>
-          <p:nvPr/>
-        </p:nvCxnSpPr>
-        <p:spPr>
-          <a:xfrm flipV="1">
-            <a:off x="5648724" y="2377162"/>
-            <a:ext cx="501922" cy="451221"/>
+            <a:off x="4072207" y="2586466"/>
+            <a:ext cx="2078438" cy="128713"/>
           </a:xfrm>
           <a:prstGeom prst="curvedConnector3">
             <a:avLst>
@@ -4226,14 +3860,15 @@
         <p:nvCxnSpPr>
           <p:cNvPr id="107" name="Curved Connector 106"/>
           <p:cNvCxnSpPr>
+            <a:cxnSpLocks/>
             <a:endCxn id="100" idx="0"/>
           </p:cNvCxnSpPr>
           <p:nvPr/>
         </p:nvCxnSpPr>
         <p:spPr>
           <a:xfrm>
-            <a:off x="5627771" y="1177175"/>
-            <a:ext cx="1307469" cy="949679"/>
+            <a:off x="5627771" y="1336706"/>
+            <a:ext cx="1371141" cy="949678"/>
           </a:xfrm>
           <a:prstGeom prst="curvedConnector2">
             <a:avLst/>
@@ -4271,7 +3906,7 @@
         </p:nvSpPr>
         <p:spPr>
           <a:xfrm>
-            <a:off x="6069311" y="2623983"/>
+            <a:off x="6049064" y="2946179"/>
             <a:ext cx="1494320" cy="600164"/>
           </a:xfrm>
           <a:prstGeom prst="rect">
@@ -4331,7 +3966,7 @@
         </p:nvSpPr>
         <p:spPr>
           <a:xfrm>
-            <a:off x="6530010" y="1317269"/>
+            <a:off x="6876315" y="1719173"/>
             <a:ext cx="1721946" cy="430887"/>
           </a:xfrm>
           <a:prstGeom prst="rect">
@@ -4381,8 +4016,8 @@
         </p:nvCxnSpPr>
         <p:spPr>
           <a:xfrm flipV="1">
-            <a:off x="5631660" y="663895"/>
-            <a:ext cx="1335918" cy="359326"/>
+            <a:off x="5631660" y="823426"/>
+            <a:ext cx="1335918" cy="94738"/>
           </a:xfrm>
           <a:prstGeom prst="curvedConnector2">
             <a:avLst/>
@@ -4418,7 +4053,7 @@
         </p:nvSpPr>
         <p:spPr>
           <a:xfrm>
-            <a:off x="6530010" y="818069"/>
+            <a:off x="6530010" y="977600"/>
             <a:ext cx="1515158" cy="430887"/>
           </a:xfrm>
           <a:prstGeom prst="rect">
@@ -4466,7 +4101,7 @@
         </p:nvSpPr>
         <p:spPr>
           <a:xfrm>
-            <a:off x="197299" y="5748125"/>
+            <a:off x="197299" y="5643068"/>
             <a:ext cx="1697676" cy="550678"/>
           </a:xfrm>
           <a:prstGeom prst="rect">
@@ -4518,132 +4153,27 @@
           </a:p>
         </p:txBody>
       </p:sp>
-      <p:sp>
-        <p:nvSpPr>
-          <p:cNvPr id="113" name="Rectangle 112"/>
-          <p:cNvSpPr/>
-          <p:nvPr/>
-        </p:nvSpPr>
-        <p:spPr>
-          <a:xfrm>
-            <a:off x="8220731" y="113217"/>
-            <a:ext cx="1649759" cy="550678"/>
-          </a:xfrm>
-          <a:prstGeom prst="rect">
-            <a:avLst/>
-          </a:prstGeom>
-        </p:spPr>
-        <p:style>
-          <a:lnRef idx="1">
-            <a:schemeClr val="accent3"/>
-          </a:lnRef>
-          <a:fillRef idx="2">
-            <a:schemeClr val="accent3"/>
-          </a:fillRef>
-          <a:effectRef idx="1">
-            <a:schemeClr val="accent3"/>
-          </a:effectRef>
-          <a:fontRef idx="minor">
-            <a:schemeClr val="dk1"/>
-          </a:fontRef>
-        </p:style>
-        <p:txBody>
-          <a:bodyPr rtlCol="0" anchor="t" anchorCtr="0"/>
-          <a:lstStyle/>
-          <a:p>
-            <a:pPr algn="ctr"/>
-            <a:r>
-              <a:rPr lang="en-GB" sz="1600" dirty="0">
-                <a:solidFill>
-                  <a:schemeClr val="tx1"/>
-                </a:solidFill>
-              </a:rPr>
-              <a:t>AuditingService3</a:t>
-            </a:r>
-            <a:br>
-              <a:rPr lang="en-GB" sz="1600" dirty="0">
-                <a:solidFill>
-                  <a:schemeClr val="tx1"/>
-                </a:solidFill>
-              </a:rPr>
-            </a:br>
-            <a:r>
-              <a:rPr lang="en-GB" sz="1600" dirty="0">
-                <a:solidFill>
-                  <a:schemeClr val="tx1"/>
-                </a:solidFill>
-              </a:rPr>
-              <a:t>SPI</a:t>
-            </a:r>
-          </a:p>
-        </p:txBody>
-      </p:sp>
       <p:cxnSp>
         <p:nvCxnSpPr>
           <p:cNvPr id="114" name="Curved Connector 113"/>
           <p:cNvCxnSpPr>
+            <a:cxnSpLocks/>
             <a:stCxn id="100" idx="3"/>
-            <a:endCxn id="102" idx="1"/>
+            <a:endCxn id="102" idx="0"/>
           </p:cNvCxnSpPr>
           <p:nvPr/>
         </p:nvCxnSpPr>
         <p:spPr>
           <a:xfrm>
-            <a:off x="7719833" y="2377162"/>
-            <a:ext cx="500900" cy="837709"/>
-          </a:xfrm>
-          <a:prstGeom prst="curvedConnector3">
-            <a:avLst>
-              <a:gd name="adj1" fmla="val 50000"/>
-            </a:avLst>
+            <a:off x="7847178" y="2586466"/>
+            <a:ext cx="1198435" cy="512597"/>
+          </a:xfrm>
+          <a:prstGeom prst="curvedConnector2">
+            <a:avLst/>
           </a:prstGeom>
           <a:ln w="19050">
             <a:solidFill>
               <a:schemeClr val="accent2">
-                <a:lumMod val="75000"/>
-              </a:schemeClr>
-            </a:solidFill>
-            <a:prstDash val="sysDash"/>
-            <a:tailEnd type="triangle"/>
-          </a:ln>
-        </p:spPr>
-        <p:style>
-          <a:lnRef idx="1">
-            <a:schemeClr val="accent1"/>
-          </a:lnRef>
-          <a:fillRef idx="0">
-            <a:schemeClr val="accent1"/>
-          </a:fillRef>
-          <a:effectRef idx="0">
-            <a:schemeClr val="accent1"/>
-          </a:effectRef>
-          <a:fontRef idx="minor">
-            <a:schemeClr val="tx1"/>
-          </a:fontRef>
-        </p:style>
-      </p:cxnSp>
-      <p:cxnSp>
-        <p:nvCxnSpPr>
-          <p:cNvPr id="115" name="Curved Connector 114"/>
-          <p:cNvCxnSpPr>
-            <a:stCxn id="101" idx="3"/>
-            <a:endCxn id="113" idx="1"/>
-          </p:cNvCxnSpPr>
-          <p:nvPr/>
-        </p:nvCxnSpPr>
-        <p:spPr>
-          <a:xfrm>
-            <a:off x="7784510" y="388556"/>
-            <a:ext cx="436221" cy="12700"/>
-          </a:xfrm>
-          <a:prstGeom prst="curvedConnector3">
-            <a:avLst>
-              <a:gd name="adj1" fmla="val 50000"/>
-            </a:avLst>
-          </a:prstGeom>
-          <a:ln w="19050">
-            <a:solidFill>
-              <a:schemeClr val="accent4">
                 <a:lumMod val="75000"/>
               </a:schemeClr>
             </a:solidFill>
@@ -4677,7 +4207,7 @@
         </p:nvCxnSpPr>
         <p:spPr>
           <a:xfrm rot="16200000" flipH="1">
-            <a:off x="542753" y="5244741"/>
+            <a:off x="542753" y="5139684"/>
             <a:ext cx="1000522" cy="6245"/>
           </a:xfrm>
           <a:prstGeom prst="curvedConnector3">
@@ -4716,8 +4246,8 @@
         </p:nvSpPr>
         <p:spPr>
           <a:xfrm>
-            <a:off x="3595169" y="4861399"/>
-            <a:ext cx="992579" cy="600164"/>
+            <a:off x="4042639" y="4756342"/>
+            <a:ext cx="1937924" cy="600164"/>
           </a:xfrm>
           <a:prstGeom prst="rect">
             <a:avLst/>
@@ -4725,7 +4255,7 @@
           <a:noFill/>
         </p:spPr>
         <p:txBody>
-          <a:bodyPr wrap="none" rtlCol="0">
+          <a:bodyPr wrap="square" rtlCol="0">
             <a:spAutoFit/>
           </a:bodyPr>
           <a:lstStyle/>
@@ -4739,7 +4269,7 @@
                   </a:schemeClr>
                 </a:solidFill>
               </a:rPr>
-              <a:t>broadcast</a:t>
+              <a:t>Broadcast</a:t>
             </a:r>
             <a:br>
               <a:rPr lang="en-GB" sz="1100" dirty="0">
@@ -4807,7 +4337,7 @@
         </p:nvSpPr>
         <p:spPr>
           <a:xfrm>
-            <a:off x="187163" y="5280388"/>
+            <a:off x="187163" y="5175331"/>
             <a:ext cx="840295" cy="430887"/>
           </a:xfrm>
           <a:prstGeom prst="rect">
@@ -4862,8 +4392,8 @@
         </p:nvSpPr>
         <p:spPr>
           <a:xfrm>
-            <a:off x="3767495" y="3236738"/>
-            <a:ext cx="647933" cy="553998"/>
+            <a:off x="4604493" y="3701335"/>
+            <a:ext cx="1132106" cy="830997"/>
           </a:xfrm>
           <a:prstGeom prst="rect">
             <a:avLst/>
@@ -4878,21 +4408,28 @@
           <a:p>
             <a:pPr algn="ctr"/>
             <a:r>
-              <a:rPr lang="en-GB" sz="1000" dirty="0"/>
+              <a:rPr lang="en-GB" sz="1200" dirty="0"/>
+              <a:t>Sub-executions</a:t>
+            </a:r>
+            <a:br>
+              <a:rPr lang="en-GB" sz="1200" dirty="0"/>
+            </a:br>
+            <a:r>
+              <a:rPr lang="en-GB" sz="1200" dirty="0"/>
               <a:t>via</a:t>
             </a:r>
             <a:br>
-              <a:rPr lang="en-GB" sz="1000" dirty="0"/>
+              <a:rPr lang="en-GB" sz="1200" dirty="0"/>
             </a:br>
             <a:r>
-              <a:rPr lang="en-GB" sz="1000" dirty="0"/>
+              <a:rPr lang="en-GB" sz="1200" dirty="0"/>
               <a:t>Wrapper</a:t>
             </a:r>
             <a:br>
-              <a:rPr lang="en-GB" sz="1000" dirty="0"/>
+              <a:rPr lang="en-GB" sz="1200" dirty="0"/>
             </a:br>
             <a:r>
-              <a:rPr lang="en-GB" sz="1000" dirty="0"/>
+              <a:rPr lang="en-GB" sz="1200" dirty="0"/>
               <a:t>Factory</a:t>
             </a:r>
           </a:p>
@@ -4906,7 +4443,7 @@
         </p:nvCxnSpPr>
         <p:spPr>
           <a:xfrm flipH="1">
-            <a:off x="3478445" y="4547399"/>
+            <a:off x="3925915" y="4442342"/>
             <a:ext cx="2" cy="839974"/>
           </a:xfrm>
           <a:prstGeom prst="straightConnector1">
@@ -4937,24 +4474,131 @@
           </a:fontRef>
         </p:style>
       </p:cxnSp>
+      <p:sp>
+        <p:nvSpPr>
+          <p:cNvPr id="47" name="Rectangle 46"/>
+          <p:cNvSpPr/>
+          <p:nvPr/>
+        </p:nvSpPr>
+        <p:spPr>
+          <a:xfrm>
+            <a:off x="8296351" y="1035432"/>
+            <a:ext cx="1649759" cy="550678"/>
+          </a:xfrm>
+          <a:prstGeom prst="rect">
+            <a:avLst/>
+          </a:prstGeom>
+        </p:spPr>
+        <p:style>
+          <a:lnRef idx="1">
+            <a:schemeClr val="accent3"/>
+          </a:lnRef>
+          <a:fillRef idx="2">
+            <a:schemeClr val="accent3"/>
+          </a:fillRef>
+          <a:effectRef idx="1">
+            <a:schemeClr val="accent3"/>
+          </a:effectRef>
+          <a:fontRef idx="minor">
+            <a:schemeClr val="dk1"/>
+          </a:fontRef>
+        </p:style>
+        <p:txBody>
+          <a:bodyPr rtlCol="0" anchor="t" anchorCtr="0"/>
+          <a:lstStyle/>
+          <a:p>
+            <a:pPr algn="ctr"/>
+            <a:endParaRPr lang="en-GB" sz="1600" dirty="0">
+              <a:solidFill>
+                <a:schemeClr val="tx1"/>
+              </a:solidFill>
+            </a:endParaRPr>
+          </a:p>
+        </p:txBody>
+      </p:sp>
+      <p:sp>
+        <p:nvSpPr>
+          <p:cNvPr id="49" name="Rectangle 48"/>
+          <p:cNvSpPr/>
+          <p:nvPr/>
+        </p:nvSpPr>
+        <p:spPr>
+          <a:xfrm>
+            <a:off x="8220731" y="945852"/>
+            <a:ext cx="1649759" cy="550678"/>
+          </a:xfrm>
+          <a:prstGeom prst="rect">
+            <a:avLst/>
+          </a:prstGeom>
+        </p:spPr>
+        <p:style>
+          <a:lnRef idx="1">
+            <a:schemeClr val="accent3"/>
+          </a:lnRef>
+          <a:fillRef idx="2">
+            <a:schemeClr val="accent3"/>
+          </a:fillRef>
+          <a:effectRef idx="1">
+            <a:schemeClr val="accent3"/>
+          </a:effectRef>
+          <a:fontRef idx="minor">
+            <a:schemeClr val="dk1"/>
+          </a:fontRef>
+        </p:style>
+        <p:txBody>
+          <a:bodyPr rtlCol="0" anchor="t" anchorCtr="0"/>
+          <a:lstStyle/>
+          <a:p>
+            <a:pPr algn="ctr"/>
+            <a:r>
+              <a:rPr lang="en-GB" sz="1600" dirty="0" err="1">
+                <a:solidFill>
+                  <a:schemeClr val="tx1"/>
+                </a:solidFill>
+              </a:rPr>
+              <a:t>AuditerService</a:t>
+            </a:r>
+            <a:endParaRPr lang="en-GB" sz="1600" dirty="0">
+              <a:solidFill>
+                <a:schemeClr val="tx1"/>
+              </a:solidFill>
+            </a:endParaRPr>
+          </a:p>
+          <a:p>
+            <a:pPr algn="ctr"/>
+            <a:r>
+              <a:rPr lang="en-GB" sz="1600" dirty="0">
+                <a:solidFill>
+                  <a:schemeClr val="tx1"/>
+                </a:solidFill>
+              </a:rPr>
+              <a:t>SPI</a:t>
+            </a:r>
+          </a:p>
+        </p:txBody>
+      </p:sp>
       <p:cxnSp>
         <p:nvCxnSpPr>
-          <p:cNvPr id="121" name="Straight Arrow Connector 120"/>
-          <p:cNvCxnSpPr/>
+          <p:cNvPr id="50" name="Curved Connector 49"/>
+          <p:cNvCxnSpPr>
+            <a:cxnSpLocks/>
+            <a:stCxn id="101" idx="3"/>
+            <a:endCxn id="49" idx="0"/>
+          </p:cNvCxnSpPr>
           <p:nvPr/>
         </p:nvCxnSpPr>
         <p:spPr>
-          <a:xfrm flipH="1">
-            <a:off x="5532719" y="4297557"/>
-            <a:ext cx="1" cy="1088952"/>
-          </a:xfrm>
-          <a:prstGeom prst="straightConnector1">
+          <a:xfrm>
+            <a:off x="7784510" y="548087"/>
+            <a:ext cx="1261101" cy="397765"/>
+          </a:xfrm>
+          <a:prstGeom prst="curvedConnector2">
             <a:avLst/>
           </a:prstGeom>
           <a:ln w="19050">
             <a:solidFill>
-              <a:schemeClr val="bg1">
-                <a:lumMod val="50000"/>
+              <a:schemeClr val="accent4">
+                <a:lumMod val="75000"/>
               </a:schemeClr>
             </a:solidFill>
             <a:prstDash val="sysDash"/>
@@ -4976,25 +4620,28 @@
           </a:fontRef>
         </p:style>
       </p:cxnSp>
-      <p:cxnSp>
-        <p:nvCxnSpPr>
-          <p:cNvPr id="122" name="Straight Arrow Connector 121"/>
-          <p:cNvCxnSpPr/>
+      <p:sp>
+        <p:nvSpPr>
+          <p:cNvPr id="9" name="Arrow: Curved Up 8">
+            <a:extLst>
+              <a:ext uri="{FF2B5EF4-FFF2-40B4-BE49-F238E27FC236}">
+                <a16:creationId xmlns:a16="http://schemas.microsoft.com/office/drawing/2014/main" id="{C6FB575C-9827-44BA-8A22-3F93822FC1F9}"/>
+              </a:ext>
+            </a:extLst>
+          </p:cNvPr>
+          <p:cNvSpPr/>
           <p:nvPr/>
-        </p:nvCxnSpPr>
-        <p:spPr>
-          <a:xfrm flipV="1">
-            <a:off x="263471" y="119725"/>
-            <a:ext cx="5683851" cy="7749"/>
-          </a:xfrm>
-          <a:prstGeom prst="straightConnector1">
+        </p:nvSpPr>
+        <p:spPr>
+          <a:xfrm rot="5400000" flipV="1">
+            <a:off x="3855784" y="3130837"/>
+            <a:ext cx="1127200" cy="694354"/>
+          </a:xfrm>
+          <a:prstGeom prst="curvedUpArrow">
             <a:avLst/>
           </a:prstGeom>
-          <a:ln>
-            <a:solidFill>
-              <a:schemeClr val="tx1"/>
-            </a:solidFill>
-            <a:prstDash val="lgDash"/>
+          <a:ln w="22225">
+            <a:prstDash val="sysDash"/>
             <a:tailEnd type="triangle"/>
           </a:ln>
         </p:spPr>
@@ -5012,288 +4659,19 @@
             <a:schemeClr val="tx1"/>
           </a:fontRef>
         </p:style>
-      </p:cxnSp>
-      <p:sp>
-        <p:nvSpPr>
-          <p:cNvPr id="123" name="TextBox 122"/>
-          <p:cNvSpPr txBox="1"/>
-          <p:nvPr/>
-        </p:nvSpPr>
-        <p:spPr>
-          <a:xfrm>
-            <a:off x="160946" y="119725"/>
-            <a:ext cx="495649" cy="276999"/>
-          </a:xfrm>
-          <a:prstGeom prst="rect">
-            <a:avLst/>
-          </a:prstGeom>
-          <a:noFill/>
-        </p:spPr>
-        <p:txBody>
-          <a:bodyPr wrap="none" rtlCol="0">
-            <a:spAutoFit/>
-          </a:bodyPr>
-          <a:lstStyle/>
-          <a:p>
-            <a:r>
-              <a:rPr lang="en-GB" sz="1200" dirty="0"/>
-              <a:t>Time</a:t>
-            </a:r>
-          </a:p>
-        </p:txBody>
-      </p:sp>
-      <p:sp>
-        <p:nvSpPr>
-          <p:cNvPr id="44" name="Rectangle 43"/>
-          <p:cNvSpPr/>
-          <p:nvPr/>
-        </p:nvSpPr>
-        <p:spPr>
-          <a:xfrm>
-            <a:off x="8220731" y="2117871"/>
-            <a:ext cx="1649759" cy="550678"/>
-          </a:xfrm>
-          <a:prstGeom prst="rect">
-            <a:avLst/>
-          </a:prstGeom>
-        </p:spPr>
-        <p:style>
-          <a:lnRef idx="1">
-            <a:schemeClr val="accent3"/>
-          </a:lnRef>
-          <a:fillRef idx="2">
-            <a:schemeClr val="accent3"/>
-          </a:fillRef>
-          <a:effectRef idx="1">
-            <a:schemeClr val="accent3"/>
-          </a:effectRef>
-          <a:fontRef idx="minor">
-            <a:schemeClr val="dk1"/>
-          </a:fontRef>
-        </p:style>
-        <p:txBody>
-          <a:bodyPr rtlCol="0" anchor="t" anchorCtr="0"/>
+        <p:txBody>
+          <a:bodyPr rtlCol="0" anchor="ctr"/>
           <a:lstStyle/>
           <a:p>
             <a:pPr algn="ctr"/>
-            <a:r>
-              <a:rPr lang="en-GB" sz="1600" dirty="0" err="1">
-                <a:solidFill>
-                  <a:schemeClr val="tx1"/>
-                </a:solidFill>
-              </a:rPr>
-              <a:t>PublishingService</a:t>
-            </a:r>
-            <a:endParaRPr lang="en-GB" sz="1600" dirty="0">
+            <a:endParaRPr lang="en-GB">
               <a:solidFill>
                 <a:schemeClr val="tx1"/>
               </a:solidFill>
             </a:endParaRPr>
           </a:p>
-          <a:p>
-            <a:pPr algn="ctr"/>
-            <a:r>
-              <a:rPr lang="en-GB" sz="1600" dirty="0">
-                <a:solidFill>
-                  <a:schemeClr val="tx1"/>
-                </a:solidFill>
-              </a:rPr>
-              <a:t>SPI</a:t>
-            </a:r>
-          </a:p>
-        </p:txBody>
-      </p:sp>
-      <p:cxnSp>
-        <p:nvCxnSpPr>
-          <p:cNvPr id="45" name="Curved Connector 44"/>
-          <p:cNvCxnSpPr>
-            <a:stCxn id="100" idx="3"/>
-            <a:endCxn id="44" idx="1"/>
-          </p:cNvCxnSpPr>
-          <p:nvPr/>
-        </p:nvCxnSpPr>
-        <p:spPr>
-          <a:xfrm>
-            <a:off x="7719833" y="2377162"/>
-            <a:ext cx="500898" cy="16048"/>
-          </a:xfrm>
-          <a:prstGeom prst="curvedConnector3">
-            <a:avLst>
-              <a:gd name="adj1" fmla="val 50000"/>
-            </a:avLst>
-          </a:prstGeom>
-          <a:ln w="19050">
-            <a:solidFill>
-              <a:schemeClr val="accent2">
-                <a:lumMod val="75000"/>
-              </a:schemeClr>
-            </a:solidFill>
-            <a:prstDash val="sysDash"/>
-            <a:tailEnd type="triangle"/>
-          </a:ln>
-        </p:spPr>
-        <p:style>
-          <a:lnRef idx="1">
-            <a:schemeClr val="accent1"/>
-          </a:lnRef>
-          <a:fillRef idx="0">
-            <a:schemeClr val="accent1"/>
-          </a:fillRef>
-          <a:effectRef idx="0">
-            <a:schemeClr val="accent1"/>
-          </a:effectRef>
-          <a:fontRef idx="minor">
-            <a:schemeClr val="tx1"/>
-          </a:fontRef>
-        </p:style>
-      </p:cxnSp>
-      <p:sp>
-        <p:nvSpPr>
-          <p:cNvPr id="47" name="Rectangle 46"/>
-          <p:cNvSpPr/>
-          <p:nvPr/>
-        </p:nvSpPr>
-        <p:spPr>
-          <a:xfrm>
-            <a:off x="8296351" y="875901"/>
-            <a:ext cx="1649759" cy="550678"/>
-          </a:xfrm>
-          <a:prstGeom prst="rect">
-            <a:avLst/>
-          </a:prstGeom>
-        </p:spPr>
-        <p:style>
-          <a:lnRef idx="1">
-            <a:schemeClr val="accent3"/>
-          </a:lnRef>
-          <a:fillRef idx="2">
-            <a:schemeClr val="accent3"/>
-          </a:fillRef>
-          <a:effectRef idx="1">
-            <a:schemeClr val="accent3"/>
-          </a:effectRef>
-          <a:fontRef idx="minor">
-            <a:schemeClr val="dk1"/>
-          </a:fontRef>
-        </p:style>
-        <p:txBody>
-          <a:bodyPr rtlCol="0" anchor="t" anchorCtr="0"/>
-          <a:lstStyle/>
-          <a:p>
-            <a:pPr algn="ctr"/>
-            <a:endParaRPr lang="en-GB" sz="1600" dirty="0">
-              <a:solidFill>
-                <a:schemeClr val="tx1"/>
-              </a:solidFill>
-            </a:endParaRPr>
-          </a:p>
-        </p:txBody>
-      </p:sp>
-      <p:sp>
-        <p:nvSpPr>
-          <p:cNvPr id="49" name="Rectangle 48"/>
-          <p:cNvSpPr/>
-          <p:nvPr/>
-        </p:nvSpPr>
-        <p:spPr>
-          <a:xfrm>
-            <a:off x="8220731" y="786321"/>
-            <a:ext cx="1649759" cy="550678"/>
-          </a:xfrm>
-          <a:prstGeom prst="rect">
-            <a:avLst/>
-          </a:prstGeom>
-        </p:spPr>
-        <p:style>
-          <a:lnRef idx="1">
-            <a:schemeClr val="accent3"/>
-          </a:lnRef>
-          <a:fillRef idx="2">
-            <a:schemeClr val="accent3"/>
-          </a:fillRef>
-          <a:effectRef idx="1">
-            <a:schemeClr val="accent3"/>
-          </a:effectRef>
-          <a:fontRef idx="minor">
-            <a:schemeClr val="dk1"/>
-          </a:fontRef>
-        </p:style>
-        <p:txBody>
-          <a:bodyPr rtlCol="0" anchor="t" anchorCtr="0"/>
-          <a:lstStyle/>
-          <a:p>
-            <a:pPr algn="ctr"/>
-            <a:r>
-              <a:rPr lang="en-GB" sz="1600" dirty="0" err="1">
-                <a:solidFill>
-                  <a:schemeClr val="tx1"/>
-                </a:solidFill>
-              </a:rPr>
-              <a:t>AuditerService</a:t>
-            </a:r>
-            <a:endParaRPr lang="en-GB" sz="1600" dirty="0">
-              <a:solidFill>
-                <a:schemeClr val="tx1"/>
-              </a:solidFill>
-            </a:endParaRPr>
-          </a:p>
-          <a:p>
-            <a:pPr algn="ctr"/>
-            <a:r>
-              <a:rPr lang="en-GB" sz="1600" dirty="0">
-                <a:solidFill>
-                  <a:schemeClr val="tx1"/>
-                </a:solidFill>
-              </a:rPr>
-              <a:t>SPI</a:t>
-            </a:r>
-          </a:p>
-        </p:txBody>
-      </p:sp>
-      <p:cxnSp>
-        <p:nvCxnSpPr>
-          <p:cNvPr id="50" name="Curved Connector 49"/>
-          <p:cNvCxnSpPr>
-            <a:stCxn id="101" idx="3"/>
-            <a:endCxn id="49" idx="1"/>
-          </p:cNvCxnSpPr>
-          <p:nvPr/>
-        </p:nvCxnSpPr>
-        <p:spPr>
-          <a:xfrm>
-            <a:off x="7784510" y="388556"/>
-            <a:ext cx="436221" cy="673104"/>
-          </a:xfrm>
-          <a:prstGeom prst="curvedConnector3">
-            <a:avLst>
-              <a:gd name="adj1" fmla="val 50000"/>
-            </a:avLst>
-          </a:prstGeom>
-          <a:ln w="19050">
-            <a:solidFill>
-              <a:schemeClr val="accent4">
-                <a:lumMod val="75000"/>
-              </a:schemeClr>
-            </a:solidFill>
-            <a:prstDash val="sysDash"/>
-            <a:tailEnd type="triangle"/>
-          </a:ln>
-        </p:spPr>
-        <p:style>
-          <a:lnRef idx="1">
-            <a:schemeClr val="accent1"/>
-          </a:lnRef>
-          <a:fillRef idx="0">
-            <a:schemeClr val="accent1"/>
-          </a:fillRef>
-          <a:effectRef idx="0">
-            <a:schemeClr val="accent1"/>
-          </a:effectRef>
-          <a:fontRef idx="minor">
-            <a:schemeClr val="tx1"/>
-          </a:fontRef>
-        </p:style>
-      </p:cxnSp>
+        </p:txBody>
+      </p:sp>
     </p:spTree>
     <p:extLst>
       <p:ext uri="{BB962C8B-B14F-4D97-AF65-F5344CB8AC3E}">

</xml_diff>

<commit_message>
ISIS-2222: improving command docs.
</commit_message>
<xml_diff>
--- a/api/applib/src/main/adoc/modules/applib-svc/images/reference-services/commands-and-events.pptx
+++ b/api/applib/src/main/adoc/modules/applib-svc/images/reference-services/commands-and-events.pptx
@@ -243,7 +243,7 @@
           <a:p>
             <a:fld id="{F855B3F0-BB84-4743-96EB-565470B6C0EB}" type="datetimeFigureOut">
               <a:rPr lang="en-GB" smtClean="0"/>
-              <a:t>21/02/2020</a:t>
+              <a:t>20/09/2020</a:t>
             </a:fld>
             <a:endParaRPr lang="en-GB"/>
           </a:p>
@@ -413,7 +413,7 @@
           <a:p>
             <a:fld id="{F855B3F0-BB84-4743-96EB-565470B6C0EB}" type="datetimeFigureOut">
               <a:rPr lang="en-GB" smtClean="0"/>
-              <a:t>21/02/2020</a:t>
+              <a:t>20/09/2020</a:t>
             </a:fld>
             <a:endParaRPr lang="en-GB"/>
           </a:p>
@@ -593,7 +593,7 @@
           <a:p>
             <a:fld id="{F855B3F0-BB84-4743-96EB-565470B6C0EB}" type="datetimeFigureOut">
               <a:rPr lang="en-GB" smtClean="0"/>
-              <a:t>21/02/2020</a:t>
+              <a:t>20/09/2020</a:t>
             </a:fld>
             <a:endParaRPr lang="en-GB"/>
           </a:p>
@@ -763,7 +763,7 @@
           <a:p>
             <a:fld id="{F855B3F0-BB84-4743-96EB-565470B6C0EB}" type="datetimeFigureOut">
               <a:rPr lang="en-GB" smtClean="0"/>
-              <a:t>21/02/2020</a:t>
+              <a:t>20/09/2020</a:t>
             </a:fld>
             <a:endParaRPr lang="en-GB"/>
           </a:p>
@@ -1009,7 +1009,7 @@
           <a:p>
             <a:fld id="{F855B3F0-BB84-4743-96EB-565470B6C0EB}" type="datetimeFigureOut">
               <a:rPr lang="en-GB" smtClean="0"/>
-              <a:t>21/02/2020</a:t>
+              <a:t>20/09/2020</a:t>
             </a:fld>
             <a:endParaRPr lang="en-GB"/>
           </a:p>
@@ -1241,7 +1241,7 @@
           <a:p>
             <a:fld id="{F855B3F0-BB84-4743-96EB-565470B6C0EB}" type="datetimeFigureOut">
               <a:rPr lang="en-GB" smtClean="0"/>
-              <a:t>21/02/2020</a:t>
+              <a:t>20/09/2020</a:t>
             </a:fld>
             <a:endParaRPr lang="en-GB"/>
           </a:p>
@@ -1608,7 +1608,7 @@
           <a:p>
             <a:fld id="{F855B3F0-BB84-4743-96EB-565470B6C0EB}" type="datetimeFigureOut">
               <a:rPr lang="en-GB" smtClean="0"/>
-              <a:t>21/02/2020</a:t>
+              <a:t>20/09/2020</a:t>
             </a:fld>
             <a:endParaRPr lang="en-GB"/>
           </a:p>
@@ -1726,7 +1726,7 @@
           <a:p>
             <a:fld id="{F855B3F0-BB84-4743-96EB-565470B6C0EB}" type="datetimeFigureOut">
               <a:rPr lang="en-GB" smtClean="0"/>
-              <a:t>21/02/2020</a:t>
+              <a:t>20/09/2020</a:t>
             </a:fld>
             <a:endParaRPr lang="en-GB"/>
           </a:p>
@@ -1821,7 +1821,7 @@
           <a:p>
             <a:fld id="{F855B3F0-BB84-4743-96EB-565470B6C0EB}" type="datetimeFigureOut">
               <a:rPr lang="en-GB" smtClean="0"/>
-              <a:t>21/02/2020</a:t>
+              <a:t>20/09/2020</a:t>
             </a:fld>
             <a:endParaRPr lang="en-GB"/>
           </a:p>
@@ -2098,7 +2098,7 @@
           <a:p>
             <a:fld id="{F855B3F0-BB84-4743-96EB-565470B6C0EB}" type="datetimeFigureOut">
               <a:rPr lang="en-GB" smtClean="0"/>
-              <a:t>21/02/2020</a:t>
+              <a:t>20/09/2020</a:t>
             </a:fld>
             <a:endParaRPr lang="en-GB"/>
           </a:p>
@@ -2355,7 +2355,7 @@
           <a:p>
             <a:fld id="{F855B3F0-BB84-4743-96EB-565470B6C0EB}" type="datetimeFigureOut">
               <a:rPr lang="en-GB" smtClean="0"/>
-              <a:t>21/02/2020</a:t>
+              <a:t>20/09/2020</a:t>
             </a:fld>
             <a:endParaRPr lang="en-GB"/>
           </a:p>
@@ -2568,7 +2568,7 @@
           <a:p>
             <a:fld id="{F855B3F0-BB84-4743-96EB-565470B6C0EB}" type="datetimeFigureOut">
               <a:rPr lang="en-GB" smtClean="0"/>
-              <a:t>21/02/2020</a:t>
+              <a:t>20/09/2020</a:t>
             </a:fld>
             <a:endParaRPr lang="en-GB"/>
           </a:p>
@@ -2981,7 +2981,7 @@
         </p:nvSpPr>
         <p:spPr>
           <a:xfrm>
-            <a:off x="8296353" y="3188643"/>
+            <a:off x="8191296" y="3795646"/>
             <a:ext cx="1649759" cy="550678"/>
           </a:xfrm>
           <a:prstGeom prst="rect">
@@ -3023,7 +3023,7 @@
         </p:nvSpPr>
         <p:spPr>
           <a:xfrm>
-            <a:off x="2002634" y="5145084"/>
+            <a:off x="2002634" y="5121738"/>
             <a:ext cx="3944691" cy="1048662"/>
           </a:xfrm>
           <a:prstGeom prst="rect">
@@ -3032,13 +3032,13 @@
         </p:spPr>
         <p:style>
           <a:lnRef idx="1">
-            <a:schemeClr val="accent3"/>
+            <a:schemeClr val="accent5"/>
           </a:lnRef>
           <a:fillRef idx="2">
-            <a:schemeClr val="accent3"/>
+            <a:schemeClr val="accent5"/>
           </a:fillRef>
           <a:effectRef idx="1">
-            <a:schemeClr val="accent3"/>
+            <a:schemeClr val="accent5"/>
           </a:effectRef>
           <a:fontRef idx="minor">
             <a:schemeClr val="dk1"/>
@@ -3073,8 +3073,8 @@
         </p:nvSpPr>
         <p:spPr>
           <a:xfrm>
-            <a:off x="2233446" y="1963584"/>
-            <a:ext cx="3569661" cy="2678962"/>
+            <a:off x="2233446" y="1871632"/>
+            <a:ext cx="3569661" cy="2607492"/>
           </a:xfrm>
           <a:prstGeom prst="rect">
             <a:avLst/>
@@ -3117,8 +3117,8 @@
         </p:nvSpPr>
         <p:spPr>
           <a:xfrm>
-            <a:off x="335440" y="1963584"/>
-            <a:ext cx="1408904" cy="2678962"/>
+            <a:off x="335440" y="1871632"/>
+            <a:ext cx="1408904" cy="2607491"/>
           </a:xfrm>
           <a:prstGeom prst="rect">
             <a:avLst/>
@@ -3186,7 +3186,7 @@
         </p:nvSpPr>
         <p:spPr>
           <a:xfrm>
-            <a:off x="2900657" y="2411922"/>
+            <a:off x="2900657" y="2248500"/>
             <a:ext cx="1116419" cy="2029047"/>
           </a:xfrm>
           <a:prstGeom prst="rect">
@@ -3262,7 +3262,7 @@
         </p:nvSpPr>
         <p:spPr>
           <a:xfrm>
-            <a:off x="2900655" y="5280943"/>
+            <a:off x="2900655" y="5257597"/>
             <a:ext cx="1116419" cy="522347"/>
           </a:xfrm>
           <a:prstGeom prst="rect">
@@ -3312,7 +3312,7 @@
         </p:nvSpPr>
         <p:spPr>
           <a:xfrm>
-            <a:off x="2013706" y="315219"/>
+            <a:off x="2013706" y="151797"/>
             <a:ext cx="3933616" cy="1005107"/>
           </a:xfrm>
           <a:prstGeom prst="rect">
@@ -3360,13 +3360,15 @@
       <p:cxnSp>
         <p:nvCxnSpPr>
           <p:cNvPr id="92" name="Straight Arrow Connector 91"/>
-          <p:cNvCxnSpPr/>
+          <p:cNvCxnSpPr>
+            <a:cxnSpLocks/>
+          </p:cNvCxnSpPr>
           <p:nvPr/>
         </p:nvCxnSpPr>
         <p:spPr>
           <a:xfrm flipH="1">
-            <a:off x="3047154" y="4413680"/>
-            <a:ext cx="2" cy="839974"/>
+            <a:off x="3031678" y="4250258"/>
+            <a:ext cx="15478" cy="1007339"/>
           </a:xfrm>
           <a:prstGeom prst="straightConnector1">
             <a:avLst/>
@@ -3404,7 +3406,7 @@
         </p:nvSpPr>
         <p:spPr>
           <a:xfrm>
-            <a:off x="2453183" y="684352"/>
+            <a:off x="2453183" y="520930"/>
             <a:ext cx="3178477" cy="467623"/>
           </a:xfrm>
           <a:prstGeom prst="rect">
@@ -3450,7 +3452,7 @@
         </p:nvCxnSpPr>
         <p:spPr>
           <a:xfrm flipH="1" flipV="1">
-            <a:off x="3458864" y="1173309"/>
+            <a:off x="3458864" y="1009887"/>
             <a:ext cx="3" cy="1238610"/>
           </a:xfrm>
           <a:prstGeom prst="straightConnector1">
@@ -3490,7 +3492,7 @@
         </p:nvSpPr>
         <p:spPr>
           <a:xfrm>
-            <a:off x="3453351" y="1298139"/>
+            <a:off x="3453351" y="1134717"/>
             <a:ext cx="2141933" cy="261610"/>
           </a:xfrm>
           <a:prstGeom prst="rect">
@@ -3523,7 +3525,7 @@
         </p:nvSpPr>
         <p:spPr>
           <a:xfrm>
-            <a:off x="2013708" y="1595876"/>
+            <a:off x="2013708" y="1432454"/>
             <a:ext cx="3933617" cy="3174087"/>
           </a:xfrm>
           <a:prstGeom prst="rect">
@@ -3575,7 +3577,7 @@
         </p:nvSpPr>
         <p:spPr>
           <a:xfrm>
-            <a:off x="6150645" y="2286384"/>
+            <a:off x="6150645" y="2741638"/>
             <a:ext cx="1696533" cy="600163"/>
           </a:xfrm>
           <a:prstGeom prst="rect">
@@ -3639,7 +3641,7 @@
         </p:nvSpPr>
         <p:spPr>
           <a:xfrm>
-            <a:off x="6150646" y="272748"/>
+            <a:off x="6150646" y="109326"/>
             <a:ext cx="1633864" cy="550678"/>
           </a:xfrm>
           <a:prstGeom prst="rect">
@@ -3703,7 +3705,7 @@
         </p:nvSpPr>
         <p:spPr>
           <a:xfrm>
-            <a:off x="8220733" y="3099063"/>
+            <a:off x="8115676" y="3706066"/>
             <a:ext cx="1649759" cy="550678"/>
           </a:xfrm>
           <a:prstGeom prst="rect">
@@ -3756,62 +3758,6 @@
           </a:p>
         </p:txBody>
       </p:sp>
-      <p:sp>
-        <p:nvSpPr>
-          <p:cNvPr id="103" name="Rectangle 102"/>
-          <p:cNvSpPr/>
-          <p:nvPr/>
-        </p:nvSpPr>
-        <p:spPr>
-          <a:xfrm>
-            <a:off x="197299" y="1595876"/>
-            <a:ext cx="1697674" cy="3174087"/>
-          </a:xfrm>
-          <a:prstGeom prst="rect">
-            <a:avLst/>
-          </a:prstGeom>
-          <a:noFill/>
-        </p:spPr>
-        <p:style>
-          <a:lnRef idx="2">
-            <a:schemeClr val="accent1">
-              <a:shade val="50000"/>
-            </a:schemeClr>
-          </a:lnRef>
-          <a:fillRef idx="1">
-            <a:schemeClr val="accent1"/>
-          </a:fillRef>
-          <a:effectRef idx="0">
-            <a:schemeClr val="accent1"/>
-          </a:effectRef>
-          <a:fontRef idx="minor">
-            <a:schemeClr val="lt1"/>
-          </a:fontRef>
-        </p:style>
-        <p:txBody>
-          <a:bodyPr rtlCol="0" anchor="t" anchorCtr="0"/>
-          <a:lstStyle/>
-          <a:p>
-            <a:r>
-              <a:rPr lang="en-GB" sz="1600" dirty="0" err="1">
-                <a:solidFill>
-                  <a:schemeClr val="bg1">
-                    <a:lumMod val="50000"/>
-                  </a:schemeClr>
-                </a:solidFill>
-              </a:rPr>
-              <a:t>CommandContext</a:t>
-            </a:r>
-            <a:endParaRPr lang="en-GB" sz="1600" dirty="0">
-              <a:solidFill>
-                <a:schemeClr val="bg1">
-                  <a:lumMod val="50000"/>
-                </a:schemeClr>
-              </a:solidFill>
-            </a:endParaRPr>
-          </a:p>
-        </p:txBody>
-      </p:sp>
       <p:cxnSp>
         <p:nvCxnSpPr>
           <p:cNvPr id="105" name="Curved Connector 104"/>
@@ -3822,9 +3768,9 @@
           <p:nvPr/>
         </p:nvCxnSpPr>
         <p:spPr>
-          <a:xfrm flipV="1">
-            <a:off x="4072207" y="2586466"/>
-            <a:ext cx="2078438" cy="128713"/>
+          <a:xfrm>
+            <a:off x="4072207" y="2428945"/>
+            <a:ext cx="2078438" cy="612775"/>
           </a:xfrm>
           <a:prstGeom prst="curvedConnector3">
             <a:avLst>
@@ -3861,14 +3807,13 @@
           <p:cNvPr id="107" name="Curved Connector 106"/>
           <p:cNvCxnSpPr>
             <a:cxnSpLocks/>
-            <a:endCxn id="100" idx="0"/>
           </p:cNvCxnSpPr>
           <p:nvPr/>
         </p:nvCxnSpPr>
         <p:spPr>
           <a:xfrm>
-            <a:off x="5627771" y="1336706"/>
-            <a:ext cx="1371141" cy="949678"/>
+            <a:off x="5631660" y="840344"/>
+            <a:ext cx="1367252" cy="1936313"/>
           </a:xfrm>
           <a:prstGeom prst="curvedConnector2">
             <a:avLst/>
@@ -3906,7 +3851,7 @@
         </p:nvSpPr>
         <p:spPr>
           <a:xfrm>
-            <a:off x="6049064" y="2946179"/>
+            <a:off x="6049064" y="3401433"/>
             <a:ext cx="1494320" cy="600164"/>
           </a:xfrm>
           <a:prstGeom prst="rect">
@@ -3966,7 +3911,7 @@
         </p:nvSpPr>
         <p:spPr>
           <a:xfrm>
-            <a:off x="6876315" y="1719173"/>
+            <a:off x="6965808" y="2178318"/>
             <a:ext cx="1721946" cy="430887"/>
           </a:xfrm>
           <a:prstGeom prst="rect">
@@ -4016,7 +3961,7 @@
         </p:nvCxnSpPr>
         <p:spPr>
           <a:xfrm flipV="1">
-            <a:off x="5631660" y="823426"/>
+            <a:off x="5631660" y="660004"/>
             <a:ext cx="1335918" cy="94738"/>
           </a:xfrm>
           <a:prstGeom prst="curvedConnector2">
@@ -4053,7 +3998,7 @@
         </p:nvSpPr>
         <p:spPr>
           <a:xfrm>
-            <a:off x="6530010" y="977600"/>
+            <a:off x="6530010" y="814178"/>
             <a:ext cx="1515158" cy="430887"/>
           </a:xfrm>
           <a:prstGeom prst="rect">
@@ -4101,21 +4046,21 @@
         </p:nvSpPr>
         <p:spPr>
           <a:xfrm>
-            <a:off x="197299" y="5643068"/>
-            <a:ext cx="1697676" cy="550678"/>
+            <a:off x="197299" y="4802608"/>
+            <a:ext cx="1697676" cy="325817"/>
           </a:xfrm>
           <a:prstGeom prst="rect">
             <a:avLst/>
           </a:prstGeom>
         </p:spPr>
         <p:style>
-          <a:lnRef idx="1">
+          <a:lnRef idx="2">
             <a:schemeClr val="accent3"/>
           </a:lnRef>
-          <a:fillRef idx="2">
-            <a:schemeClr val="accent3"/>
+          <a:fillRef idx="1">
+            <a:schemeClr val="lt1"/>
           </a:fillRef>
-          <a:effectRef idx="1">
+          <a:effectRef idx="0">
             <a:schemeClr val="accent3"/>
           </a:effectRef>
           <a:fontRef idx="minor">
@@ -4135,21 +4080,11 @@
               </a:rPr>
               <a:t>CommandService</a:t>
             </a:r>
-            <a:br>
-              <a:rPr lang="en-GB" sz="1600" dirty="0">
-                <a:solidFill>
-                  <a:schemeClr val="tx1"/>
-                </a:solidFill>
-              </a:rPr>
-            </a:br>
-            <a:r>
-              <a:rPr lang="en-GB" sz="1600" dirty="0">
-                <a:solidFill>
-                  <a:schemeClr val="tx1"/>
-                </a:solidFill>
-              </a:rPr>
-              <a:t>SPI</a:t>
-            </a:r>
+            <a:endParaRPr lang="en-GB" sz="1600" dirty="0">
+              <a:solidFill>
+                <a:schemeClr val="tx1"/>
+              </a:solidFill>
+            </a:endParaRPr>
           </a:p>
         </p:txBody>
       </p:sp>
@@ -4165,8 +4100,8 @@
         </p:nvCxnSpPr>
         <p:spPr>
           <a:xfrm>
-            <a:off x="7847178" y="2586466"/>
-            <a:ext cx="1198435" cy="512597"/>
+            <a:off x="7847178" y="3041720"/>
+            <a:ext cx="1093378" cy="664346"/>
           </a:xfrm>
           <a:prstGeom prst="curvedConnector2">
             <a:avLst/>
@@ -4200,6 +4135,7 @@
         <p:nvCxnSpPr>
           <p:cNvPr id="116" name="Curved Connector 115"/>
           <p:cNvCxnSpPr>
+            <a:cxnSpLocks/>
             <a:stCxn id="85" idx="2"/>
             <a:endCxn id="112" idx="0"/>
           </p:cNvCxnSpPr>
@@ -4207,8 +4143,8 @@
         </p:nvCxnSpPr>
         <p:spPr>
           <a:xfrm rot="16200000" flipH="1">
-            <a:off x="542753" y="5139684"/>
-            <a:ext cx="1000522" cy="6245"/>
+            <a:off x="881272" y="4637742"/>
+            <a:ext cx="323485" cy="6245"/>
           </a:xfrm>
           <a:prstGeom prst="curvedConnector3">
             <a:avLst>
@@ -4246,8 +4182,8 @@
         </p:nvSpPr>
         <p:spPr>
           <a:xfrm>
-            <a:off x="4042639" y="4756342"/>
-            <a:ext cx="1937924" cy="600164"/>
+            <a:off x="4038747" y="4592920"/>
+            <a:ext cx="1965163" cy="461665"/>
           </a:xfrm>
           <a:prstGeom prst="rect">
             <a:avLst/>
@@ -4262,55 +4198,17 @@
           <a:p>
             <a:pPr algn="ctr"/>
             <a:r>
-              <a:rPr lang="en-GB" sz="1100" dirty="0">
+              <a:rPr lang="en-GB" sz="1200" dirty="0">
                 <a:solidFill>
                   <a:schemeClr val="bg1">
                     <a:lumMod val="50000"/>
                   </a:schemeClr>
                 </a:solidFill>
               </a:rPr>
-              <a:t>Broadcast</a:t>
-            </a:r>
-            <a:br>
-              <a:rPr lang="en-GB" sz="1100" dirty="0">
-                <a:solidFill>
-                  <a:schemeClr val="bg1">
-                    <a:lumMod val="50000"/>
-                  </a:schemeClr>
-                </a:solidFill>
-              </a:rPr>
-            </a:br>
-            <a:r>
-              <a:rPr lang="en-GB" sz="1100" dirty="0">
-                <a:solidFill>
-                  <a:schemeClr val="bg1">
-                    <a:lumMod val="50000"/>
-                  </a:schemeClr>
-                </a:solidFill>
-              </a:rPr>
-              <a:t>pre- and post-</a:t>
-            </a:r>
-            <a:br>
-              <a:rPr lang="en-GB" sz="1100" dirty="0">
-                <a:solidFill>
-                  <a:schemeClr val="bg1">
-                    <a:lumMod val="50000"/>
-                  </a:schemeClr>
-                </a:solidFill>
-              </a:rPr>
-            </a:br>
-            <a:r>
-              <a:rPr lang="en-GB" sz="1100" dirty="0">
-                <a:solidFill>
-                  <a:schemeClr val="bg1">
-                    <a:lumMod val="50000"/>
-                  </a:schemeClr>
-                </a:solidFill>
-              </a:rPr>
-              <a:t>via </a:t>
-            </a:r>
-            <a:r>
-              <a:rPr lang="en-GB" sz="1100" dirty="0" err="1">
+              <a:t>Broadcast pre- and post- events through </a:t>
+            </a:r>
+            <a:r>
+              <a:rPr lang="en-GB" sz="1200" dirty="0" err="1">
                 <a:solidFill>
                   <a:schemeClr val="bg1">
                     <a:lumMod val="50000"/>
@@ -4319,7 +4217,7 @@
               </a:rPr>
               <a:t>EventBus</a:t>
             </a:r>
-            <a:endParaRPr lang="en-GB" sz="1100" dirty="0">
+            <a:endParaRPr lang="en-GB" sz="1200" dirty="0">
               <a:solidFill>
                 <a:schemeClr val="bg1">
                   <a:lumMod val="50000"/>
@@ -4337,8 +4235,8 @@
         </p:nvSpPr>
         <p:spPr>
           <a:xfrm>
-            <a:off x="187163" y="5175331"/>
-            <a:ext cx="840295" cy="430887"/>
+            <a:off x="202396" y="5148098"/>
+            <a:ext cx="809837" cy="430887"/>
           </a:xfrm>
           <a:prstGeom prst="rect">
             <a:avLst/>
@@ -4360,7 +4258,7 @@
                   </a:schemeClr>
                 </a:solidFill>
               </a:rPr>
-              <a:t>Command</a:t>
+              <a:t>at end of</a:t>
             </a:r>
             <a:br>
               <a:rPr lang="en-GB" sz="1100" dirty="0">
@@ -4379,7 +4277,7 @@
                   </a:schemeClr>
                 </a:solidFill>
               </a:rPr>
-              <a:t>persistence</a:t>
+              <a:t>interaction</a:t>
             </a:r>
           </a:p>
         </p:txBody>
@@ -4392,7 +4290,7 @@
         </p:nvSpPr>
         <p:spPr>
           <a:xfrm>
-            <a:off x="4604493" y="3701335"/>
+            <a:off x="4604493" y="3537913"/>
             <a:ext cx="1132106" cy="830997"/>
           </a:xfrm>
           <a:prstGeom prst="rect">
@@ -4438,13 +4336,15 @@
       <p:cxnSp>
         <p:nvCxnSpPr>
           <p:cNvPr id="120" name="Straight Arrow Connector 119"/>
-          <p:cNvCxnSpPr/>
+          <p:cNvCxnSpPr>
+            <a:cxnSpLocks/>
+          </p:cNvCxnSpPr>
           <p:nvPr/>
         </p:nvCxnSpPr>
         <p:spPr>
-          <a:xfrm flipH="1">
-            <a:off x="3925915" y="4442342"/>
-            <a:ext cx="2" cy="839974"/>
+          <a:xfrm>
+            <a:off x="3925917" y="4278920"/>
+            <a:ext cx="0" cy="978677"/>
           </a:xfrm>
           <a:prstGeom prst="straightConnector1">
             <a:avLst/>
@@ -4482,7 +4382,7 @@
         </p:nvSpPr>
         <p:spPr>
           <a:xfrm>
-            <a:off x="8296351" y="1035432"/>
+            <a:off x="8296351" y="872010"/>
             <a:ext cx="1649759" cy="550678"/>
           </a:xfrm>
           <a:prstGeom prst="rect">
@@ -4524,7 +4424,7 @@
         </p:nvSpPr>
         <p:spPr>
           <a:xfrm>
-            <a:off x="8220731" y="945852"/>
+            <a:off x="8220731" y="782430"/>
             <a:ext cx="1649759" cy="550678"/>
           </a:xfrm>
           <a:prstGeom prst="rect">
@@ -4589,7 +4489,7 @@
         </p:nvCxnSpPr>
         <p:spPr>
           <a:xfrm>
-            <a:off x="7784510" y="548087"/>
+            <a:off x="7784510" y="384665"/>
             <a:ext cx="1261101" cy="397765"/>
           </a:xfrm>
           <a:prstGeom prst="curvedConnector2">
@@ -4634,7 +4534,7 @@
         </p:nvSpPr>
         <p:spPr>
           <a:xfrm rot="5400000" flipV="1">
-            <a:off x="3855784" y="3130837"/>
+            <a:off x="3855784" y="2967415"/>
             <a:ext cx="1127200" cy="694354"/>
           </a:xfrm>
           <a:prstGeom prst="curvedUpArrow">
@@ -4669,6 +4569,385 @@
                 <a:schemeClr val="tx1"/>
               </a:solidFill>
             </a:endParaRPr>
+          </a:p>
+        </p:txBody>
+      </p:sp>
+      <p:cxnSp>
+        <p:nvCxnSpPr>
+          <p:cNvPr id="37" name="Straight Arrow Connector 36">
+            <a:extLst>
+              <a:ext uri="{FF2B5EF4-FFF2-40B4-BE49-F238E27FC236}">
+                <a16:creationId xmlns:a16="http://schemas.microsoft.com/office/drawing/2014/main" id="{4156A9D6-50E4-40EC-AE2B-D57C97BF658E}"/>
+              </a:ext>
+            </a:extLst>
+          </p:cNvPr>
+          <p:cNvCxnSpPr>
+            <a:cxnSpLocks/>
+            <a:stCxn id="84" idx="1"/>
+            <a:endCxn id="85" idx="3"/>
+          </p:cNvCxnSpPr>
+          <p:nvPr/>
+        </p:nvCxnSpPr>
+        <p:spPr>
+          <a:xfrm flipH="1">
+            <a:off x="1744344" y="3175378"/>
+            <a:ext cx="489102" cy="0"/>
+          </a:xfrm>
+          <a:prstGeom prst="straightConnector1">
+            <a:avLst/>
+          </a:prstGeom>
+          <a:ln>
+            <a:tailEnd type="triangle"/>
+          </a:ln>
+        </p:spPr>
+        <p:style>
+          <a:lnRef idx="1">
+            <a:schemeClr val="accent1"/>
+          </a:lnRef>
+          <a:fillRef idx="0">
+            <a:schemeClr val="accent1"/>
+          </a:fillRef>
+          <a:effectRef idx="0">
+            <a:schemeClr val="accent1"/>
+          </a:effectRef>
+          <a:fontRef idx="minor">
+            <a:schemeClr val="tx1"/>
+          </a:fontRef>
+        </p:style>
+      </p:cxnSp>
+      <p:sp>
+        <p:nvSpPr>
+          <p:cNvPr id="14" name="Rectangle 13">
+            <a:extLst>
+              <a:ext uri="{FF2B5EF4-FFF2-40B4-BE49-F238E27FC236}">
+                <a16:creationId xmlns:a16="http://schemas.microsoft.com/office/drawing/2014/main" id="{DDED4A49-54C2-42DE-BE04-12AB3B8A98BE}"/>
+              </a:ext>
+            </a:extLst>
+          </p:cNvPr>
+          <p:cNvSpPr/>
+          <p:nvPr/>
+        </p:nvSpPr>
+        <p:spPr>
+          <a:xfrm>
+            <a:off x="186277" y="5597025"/>
+            <a:ext cx="1697676" cy="550678"/>
+          </a:xfrm>
+          <a:prstGeom prst="rect">
+            <a:avLst/>
+          </a:prstGeom>
+        </p:spPr>
+        <p:style>
+          <a:lnRef idx="1">
+            <a:schemeClr val="accent3"/>
+          </a:lnRef>
+          <a:fillRef idx="2">
+            <a:schemeClr val="accent3"/>
+          </a:fillRef>
+          <a:effectRef idx="1">
+            <a:schemeClr val="accent3"/>
+          </a:effectRef>
+          <a:fontRef idx="minor">
+            <a:schemeClr val="dk1"/>
+          </a:fontRef>
+        </p:style>
+        <p:txBody>
+          <a:bodyPr rtlCol="0" anchor="t" anchorCtr="0"/>
+          <a:lstStyle/>
+          <a:p>
+            <a:pPr algn="ctr"/>
+            <a:r>
+              <a:rPr lang="en-GB" sz="1600" dirty="0" err="1">
+                <a:solidFill>
+                  <a:schemeClr val="tx1"/>
+                </a:solidFill>
+              </a:rPr>
+              <a:t>CommandServiceListener</a:t>
+            </a:r>
+            <a:r>
+              <a:rPr lang="en-GB" sz="1600" dirty="0">
+                <a:solidFill>
+                  <a:schemeClr val="tx1"/>
+                </a:solidFill>
+              </a:rPr>
+              <a:t> SPI</a:t>
+            </a:r>
+          </a:p>
+        </p:txBody>
+      </p:sp>
+      <p:cxnSp>
+        <p:nvCxnSpPr>
+          <p:cNvPr id="52" name="Curved Connector 115">
+            <a:extLst>
+              <a:ext uri="{FF2B5EF4-FFF2-40B4-BE49-F238E27FC236}">
+                <a16:creationId xmlns:a16="http://schemas.microsoft.com/office/drawing/2014/main" id="{2CFCB57E-F6DA-4BE8-921B-190A5DEA4EAB}"/>
+              </a:ext>
+            </a:extLst>
+          </p:cNvPr>
+          <p:cNvCxnSpPr>
+            <a:cxnSpLocks/>
+            <a:endCxn id="14" idx="0"/>
+          </p:cNvCxnSpPr>
+          <p:nvPr/>
+        </p:nvCxnSpPr>
+        <p:spPr>
+          <a:xfrm rot="5400000">
+            <a:off x="813042" y="5370174"/>
+            <a:ext cx="448925" cy="4777"/>
+          </a:xfrm>
+          <a:prstGeom prst="curvedConnector3">
+            <a:avLst>
+              <a:gd name="adj1" fmla="val 50000"/>
+            </a:avLst>
+          </a:prstGeom>
+          <a:ln w="19050">
+            <a:solidFill>
+              <a:schemeClr val="accent3"/>
+            </a:solidFill>
+            <a:prstDash val="sysDash"/>
+            <a:tailEnd type="triangle"/>
+          </a:ln>
+        </p:spPr>
+        <p:style>
+          <a:lnRef idx="1">
+            <a:schemeClr val="accent1"/>
+          </a:lnRef>
+          <a:fillRef idx="0">
+            <a:schemeClr val="accent1"/>
+          </a:fillRef>
+          <a:effectRef idx="0">
+            <a:schemeClr val="accent1"/>
+          </a:effectRef>
+          <a:fontRef idx="minor">
+            <a:schemeClr val="tx1"/>
+          </a:fontRef>
+        </p:style>
+      </p:cxnSp>
+      <p:sp>
+        <p:nvSpPr>
+          <p:cNvPr id="4" name="Rectangle 3">
+            <a:extLst>
+              <a:ext uri="{FF2B5EF4-FFF2-40B4-BE49-F238E27FC236}">
+                <a16:creationId xmlns:a16="http://schemas.microsoft.com/office/drawing/2014/main" id="{C2AA3929-84C4-4905-AAAA-1BA8D338E88D}"/>
+              </a:ext>
+            </a:extLst>
+          </p:cNvPr>
+          <p:cNvSpPr/>
+          <p:nvPr/>
+        </p:nvSpPr>
+        <p:spPr>
+          <a:xfrm>
+            <a:off x="324864" y="244401"/>
+            <a:ext cx="1408904" cy="1076553"/>
+          </a:xfrm>
+          <a:prstGeom prst="rect">
+            <a:avLst/>
+          </a:prstGeom>
+        </p:spPr>
+        <p:style>
+          <a:lnRef idx="1">
+            <a:schemeClr val="dk1"/>
+          </a:lnRef>
+          <a:fillRef idx="2">
+            <a:schemeClr val="dk1"/>
+          </a:fillRef>
+          <a:effectRef idx="1">
+            <a:schemeClr val="dk1"/>
+          </a:effectRef>
+          <a:fontRef idx="minor">
+            <a:schemeClr val="dk1"/>
+          </a:fontRef>
+        </p:style>
+        <p:txBody>
+          <a:bodyPr rtlCol="0" anchor="ctr"/>
+          <a:lstStyle/>
+          <a:p>
+            <a:pPr algn="ctr"/>
+            <a:r>
+              <a:rPr lang="en-GB" sz="1600" dirty="0">
+                <a:solidFill>
+                  <a:schemeClr val="bg1"/>
+                </a:solidFill>
+              </a:rPr>
+              <a:t>Child</a:t>
+            </a:r>
+            <a:br>
+              <a:rPr lang="en-GB" sz="1600" dirty="0">
+                <a:solidFill>
+                  <a:schemeClr val="bg1"/>
+                </a:solidFill>
+              </a:rPr>
+            </a:br>
+            <a:r>
+              <a:rPr lang="en-GB" sz="1600" dirty="0">
+                <a:solidFill>
+                  <a:schemeClr val="bg1"/>
+                </a:solidFill>
+              </a:rPr>
+              <a:t>Command</a:t>
+            </a:r>
+          </a:p>
+        </p:txBody>
+      </p:sp>
+      <p:cxnSp>
+        <p:nvCxnSpPr>
+          <p:cNvPr id="41" name="Curved Connector 115">
+            <a:extLst>
+              <a:ext uri="{FF2B5EF4-FFF2-40B4-BE49-F238E27FC236}">
+                <a16:creationId xmlns:a16="http://schemas.microsoft.com/office/drawing/2014/main" id="{A293974D-69FA-49B5-8C57-6F6BC3C1AB62}"/>
+              </a:ext>
+            </a:extLst>
+          </p:cNvPr>
+          <p:cNvCxnSpPr>
+            <a:cxnSpLocks/>
+          </p:cNvCxnSpPr>
+          <p:nvPr/>
+        </p:nvCxnSpPr>
+        <p:spPr>
+          <a:xfrm rot="16200000" flipH="1">
+            <a:off x="881272" y="4672761"/>
+            <a:ext cx="323485" cy="6245"/>
+          </a:xfrm>
+          <a:prstGeom prst="curvedConnector3">
+            <a:avLst>
+              <a:gd name="adj1" fmla="val 50000"/>
+            </a:avLst>
+          </a:prstGeom>
+          <a:ln w="19050">
+            <a:solidFill>
+              <a:schemeClr val="accent3"/>
+            </a:solidFill>
+            <a:prstDash val="sysDash"/>
+            <a:tailEnd type="triangle"/>
+          </a:ln>
+        </p:spPr>
+        <p:style>
+          <a:lnRef idx="1">
+            <a:schemeClr val="accent1"/>
+          </a:lnRef>
+          <a:fillRef idx="0">
+            <a:schemeClr val="accent1"/>
+          </a:fillRef>
+          <a:effectRef idx="0">
+            <a:schemeClr val="accent1"/>
+          </a:effectRef>
+          <a:fontRef idx="minor">
+            <a:schemeClr val="tx1"/>
+          </a:fontRef>
+        </p:style>
+      </p:cxnSp>
+      <p:cxnSp>
+        <p:nvCxnSpPr>
+          <p:cNvPr id="42" name="Curved Connector 115">
+            <a:extLst>
+              <a:ext uri="{FF2B5EF4-FFF2-40B4-BE49-F238E27FC236}">
+                <a16:creationId xmlns:a16="http://schemas.microsoft.com/office/drawing/2014/main" id="{05B315D6-2B4A-428D-B416-B75119683065}"/>
+              </a:ext>
+            </a:extLst>
+          </p:cNvPr>
+          <p:cNvCxnSpPr>
+            <a:cxnSpLocks/>
+            <a:stCxn id="85" idx="0"/>
+            <a:endCxn id="4" idx="2"/>
+          </p:cNvCxnSpPr>
+          <p:nvPr/>
+        </p:nvCxnSpPr>
+        <p:spPr>
+          <a:xfrm rot="16200000" flipV="1">
+            <a:off x="759265" y="1591005"/>
+            <a:ext cx="550678" cy="10576"/>
+          </a:xfrm>
+          <a:prstGeom prst="curvedConnector3">
+            <a:avLst>
+              <a:gd name="adj1" fmla="val 50000"/>
+            </a:avLst>
+          </a:prstGeom>
+          <a:ln w="19050">
+            <a:solidFill>
+              <a:schemeClr val="tx1">
+                <a:lumMod val="50000"/>
+                <a:lumOff val="50000"/>
+              </a:schemeClr>
+            </a:solidFill>
+            <a:prstDash val="dashDot"/>
+            <a:tailEnd type="triangle"/>
+          </a:ln>
+        </p:spPr>
+        <p:style>
+          <a:lnRef idx="1">
+            <a:schemeClr val="accent1"/>
+          </a:lnRef>
+          <a:fillRef idx="0">
+            <a:schemeClr val="accent1"/>
+          </a:fillRef>
+          <a:effectRef idx="0">
+            <a:schemeClr val="accent1"/>
+          </a:effectRef>
+          <a:fontRef idx="minor">
+            <a:schemeClr val="tx1"/>
+          </a:fontRef>
+        </p:style>
+      </p:cxnSp>
+      <p:sp>
+        <p:nvSpPr>
+          <p:cNvPr id="7" name="TextBox 6">
+            <a:extLst>
+              <a:ext uri="{FF2B5EF4-FFF2-40B4-BE49-F238E27FC236}">
+                <a16:creationId xmlns:a16="http://schemas.microsoft.com/office/drawing/2014/main" id="{395A129D-08CA-4968-92A8-61E2392BFFE4}"/>
+              </a:ext>
+            </a:extLst>
+          </p:cNvPr>
+          <p:cNvSpPr txBox="1"/>
+          <p:nvPr/>
+        </p:nvSpPr>
+        <p:spPr>
+          <a:xfrm>
+            <a:off x="375186" y="1330813"/>
+            <a:ext cx="745718" cy="430887"/>
+          </a:xfrm>
+          <a:prstGeom prst="rect">
+            <a:avLst/>
+          </a:prstGeom>
+          <a:noFill/>
+        </p:spPr>
+        <p:txBody>
+          <a:bodyPr wrap="none" rtlCol="0">
+            <a:spAutoFit/>
+          </a:bodyPr>
+          <a:lstStyle/>
+          <a:p>
+            <a:pPr algn="ctr"/>
+            <a:r>
+              <a:rPr lang="en-GB" sz="1100" dirty="0">
+                <a:solidFill>
+                  <a:schemeClr val="tx1">
+                    <a:lumMod val="85000"/>
+                    <a:lumOff val="15000"/>
+                  </a:schemeClr>
+                </a:solidFill>
+              </a:rPr>
+              <a:t>async</a:t>
+            </a:r>
+            <a:br>
+              <a:rPr lang="en-GB" sz="1100" dirty="0">
+                <a:solidFill>
+                  <a:schemeClr val="tx1">
+                    <a:lumMod val="85000"/>
+                    <a:lumOff val="15000"/>
+                  </a:schemeClr>
+                </a:solidFill>
+              </a:rPr>
+            </a:br>
+            <a:r>
+              <a:rPr lang="en-GB" sz="1100" dirty="0">
+                <a:solidFill>
+                  <a:schemeClr val="tx1">
+                    <a:lumMod val="85000"/>
+                    <a:lumOff val="15000"/>
+                  </a:schemeClr>
+                </a:solidFill>
+              </a:rPr>
+              <a:t>execution</a:t>
+            </a:r>
           </a:p>
         </p:txBody>
       </p:sp>

</xml_diff>

<commit_message>
ISIS-2464: add more events to commands-and-events diagram
</commit_message>
<xml_diff>
--- a/api/applib/src/main/adoc/modules/applib-svc/images/reference-services/commands-and-events.pptx
+++ b/api/applib/src/main/adoc/modules/applib-svc/images/reference-services/commands-and-events.pptx
@@ -53,7 +53,7 @@
       </p:grpSpPr>
       <p:sp>
         <p:nvSpPr>
-          <p:cNvPr id="26" name="PlaceHolder 1"/>
+          <p:cNvPr id="21" name="PlaceHolder 1"/>
           <p:cNvSpPr>
             <a:spLocks noGrp="1"/>
           </p:cNvSpPr>
@@ -75,18 +75,16 @@
             <a:noAutofit/>
           </a:bodyPr>
           <a:p>
-            <a:endParaRPr b="0" lang="en-US" sz="1800" spc="-1" strike="noStrike">
-              <a:solidFill>
-                <a:srgbClr val="000000"/>
-              </a:solidFill>
-              <a:latin typeface="Calibri"/>
-            </a:endParaRPr>
-          </a:p>
-        </p:txBody>
-      </p:sp>
-      <p:sp>
-        <p:nvSpPr>
-          <p:cNvPr id="27" name="PlaceHolder 2"/>
+            <a:pPr algn="ctr"/>
+            <a:endParaRPr b="0" lang="en-US" sz="4400" spc="-1" strike="noStrike">
+              <a:latin typeface="Arial"/>
+            </a:endParaRPr>
+          </a:p>
+        </p:txBody>
+      </p:sp>
+      <p:sp>
+        <p:nvSpPr>
+          <p:cNvPr id="22" name="PlaceHolder 2"/>
           <p:cNvSpPr>
             <a:spLocks noGrp="1"/>
           </p:cNvSpPr>
@@ -108,18 +106,15 @@
             <a:normAutofit/>
           </a:bodyPr>
           <a:p>
-            <a:endParaRPr b="0" lang="en-US" sz="2320" spc="-1" strike="noStrike">
-              <a:solidFill>
-                <a:srgbClr val="000000"/>
-              </a:solidFill>
-              <a:latin typeface="Calibri"/>
-            </a:endParaRPr>
-          </a:p>
-        </p:txBody>
-      </p:sp>
-      <p:sp>
-        <p:nvSpPr>
-          <p:cNvPr id="28" name="PlaceHolder 3"/>
+            <a:endParaRPr b="0" lang="en-US" sz="3200" spc="-1" strike="noStrike">
+              <a:latin typeface="Arial"/>
+            </a:endParaRPr>
+          </a:p>
+        </p:txBody>
+      </p:sp>
+      <p:sp>
+        <p:nvSpPr>
+          <p:cNvPr id="23" name="PlaceHolder 3"/>
           <p:cNvSpPr>
             <a:spLocks noGrp="1"/>
           </p:cNvSpPr>
@@ -141,11 +136,8 @@
             <a:normAutofit/>
           </a:bodyPr>
           <a:p>
-            <a:endParaRPr b="0" lang="en-US" sz="2320" spc="-1" strike="noStrike">
-              <a:solidFill>
-                <a:srgbClr val="000000"/>
-              </a:solidFill>
-              <a:latin typeface="Calibri"/>
+            <a:endParaRPr b="0" lang="en-US" sz="3200" spc="-1" strike="noStrike">
+              <a:latin typeface="Arial"/>
             </a:endParaRPr>
           </a:p>
         </p:txBody>
@@ -174,7 +166,7 @@
       </p:grpSpPr>
       <p:sp>
         <p:nvSpPr>
-          <p:cNvPr id="29" name="PlaceHolder 1"/>
+          <p:cNvPr id="24" name="PlaceHolder 1"/>
           <p:cNvSpPr>
             <a:spLocks noGrp="1"/>
           </p:cNvSpPr>
@@ -196,18 +188,16 @@
             <a:noAutofit/>
           </a:bodyPr>
           <a:p>
-            <a:endParaRPr b="0" lang="en-US" sz="1800" spc="-1" strike="noStrike">
-              <a:solidFill>
-                <a:srgbClr val="000000"/>
-              </a:solidFill>
-              <a:latin typeface="Calibri"/>
-            </a:endParaRPr>
-          </a:p>
-        </p:txBody>
-      </p:sp>
-      <p:sp>
-        <p:nvSpPr>
-          <p:cNvPr id="30" name="PlaceHolder 2"/>
+            <a:pPr algn="ctr"/>
+            <a:endParaRPr b="0" lang="en-US" sz="4400" spc="-1" strike="noStrike">
+              <a:latin typeface="Arial"/>
+            </a:endParaRPr>
+          </a:p>
+        </p:txBody>
+      </p:sp>
+      <p:sp>
+        <p:nvSpPr>
+          <p:cNvPr id="25" name="PlaceHolder 2"/>
           <p:cNvSpPr>
             <a:spLocks noGrp="1"/>
           </p:cNvSpPr>
@@ -229,18 +219,15 @@
             <a:normAutofit/>
           </a:bodyPr>
           <a:p>
-            <a:endParaRPr b="0" lang="en-US" sz="2320" spc="-1" strike="noStrike">
-              <a:solidFill>
-                <a:srgbClr val="000000"/>
-              </a:solidFill>
-              <a:latin typeface="Calibri"/>
-            </a:endParaRPr>
-          </a:p>
-        </p:txBody>
-      </p:sp>
-      <p:sp>
-        <p:nvSpPr>
-          <p:cNvPr id="31" name="PlaceHolder 3"/>
+            <a:endParaRPr b="0" lang="en-US" sz="3200" spc="-1" strike="noStrike">
+              <a:latin typeface="Arial"/>
+            </a:endParaRPr>
+          </a:p>
+        </p:txBody>
+      </p:sp>
+      <p:sp>
+        <p:nvSpPr>
+          <p:cNvPr id="26" name="PlaceHolder 3"/>
           <p:cNvSpPr>
             <a:spLocks noGrp="1"/>
           </p:cNvSpPr>
@@ -262,18 +249,15 @@
             <a:normAutofit/>
           </a:bodyPr>
           <a:p>
-            <a:endParaRPr b="0" lang="en-US" sz="2320" spc="-1" strike="noStrike">
-              <a:solidFill>
-                <a:srgbClr val="000000"/>
-              </a:solidFill>
-              <a:latin typeface="Calibri"/>
-            </a:endParaRPr>
-          </a:p>
-        </p:txBody>
-      </p:sp>
-      <p:sp>
-        <p:nvSpPr>
-          <p:cNvPr id="32" name="PlaceHolder 4"/>
+            <a:endParaRPr b="0" lang="en-US" sz="3200" spc="-1" strike="noStrike">
+              <a:latin typeface="Arial"/>
+            </a:endParaRPr>
+          </a:p>
+        </p:txBody>
+      </p:sp>
+      <p:sp>
+        <p:nvSpPr>
+          <p:cNvPr id="27" name="PlaceHolder 4"/>
           <p:cNvSpPr>
             <a:spLocks noGrp="1"/>
           </p:cNvSpPr>
@@ -295,18 +279,15 @@
             <a:normAutofit/>
           </a:bodyPr>
           <a:p>
-            <a:endParaRPr b="0" lang="en-US" sz="2320" spc="-1" strike="noStrike">
-              <a:solidFill>
-                <a:srgbClr val="000000"/>
-              </a:solidFill>
-              <a:latin typeface="Calibri"/>
-            </a:endParaRPr>
-          </a:p>
-        </p:txBody>
-      </p:sp>
-      <p:sp>
-        <p:nvSpPr>
-          <p:cNvPr id="33" name="PlaceHolder 5"/>
+            <a:endParaRPr b="0" lang="en-US" sz="3200" spc="-1" strike="noStrike">
+              <a:latin typeface="Arial"/>
+            </a:endParaRPr>
+          </a:p>
+        </p:txBody>
+      </p:sp>
+      <p:sp>
+        <p:nvSpPr>
+          <p:cNvPr id="28" name="PlaceHolder 5"/>
           <p:cNvSpPr>
             <a:spLocks noGrp="1"/>
           </p:cNvSpPr>
@@ -328,11 +309,8 @@
             <a:normAutofit/>
           </a:bodyPr>
           <a:p>
-            <a:endParaRPr b="0" lang="en-US" sz="2320" spc="-1" strike="noStrike">
-              <a:solidFill>
-                <a:srgbClr val="000000"/>
-              </a:solidFill>
-              <a:latin typeface="Calibri"/>
+            <a:endParaRPr b="0" lang="en-US" sz="3200" spc="-1" strike="noStrike">
+              <a:latin typeface="Arial"/>
             </a:endParaRPr>
           </a:p>
         </p:txBody>
@@ -361,7 +339,7 @@
       </p:grpSpPr>
       <p:sp>
         <p:nvSpPr>
-          <p:cNvPr id="34" name="PlaceHolder 1"/>
+          <p:cNvPr id="29" name="PlaceHolder 1"/>
           <p:cNvSpPr>
             <a:spLocks noGrp="1"/>
           </p:cNvSpPr>
@@ -383,18 +361,16 @@
             <a:noAutofit/>
           </a:bodyPr>
           <a:p>
-            <a:endParaRPr b="0" lang="en-US" sz="1800" spc="-1" strike="noStrike">
-              <a:solidFill>
-                <a:srgbClr val="000000"/>
-              </a:solidFill>
-              <a:latin typeface="Calibri"/>
-            </a:endParaRPr>
-          </a:p>
-        </p:txBody>
-      </p:sp>
-      <p:sp>
-        <p:nvSpPr>
-          <p:cNvPr id="35" name="PlaceHolder 2"/>
+            <a:pPr algn="ctr"/>
+            <a:endParaRPr b="0" lang="en-US" sz="4400" spc="-1" strike="noStrike">
+              <a:latin typeface="Arial"/>
+            </a:endParaRPr>
+          </a:p>
+        </p:txBody>
+      </p:sp>
+      <p:sp>
+        <p:nvSpPr>
+          <p:cNvPr id="30" name="PlaceHolder 2"/>
           <p:cNvSpPr>
             <a:spLocks noGrp="1"/>
           </p:cNvSpPr>
@@ -416,18 +392,15 @@
             <a:normAutofit/>
           </a:bodyPr>
           <a:p>
-            <a:endParaRPr b="0" lang="en-US" sz="2320" spc="-1" strike="noStrike">
-              <a:solidFill>
-                <a:srgbClr val="000000"/>
-              </a:solidFill>
-              <a:latin typeface="Calibri"/>
-            </a:endParaRPr>
-          </a:p>
-        </p:txBody>
-      </p:sp>
-      <p:sp>
-        <p:nvSpPr>
-          <p:cNvPr id="36" name="PlaceHolder 3"/>
+            <a:endParaRPr b="0" lang="en-US" sz="3200" spc="-1" strike="noStrike">
+              <a:latin typeface="Arial"/>
+            </a:endParaRPr>
+          </a:p>
+        </p:txBody>
+      </p:sp>
+      <p:sp>
+        <p:nvSpPr>
+          <p:cNvPr id="31" name="PlaceHolder 3"/>
           <p:cNvSpPr>
             <a:spLocks noGrp="1"/>
           </p:cNvSpPr>
@@ -449,18 +422,15 @@
             <a:normAutofit/>
           </a:bodyPr>
           <a:p>
-            <a:endParaRPr b="0" lang="en-US" sz="2320" spc="-1" strike="noStrike">
-              <a:solidFill>
-                <a:srgbClr val="000000"/>
-              </a:solidFill>
-              <a:latin typeface="Calibri"/>
-            </a:endParaRPr>
-          </a:p>
-        </p:txBody>
-      </p:sp>
-      <p:sp>
-        <p:nvSpPr>
-          <p:cNvPr id="37" name="PlaceHolder 4"/>
+            <a:endParaRPr b="0" lang="en-US" sz="3200" spc="-1" strike="noStrike">
+              <a:latin typeface="Arial"/>
+            </a:endParaRPr>
+          </a:p>
+        </p:txBody>
+      </p:sp>
+      <p:sp>
+        <p:nvSpPr>
+          <p:cNvPr id="32" name="PlaceHolder 4"/>
           <p:cNvSpPr>
             <a:spLocks noGrp="1"/>
           </p:cNvSpPr>
@@ -482,18 +452,15 @@
             <a:normAutofit/>
           </a:bodyPr>
           <a:p>
-            <a:endParaRPr b="0" lang="en-US" sz="2320" spc="-1" strike="noStrike">
-              <a:solidFill>
-                <a:srgbClr val="000000"/>
-              </a:solidFill>
-              <a:latin typeface="Calibri"/>
-            </a:endParaRPr>
-          </a:p>
-        </p:txBody>
-      </p:sp>
-      <p:sp>
-        <p:nvSpPr>
-          <p:cNvPr id="38" name="PlaceHolder 5"/>
+            <a:endParaRPr b="0" lang="en-US" sz="3200" spc="-1" strike="noStrike">
+              <a:latin typeface="Arial"/>
+            </a:endParaRPr>
+          </a:p>
+        </p:txBody>
+      </p:sp>
+      <p:sp>
+        <p:nvSpPr>
+          <p:cNvPr id="33" name="PlaceHolder 5"/>
           <p:cNvSpPr>
             <a:spLocks noGrp="1"/>
           </p:cNvSpPr>
@@ -515,18 +482,15 @@
             <a:normAutofit/>
           </a:bodyPr>
           <a:p>
-            <a:endParaRPr b="0" lang="en-US" sz="2320" spc="-1" strike="noStrike">
-              <a:solidFill>
-                <a:srgbClr val="000000"/>
-              </a:solidFill>
-              <a:latin typeface="Calibri"/>
-            </a:endParaRPr>
-          </a:p>
-        </p:txBody>
-      </p:sp>
-      <p:sp>
-        <p:nvSpPr>
-          <p:cNvPr id="39" name="PlaceHolder 6"/>
+            <a:endParaRPr b="0" lang="en-US" sz="3200" spc="-1" strike="noStrike">
+              <a:latin typeface="Arial"/>
+            </a:endParaRPr>
+          </a:p>
+        </p:txBody>
+      </p:sp>
+      <p:sp>
+        <p:nvSpPr>
+          <p:cNvPr id="34" name="PlaceHolder 6"/>
           <p:cNvSpPr>
             <a:spLocks noGrp="1"/>
           </p:cNvSpPr>
@@ -548,18 +512,15 @@
             <a:normAutofit/>
           </a:bodyPr>
           <a:p>
-            <a:endParaRPr b="0" lang="en-US" sz="2320" spc="-1" strike="noStrike">
-              <a:solidFill>
-                <a:srgbClr val="000000"/>
-              </a:solidFill>
-              <a:latin typeface="Calibri"/>
-            </a:endParaRPr>
-          </a:p>
-        </p:txBody>
-      </p:sp>
-      <p:sp>
-        <p:nvSpPr>
-          <p:cNvPr id="40" name="PlaceHolder 7"/>
+            <a:endParaRPr b="0" lang="en-US" sz="3200" spc="-1" strike="noStrike">
+              <a:latin typeface="Arial"/>
+            </a:endParaRPr>
+          </a:p>
+        </p:txBody>
+      </p:sp>
+      <p:sp>
+        <p:nvSpPr>
+          <p:cNvPr id="35" name="PlaceHolder 7"/>
           <p:cNvSpPr>
             <a:spLocks noGrp="1"/>
           </p:cNvSpPr>
@@ -581,11 +542,8 @@
             <a:normAutofit/>
           </a:bodyPr>
           <a:p>
-            <a:endParaRPr b="0" lang="en-US" sz="2320" spc="-1" strike="noStrike">
-              <a:solidFill>
-                <a:srgbClr val="000000"/>
-              </a:solidFill>
-              <a:latin typeface="Calibri"/>
+            <a:endParaRPr b="0" lang="en-US" sz="3200" spc="-1" strike="noStrike">
+              <a:latin typeface="Arial"/>
             </a:endParaRPr>
           </a:p>
         </p:txBody>
@@ -614,7 +572,7 @@
       </p:grpSpPr>
       <p:sp>
         <p:nvSpPr>
-          <p:cNvPr id="5" name="PlaceHolder 1"/>
+          <p:cNvPr id="0" name="PlaceHolder 1"/>
           <p:cNvSpPr>
             <a:spLocks noGrp="1"/>
           </p:cNvSpPr>
@@ -636,18 +594,16 @@
             <a:noAutofit/>
           </a:bodyPr>
           <a:p>
-            <a:endParaRPr b="0" lang="en-US" sz="1800" spc="-1" strike="noStrike">
-              <a:solidFill>
-                <a:srgbClr val="000000"/>
-              </a:solidFill>
-              <a:latin typeface="Calibri"/>
-            </a:endParaRPr>
-          </a:p>
-        </p:txBody>
-      </p:sp>
-      <p:sp>
-        <p:nvSpPr>
-          <p:cNvPr id="6" name="PlaceHolder 2"/>
+            <a:pPr algn="ctr"/>
+            <a:endParaRPr b="0" lang="en-US" sz="4400" spc="-1" strike="noStrike">
+              <a:latin typeface="Arial"/>
+            </a:endParaRPr>
+          </a:p>
+        </p:txBody>
+      </p:sp>
+      <p:sp>
+        <p:nvSpPr>
+          <p:cNvPr id="1" name="PlaceHolder 2"/>
           <p:cNvSpPr>
             <a:spLocks noGrp="1"/>
           </p:cNvSpPr>
@@ -700,7 +656,7 @@
       </p:grpSpPr>
       <p:sp>
         <p:nvSpPr>
-          <p:cNvPr id="7" name="PlaceHolder 1"/>
+          <p:cNvPr id="2" name="PlaceHolder 1"/>
           <p:cNvSpPr>
             <a:spLocks noGrp="1"/>
           </p:cNvSpPr>
@@ -722,18 +678,16 @@
             <a:noAutofit/>
           </a:bodyPr>
           <a:p>
-            <a:endParaRPr b="0" lang="en-US" sz="1800" spc="-1" strike="noStrike">
-              <a:solidFill>
-                <a:srgbClr val="000000"/>
-              </a:solidFill>
-              <a:latin typeface="Calibri"/>
-            </a:endParaRPr>
-          </a:p>
-        </p:txBody>
-      </p:sp>
-      <p:sp>
-        <p:nvSpPr>
-          <p:cNvPr id="8" name="PlaceHolder 2"/>
+            <a:pPr algn="ctr"/>
+            <a:endParaRPr b="0" lang="en-US" sz="4400" spc="-1" strike="noStrike">
+              <a:latin typeface="Arial"/>
+            </a:endParaRPr>
+          </a:p>
+        </p:txBody>
+      </p:sp>
+      <p:sp>
+        <p:nvSpPr>
+          <p:cNvPr id="3" name="PlaceHolder 2"/>
           <p:cNvSpPr>
             <a:spLocks noGrp="1"/>
           </p:cNvSpPr>
@@ -755,11 +709,8 @@
             <a:normAutofit/>
           </a:bodyPr>
           <a:p>
-            <a:endParaRPr b="0" lang="en-US" sz="2320" spc="-1" strike="noStrike">
-              <a:solidFill>
-                <a:srgbClr val="000000"/>
-              </a:solidFill>
-              <a:latin typeface="Calibri"/>
+            <a:endParaRPr b="0" lang="en-US" sz="3200" spc="-1" strike="noStrike">
+              <a:latin typeface="Arial"/>
             </a:endParaRPr>
           </a:p>
         </p:txBody>
@@ -788,7 +739,7 @@
       </p:grpSpPr>
       <p:sp>
         <p:nvSpPr>
-          <p:cNvPr id="9" name="PlaceHolder 1"/>
+          <p:cNvPr id="4" name="PlaceHolder 1"/>
           <p:cNvSpPr>
             <a:spLocks noGrp="1"/>
           </p:cNvSpPr>
@@ -810,18 +761,16 @@
             <a:noAutofit/>
           </a:bodyPr>
           <a:p>
-            <a:endParaRPr b="0" lang="en-US" sz="1800" spc="-1" strike="noStrike">
-              <a:solidFill>
-                <a:srgbClr val="000000"/>
-              </a:solidFill>
-              <a:latin typeface="Calibri"/>
-            </a:endParaRPr>
-          </a:p>
-        </p:txBody>
-      </p:sp>
-      <p:sp>
-        <p:nvSpPr>
-          <p:cNvPr id="10" name="PlaceHolder 2"/>
+            <a:pPr algn="ctr"/>
+            <a:endParaRPr b="0" lang="en-US" sz="4400" spc="-1" strike="noStrike">
+              <a:latin typeface="Arial"/>
+            </a:endParaRPr>
+          </a:p>
+        </p:txBody>
+      </p:sp>
+      <p:sp>
+        <p:nvSpPr>
+          <p:cNvPr id="5" name="PlaceHolder 2"/>
           <p:cNvSpPr>
             <a:spLocks noGrp="1"/>
           </p:cNvSpPr>
@@ -843,18 +792,15 @@
             <a:normAutofit/>
           </a:bodyPr>
           <a:p>
-            <a:endParaRPr b="0" lang="en-US" sz="2320" spc="-1" strike="noStrike">
-              <a:solidFill>
-                <a:srgbClr val="000000"/>
-              </a:solidFill>
-              <a:latin typeface="Calibri"/>
-            </a:endParaRPr>
-          </a:p>
-        </p:txBody>
-      </p:sp>
-      <p:sp>
-        <p:nvSpPr>
-          <p:cNvPr id="11" name="PlaceHolder 3"/>
+            <a:endParaRPr b="0" lang="en-US" sz="3200" spc="-1" strike="noStrike">
+              <a:latin typeface="Arial"/>
+            </a:endParaRPr>
+          </a:p>
+        </p:txBody>
+      </p:sp>
+      <p:sp>
+        <p:nvSpPr>
+          <p:cNvPr id="6" name="PlaceHolder 3"/>
           <p:cNvSpPr>
             <a:spLocks noGrp="1"/>
           </p:cNvSpPr>
@@ -876,11 +822,8 @@
             <a:normAutofit/>
           </a:bodyPr>
           <a:p>
-            <a:endParaRPr b="0" lang="en-US" sz="2320" spc="-1" strike="noStrike">
-              <a:solidFill>
-                <a:srgbClr val="000000"/>
-              </a:solidFill>
-              <a:latin typeface="Calibri"/>
+            <a:endParaRPr b="0" lang="en-US" sz="3200" spc="-1" strike="noStrike">
+              <a:latin typeface="Arial"/>
             </a:endParaRPr>
           </a:p>
         </p:txBody>
@@ -909,7 +852,7 @@
       </p:grpSpPr>
       <p:sp>
         <p:nvSpPr>
-          <p:cNvPr id="12" name="PlaceHolder 1"/>
+          <p:cNvPr id="7" name="PlaceHolder 1"/>
           <p:cNvSpPr>
             <a:spLocks noGrp="1"/>
           </p:cNvSpPr>
@@ -931,11 +874,9 @@
             <a:noAutofit/>
           </a:bodyPr>
           <a:p>
-            <a:endParaRPr b="0" lang="en-US" sz="1800" spc="-1" strike="noStrike">
-              <a:solidFill>
-                <a:srgbClr val="000000"/>
-              </a:solidFill>
-              <a:latin typeface="Calibri"/>
+            <a:pPr algn="ctr"/>
+            <a:endParaRPr b="0" lang="en-US" sz="4400" spc="-1" strike="noStrike">
+              <a:latin typeface="Arial"/>
             </a:endParaRPr>
           </a:p>
         </p:txBody>
@@ -964,7 +905,7 @@
       </p:grpSpPr>
       <p:sp>
         <p:nvSpPr>
-          <p:cNvPr id="13" name="PlaceHolder 1"/>
+          <p:cNvPr id="8" name="PlaceHolder 1"/>
           <p:cNvSpPr>
             <a:spLocks noGrp="1"/>
           </p:cNvSpPr>
@@ -1017,7 +958,7 @@
       </p:grpSpPr>
       <p:sp>
         <p:nvSpPr>
-          <p:cNvPr id="14" name="PlaceHolder 1"/>
+          <p:cNvPr id="9" name="PlaceHolder 1"/>
           <p:cNvSpPr>
             <a:spLocks noGrp="1"/>
           </p:cNvSpPr>
@@ -1039,18 +980,16 @@
             <a:noAutofit/>
           </a:bodyPr>
           <a:p>
-            <a:endParaRPr b="0" lang="en-US" sz="1800" spc="-1" strike="noStrike">
-              <a:solidFill>
-                <a:srgbClr val="000000"/>
-              </a:solidFill>
-              <a:latin typeface="Calibri"/>
-            </a:endParaRPr>
-          </a:p>
-        </p:txBody>
-      </p:sp>
-      <p:sp>
-        <p:nvSpPr>
-          <p:cNvPr id="15" name="PlaceHolder 2"/>
+            <a:pPr algn="ctr"/>
+            <a:endParaRPr b="0" lang="en-US" sz="4400" spc="-1" strike="noStrike">
+              <a:latin typeface="Arial"/>
+            </a:endParaRPr>
+          </a:p>
+        </p:txBody>
+      </p:sp>
+      <p:sp>
+        <p:nvSpPr>
+          <p:cNvPr id="10" name="PlaceHolder 2"/>
           <p:cNvSpPr>
             <a:spLocks noGrp="1"/>
           </p:cNvSpPr>
@@ -1072,18 +1011,15 @@
             <a:normAutofit/>
           </a:bodyPr>
           <a:p>
-            <a:endParaRPr b="0" lang="en-US" sz="2320" spc="-1" strike="noStrike">
-              <a:solidFill>
-                <a:srgbClr val="000000"/>
-              </a:solidFill>
-              <a:latin typeface="Calibri"/>
-            </a:endParaRPr>
-          </a:p>
-        </p:txBody>
-      </p:sp>
-      <p:sp>
-        <p:nvSpPr>
-          <p:cNvPr id="16" name="PlaceHolder 3"/>
+            <a:endParaRPr b="0" lang="en-US" sz="3200" spc="-1" strike="noStrike">
+              <a:latin typeface="Arial"/>
+            </a:endParaRPr>
+          </a:p>
+        </p:txBody>
+      </p:sp>
+      <p:sp>
+        <p:nvSpPr>
+          <p:cNvPr id="11" name="PlaceHolder 3"/>
           <p:cNvSpPr>
             <a:spLocks noGrp="1"/>
           </p:cNvSpPr>
@@ -1105,18 +1041,15 @@
             <a:normAutofit/>
           </a:bodyPr>
           <a:p>
-            <a:endParaRPr b="0" lang="en-US" sz="2320" spc="-1" strike="noStrike">
-              <a:solidFill>
-                <a:srgbClr val="000000"/>
-              </a:solidFill>
-              <a:latin typeface="Calibri"/>
-            </a:endParaRPr>
-          </a:p>
-        </p:txBody>
-      </p:sp>
-      <p:sp>
-        <p:nvSpPr>
-          <p:cNvPr id="17" name="PlaceHolder 4"/>
+            <a:endParaRPr b="0" lang="en-US" sz="3200" spc="-1" strike="noStrike">
+              <a:latin typeface="Arial"/>
+            </a:endParaRPr>
+          </a:p>
+        </p:txBody>
+      </p:sp>
+      <p:sp>
+        <p:nvSpPr>
+          <p:cNvPr id="12" name="PlaceHolder 4"/>
           <p:cNvSpPr>
             <a:spLocks noGrp="1"/>
           </p:cNvSpPr>
@@ -1138,11 +1071,8 @@
             <a:normAutofit/>
           </a:bodyPr>
           <a:p>
-            <a:endParaRPr b="0" lang="en-US" sz="2320" spc="-1" strike="noStrike">
-              <a:solidFill>
-                <a:srgbClr val="000000"/>
-              </a:solidFill>
-              <a:latin typeface="Calibri"/>
+            <a:endParaRPr b="0" lang="en-US" sz="3200" spc="-1" strike="noStrike">
+              <a:latin typeface="Arial"/>
             </a:endParaRPr>
           </a:p>
         </p:txBody>
@@ -1171,7 +1101,7 @@
       </p:grpSpPr>
       <p:sp>
         <p:nvSpPr>
-          <p:cNvPr id="18" name="PlaceHolder 1"/>
+          <p:cNvPr id="13" name="PlaceHolder 1"/>
           <p:cNvSpPr>
             <a:spLocks noGrp="1"/>
           </p:cNvSpPr>
@@ -1193,18 +1123,16 @@
             <a:noAutofit/>
           </a:bodyPr>
           <a:p>
-            <a:endParaRPr b="0" lang="en-US" sz="1800" spc="-1" strike="noStrike">
-              <a:solidFill>
-                <a:srgbClr val="000000"/>
-              </a:solidFill>
-              <a:latin typeface="Calibri"/>
-            </a:endParaRPr>
-          </a:p>
-        </p:txBody>
-      </p:sp>
-      <p:sp>
-        <p:nvSpPr>
-          <p:cNvPr id="19" name="PlaceHolder 2"/>
+            <a:pPr algn="ctr"/>
+            <a:endParaRPr b="0" lang="en-US" sz="4400" spc="-1" strike="noStrike">
+              <a:latin typeface="Arial"/>
+            </a:endParaRPr>
+          </a:p>
+        </p:txBody>
+      </p:sp>
+      <p:sp>
+        <p:nvSpPr>
+          <p:cNvPr id="14" name="PlaceHolder 2"/>
           <p:cNvSpPr>
             <a:spLocks noGrp="1"/>
           </p:cNvSpPr>
@@ -1226,18 +1154,15 @@
             <a:normAutofit/>
           </a:bodyPr>
           <a:p>
-            <a:endParaRPr b="0" lang="en-US" sz="2320" spc="-1" strike="noStrike">
-              <a:solidFill>
-                <a:srgbClr val="000000"/>
-              </a:solidFill>
-              <a:latin typeface="Calibri"/>
-            </a:endParaRPr>
-          </a:p>
-        </p:txBody>
-      </p:sp>
-      <p:sp>
-        <p:nvSpPr>
-          <p:cNvPr id="20" name="PlaceHolder 3"/>
+            <a:endParaRPr b="0" lang="en-US" sz="3200" spc="-1" strike="noStrike">
+              <a:latin typeface="Arial"/>
+            </a:endParaRPr>
+          </a:p>
+        </p:txBody>
+      </p:sp>
+      <p:sp>
+        <p:nvSpPr>
+          <p:cNvPr id="15" name="PlaceHolder 3"/>
           <p:cNvSpPr>
             <a:spLocks noGrp="1"/>
           </p:cNvSpPr>
@@ -1259,18 +1184,15 @@
             <a:normAutofit/>
           </a:bodyPr>
           <a:p>
-            <a:endParaRPr b="0" lang="en-US" sz="2320" spc="-1" strike="noStrike">
-              <a:solidFill>
-                <a:srgbClr val="000000"/>
-              </a:solidFill>
-              <a:latin typeface="Calibri"/>
-            </a:endParaRPr>
-          </a:p>
-        </p:txBody>
-      </p:sp>
-      <p:sp>
-        <p:nvSpPr>
-          <p:cNvPr id="21" name="PlaceHolder 4"/>
+            <a:endParaRPr b="0" lang="en-US" sz="3200" spc="-1" strike="noStrike">
+              <a:latin typeface="Arial"/>
+            </a:endParaRPr>
+          </a:p>
+        </p:txBody>
+      </p:sp>
+      <p:sp>
+        <p:nvSpPr>
+          <p:cNvPr id="16" name="PlaceHolder 4"/>
           <p:cNvSpPr>
             <a:spLocks noGrp="1"/>
           </p:cNvSpPr>
@@ -1292,11 +1214,8 @@
             <a:normAutofit/>
           </a:bodyPr>
           <a:p>
-            <a:endParaRPr b="0" lang="en-US" sz="2320" spc="-1" strike="noStrike">
-              <a:solidFill>
-                <a:srgbClr val="000000"/>
-              </a:solidFill>
-              <a:latin typeface="Calibri"/>
+            <a:endParaRPr b="0" lang="en-US" sz="3200" spc="-1" strike="noStrike">
+              <a:latin typeface="Arial"/>
             </a:endParaRPr>
           </a:p>
         </p:txBody>
@@ -1325,7 +1244,7 @@
       </p:grpSpPr>
       <p:sp>
         <p:nvSpPr>
-          <p:cNvPr id="22" name="PlaceHolder 1"/>
+          <p:cNvPr id="17" name="PlaceHolder 1"/>
           <p:cNvSpPr>
             <a:spLocks noGrp="1"/>
           </p:cNvSpPr>
@@ -1347,18 +1266,16 @@
             <a:noAutofit/>
           </a:bodyPr>
           <a:p>
-            <a:endParaRPr b="0" lang="en-US" sz="1800" spc="-1" strike="noStrike">
-              <a:solidFill>
-                <a:srgbClr val="000000"/>
-              </a:solidFill>
-              <a:latin typeface="Calibri"/>
-            </a:endParaRPr>
-          </a:p>
-        </p:txBody>
-      </p:sp>
-      <p:sp>
-        <p:nvSpPr>
-          <p:cNvPr id="23" name="PlaceHolder 2"/>
+            <a:pPr algn="ctr"/>
+            <a:endParaRPr b="0" lang="en-US" sz="4400" spc="-1" strike="noStrike">
+              <a:latin typeface="Arial"/>
+            </a:endParaRPr>
+          </a:p>
+        </p:txBody>
+      </p:sp>
+      <p:sp>
+        <p:nvSpPr>
+          <p:cNvPr id="18" name="PlaceHolder 2"/>
           <p:cNvSpPr>
             <a:spLocks noGrp="1"/>
           </p:cNvSpPr>
@@ -1380,18 +1297,15 @@
             <a:normAutofit/>
           </a:bodyPr>
           <a:p>
-            <a:endParaRPr b="0" lang="en-US" sz="2320" spc="-1" strike="noStrike">
-              <a:solidFill>
-                <a:srgbClr val="000000"/>
-              </a:solidFill>
-              <a:latin typeface="Calibri"/>
-            </a:endParaRPr>
-          </a:p>
-        </p:txBody>
-      </p:sp>
-      <p:sp>
-        <p:nvSpPr>
-          <p:cNvPr id="24" name="PlaceHolder 3"/>
+            <a:endParaRPr b="0" lang="en-US" sz="3200" spc="-1" strike="noStrike">
+              <a:latin typeface="Arial"/>
+            </a:endParaRPr>
+          </a:p>
+        </p:txBody>
+      </p:sp>
+      <p:sp>
+        <p:nvSpPr>
+          <p:cNvPr id="19" name="PlaceHolder 3"/>
           <p:cNvSpPr>
             <a:spLocks noGrp="1"/>
           </p:cNvSpPr>
@@ -1413,18 +1327,15 @@
             <a:normAutofit/>
           </a:bodyPr>
           <a:p>
-            <a:endParaRPr b="0" lang="en-US" sz="2320" spc="-1" strike="noStrike">
-              <a:solidFill>
-                <a:srgbClr val="000000"/>
-              </a:solidFill>
-              <a:latin typeface="Calibri"/>
-            </a:endParaRPr>
-          </a:p>
-        </p:txBody>
-      </p:sp>
-      <p:sp>
-        <p:nvSpPr>
-          <p:cNvPr id="25" name="PlaceHolder 4"/>
+            <a:endParaRPr b="0" lang="en-US" sz="3200" spc="-1" strike="noStrike">
+              <a:latin typeface="Arial"/>
+            </a:endParaRPr>
+          </a:p>
+        </p:txBody>
+      </p:sp>
+      <p:sp>
+        <p:nvSpPr>
+          <p:cNvPr id="20" name="PlaceHolder 4"/>
           <p:cNvSpPr>
             <a:spLocks noGrp="1"/>
           </p:cNvSpPr>
@@ -1446,11 +1357,8 @@
             <a:normAutofit/>
           </a:bodyPr>
           <a:p>
-            <a:endParaRPr b="0" lang="en-US" sz="2320" spc="-1" strike="noStrike">
-              <a:solidFill>
-                <a:srgbClr val="000000"/>
-              </a:solidFill>
-              <a:latin typeface="Calibri"/>
+            <a:endParaRPr b="0" lang="en-US" sz="3200" spc="-1" strike="noStrike">
+              <a:latin typeface="Arial"/>
             </a:endParaRPr>
           </a:p>
         </p:txBody>
@@ -1484,387 +1392,6 @@
           <a:chExt cx="0" cy="0"/>
         </a:xfrm>
       </p:grpSpPr>
-      <p:sp>
-        <p:nvSpPr>
-          <p:cNvPr id="0" name="PlaceHolder 1"/>
-          <p:cNvSpPr>
-            <a:spLocks noGrp="1"/>
-          </p:cNvSpPr>
-          <p:nvPr>
-            <p:ph type="dt"/>
-          </p:nvPr>
-        </p:nvSpPr>
-        <p:spPr>
-          <a:xfrm>
-            <a:off x="693000" y="6006240"/>
-            <a:ext cx="2267640" cy="344520"/>
-          </a:xfrm>
-          <a:prstGeom prst="rect">
-            <a:avLst/>
-          </a:prstGeom>
-        </p:spPr>
-        <p:txBody>
-          <a:bodyPr anchor="ctr">
-            <a:noAutofit/>
-          </a:bodyPr>
-          <a:p>
-            <a:pPr>
-              <a:lnSpc>
-                <a:spcPct val="100000"/>
-              </a:lnSpc>
-            </a:pPr>
-            <a:fld id="{EED7F9E6-EA3C-4B4C-88F6-D72EBF1CA3D6}" type="datetime">
-              <a:rPr b="0" lang="en-GB" sz="989" spc="-1" strike="noStrike">
-                <a:solidFill>
-                  <a:srgbClr val="8b8b8b"/>
-                </a:solidFill>
-                <a:latin typeface="Calibri"/>
-              </a:rPr>
-              <a:t>20/11/20</a:t>
-            </a:fld>
-            <a:endParaRPr b="0" lang="en-US" sz="989" spc="-1" strike="noStrike">
-              <a:latin typeface="Times New Roman"/>
-            </a:endParaRPr>
-          </a:p>
-        </p:txBody>
-      </p:sp>
-      <p:sp>
-        <p:nvSpPr>
-          <p:cNvPr id="1" name="PlaceHolder 2"/>
-          <p:cNvSpPr>
-            <a:spLocks noGrp="1"/>
-          </p:cNvSpPr>
-          <p:nvPr>
-            <p:ph type="ftr"/>
-          </p:nvPr>
-        </p:nvSpPr>
-        <p:spPr>
-          <a:xfrm>
-            <a:off x="3339360" y="6006240"/>
-            <a:ext cx="3402000" cy="344520"/>
-          </a:xfrm>
-          <a:prstGeom prst="rect">
-            <a:avLst/>
-          </a:prstGeom>
-        </p:spPr>
-        <p:txBody>
-          <a:bodyPr anchor="ctr">
-            <a:noAutofit/>
-          </a:bodyPr>
-          <a:p>
-            <a:endParaRPr b="0" lang="en-US" sz="2400" spc="-1" strike="noStrike">
-              <a:latin typeface="Times New Roman"/>
-            </a:endParaRPr>
-          </a:p>
-        </p:txBody>
-      </p:sp>
-      <p:sp>
-        <p:nvSpPr>
-          <p:cNvPr id="2" name="PlaceHolder 3"/>
-          <p:cNvSpPr>
-            <a:spLocks noGrp="1"/>
-          </p:cNvSpPr>
-          <p:nvPr>
-            <p:ph type="sldNum"/>
-          </p:nvPr>
-        </p:nvSpPr>
-        <p:spPr>
-          <a:xfrm>
-            <a:off x="7119360" y="6006240"/>
-            <a:ext cx="2267640" cy="344520"/>
-          </a:xfrm>
-          <a:prstGeom prst="rect">
-            <a:avLst/>
-          </a:prstGeom>
-        </p:spPr>
-        <p:txBody>
-          <a:bodyPr anchor="ctr">
-            <a:noAutofit/>
-          </a:bodyPr>
-          <a:p>
-            <a:pPr algn="r">
-              <a:lnSpc>
-                <a:spcPct val="100000"/>
-              </a:lnSpc>
-            </a:pPr>
-            <a:fld id="{63453065-58BF-4D61-A353-F58A206EEAE6}" type="slidenum">
-              <a:rPr b="0" lang="en-GB" sz="989" spc="-1" strike="noStrike">
-                <a:solidFill>
-                  <a:srgbClr val="8b8b8b"/>
-                </a:solidFill>
-                <a:latin typeface="Calibri"/>
-              </a:rPr>
-              <a:t>1</a:t>
-            </a:fld>
-            <a:endParaRPr b="0" lang="en-US" sz="989" spc="-1" strike="noStrike">
-              <a:latin typeface="Times New Roman"/>
-            </a:endParaRPr>
-          </a:p>
-        </p:txBody>
-      </p:sp>
-      <p:sp>
-        <p:nvSpPr>
-          <p:cNvPr id="3" name="PlaceHolder 4"/>
-          <p:cNvSpPr>
-            <a:spLocks noGrp="1"/>
-          </p:cNvSpPr>
-          <p:nvPr>
-            <p:ph type="title"/>
-          </p:nvPr>
-        </p:nvSpPr>
-        <p:spPr>
-          <a:xfrm>
-            <a:off x="504000" y="258480"/>
-            <a:ext cx="9072000" cy="1081800"/>
-          </a:xfrm>
-          <a:prstGeom prst="rect">
-            <a:avLst/>
-          </a:prstGeom>
-        </p:spPr>
-        <p:txBody>
-          <a:bodyPr lIns="0" rIns="0" tIns="0" bIns="0" anchor="ctr">
-            <a:noAutofit/>
-          </a:bodyPr>
-          <a:p>
-            <a:r>
-              <a:rPr b="0" lang="en-US" sz="1800" spc="-1" strike="noStrike">
-                <a:solidFill>
-                  <a:srgbClr val="000000"/>
-                </a:solidFill>
-                <a:latin typeface="Calibri"/>
-              </a:rPr>
-              <a:t>Click to edit the title text format</a:t>
-            </a:r>
-            <a:endParaRPr b="0" lang="en-US" sz="1800" spc="-1" strike="noStrike">
-              <a:solidFill>
-                <a:srgbClr val="000000"/>
-              </a:solidFill>
-              <a:latin typeface="Calibri"/>
-            </a:endParaRPr>
-          </a:p>
-        </p:txBody>
-      </p:sp>
-      <p:sp>
-        <p:nvSpPr>
-          <p:cNvPr id="4" name="PlaceHolder 5"/>
-          <p:cNvSpPr>
-            <a:spLocks noGrp="1"/>
-          </p:cNvSpPr>
-          <p:nvPr>
-            <p:ph type="body"/>
-          </p:nvPr>
-        </p:nvSpPr>
-        <p:spPr>
-          <a:xfrm>
-            <a:off x="504000" y="1516320"/>
-            <a:ext cx="9072000" cy="3758040"/>
-          </a:xfrm>
-          <a:prstGeom prst="rect">
-            <a:avLst/>
-          </a:prstGeom>
-        </p:spPr>
-        <p:txBody>
-          <a:bodyPr lIns="0" rIns="0" tIns="0" bIns="0">
-            <a:normAutofit/>
-          </a:bodyPr>
-          <a:p>
-            <a:pPr marL="432000" indent="-324000">
-              <a:spcBef>
-                <a:spcPts val="1417"/>
-              </a:spcBef>
-              <a:buClr>
-                <a:srgbClr val="000000"/>
-              </a:buClr>
-              <a:buSzPct val="45000"/>
-              <a:buFont typeface="Wingdings" charset="2"/>
-              <a:buChar char=""/>
-            </a:pPr>
-            <a:r>
-              <a:rPr b="0" lang="en-US" sz="2320" spc="-1" strike="noStrike">
-                <a:solidFill>
-                  <a:srgbClr val="000000"/>
-                </a:solidFill>
-                <a:latin typeface="Calibri"/>
-              </a:rPr>
-              <a:t>Click to edit the outline text format</a:t>
-            </a:r>
-            <a:endParaRPr b="0" lang="en-US" sz="2320" spc="-1" strike="noStrike">
-              <a:solidFill>
-                <a:srgbClr val="000000"/>
-              </a:solidFill>
-              <a:latin typeface="Calibri"/>
-            </a:endParaRPr>
-          </a:p>
-          <a:p>
-            <a:pPr lvl="1" marL="864000" indent="-324000">
-              <a:spcBef>
-                <a:spcPts val="1134"/>
-              </a:spcBef>
-              <a:buClr>
-                <a:srgbClr val="000000"/>
-              </a:buClr>
-              <a:buSzPct val="75000"/>
-              <a:buFont typeface="Symbol" charset="2"/>
-              <a:buChar char=""/>
-            </a:pPr>
-            <a:r>
-              <a:rPr b="0" lang="en-US" sz="1660" spc="-1" strike="noStrike">
-                <a:solidFill>
-                  <a:srgbClr val="000000"/>
-                </a:solidFill>
-                <a:latin typeface="Calibri"/>
-              </a:rPr>
-              <a:t>Second Outline Level</a:t>
-            </a:r>
-            <a:endParaRPr b="0" lang="en-US" sz="1660" spc="-1" strike="noStrike">
-              <a:solidFill>
-                <a:srgbClr val="000000"/>
-              </a:solidFill>
-              <a:latin typeface="Calibri"/>
-            </a:endParaRPr>
-          </a:p>
-          <a:p>
-            <a:pPr lvl="2" marL="1296000" indent="-288000">
-              <a:spcBef>
-                <a:spcPts val="850"/>
-              </a:spcBef>
-              <a:buClr>
-                <a:srgbClr val="000000"/>
-              </a:buClr>
-              <a:buSzPct val="45000"/>
-              <a:buFont typeface="Wingdings" charset="2"/>
-              <a:buChar char=""/>
-            </a:pPr>
-            <a:r>
-              <a:rPr b="0" lang="en-US" sz="1490" spc="-1" strike="noStrike">
-                <a:solidFill>
-                  <a:srgbClr val="000000"/>
-                </a:solidFill>
-                <a:latin typeface="Calibri"/>
-              </a:rPr>
-              <a:t>Third Outline Level</a:t>
-            </a:r>
-            <a:endParaRPr b="0" lang="en-US" sz="1490" spc="-1" strike="noStrike">
-              <a:solidFill>
-                <a:srgbClr val="000000"/>
-              </a:solidFill>
-              <a:latin typeface="Calibri"/>
-            </a:endParaRPr>
-          </a:p>
-          <a:p>
-            <a:pPr lvl="3" marL="1728000" indent="-216000">
-              <a:spcBef>
-                <a:spcPts val="567"/>
-              </a:spcBef>
-              <a:buClr>
-                <a:srgbClr val="000000"/>
-              </a:buClr>
-              <a:buSzPct val="75000"/>
-              <a:buFont typeface="Symbol" charset="2"/>
-              <a:buChar char=""/>
-            </a:pPr>
-            <a:r>
-              <a:rPr b="0" lang="en-US" sz="1490" spc="-1" strike="noStrike">
-                <a:solidFill>
-                  <a:srgbClr val="000000"/>
-                </a:solidFill>
-                <a:latin typeface="Calibri"/>
-              </a:rPr>
-              <a:t>Fourth Outline Level</a:t>
-            </a:r>
-            <a:endParaRPr b="0" lang="en-US" sz="1490" spc="-1" strike="noStrike">
-              <a:solidFill>
-                <a:srgbClr val="000000"/>
-              </a:solidFill>
-              <a:latin typeface="Calibri"/>
-            </a:endParaRPr>
-          </a:p>
-          <a:p>
-            <a:pPr lvl="4" marL="2160000" indent="-216000">
-              <a:spcBef>
-                <a:spcPts val="283"/>
-              </a:spcBef>
-              <a:buClr>
-                <a:srgbClr val="000000"/>
-              </a:buClr>
-              <a:buSzPct val="45000"/>
-              <a:buFont typeface="Wingdings" charset="2"/>
-              <a:buChar char=""/>
-            </a:pPr>
-            <a:r>
-              <a:rPr b="0" lang="en-US" sz="2000" spc="-1" strike="noStrike">
-                <a:solidFill>
-                  <a:srgbClr val="000000"/>
-                </a:solidFill>
-                <a:latin typeface="Calibri"/>
-              </a:rPr>
-              <a:t>Fifth Outline Level</a:t>
-            </a:r>
-            <a:endParaRPr b="0" lang="en-US" sz="2000" spc="-1" strike="noStrike">
-              <a:solidFill>
-                <a:srgbClr val="000000"/>
-              </a:solidFill>
-              <a:latin typeface="Calibri"/>
-            </a:endParaRPr>
-          </a:p>
-          <a:p>
-            <a:pPr lvl="5" marL="2592000" indent="-216000">
-              <a:spcBef>
-                <a:spcPts val="283"/>
-              </a:spcBef>
-              <a:buClr>
-                <a:srgbClr val="000000"/>
-              </a:buClr>
-              <a:buSzPct val="45000"/>
-              <a:buFont typeface="Wingdings" charset="2"/>
-              <a:buChar char=""/>
-            </a:pPr>
-            <a:r>
-              <a:rPr b="0" lang="en-US" sz="2000" spc="-1" strike="noStrike">
-                <a:solidFill>
-                  <a:srgbClr val="000000"/>
-                </a:solidFill>
-                <a:latin typeface="Calibri"/>
-              </a:rPr>
-              <a:t>Sixth Outline Level</a:t>
-            </a:r>
-            <a:endParaRPr b="0" lang="en-US" sz="2000" spc="-1" strike="noStrike">
-              <a:solidFill>
-                <a:srgbClr val="000000"/>
-              </a:solidFill>
-              <a:latin typeface="Calibri"/>
-            </a:endParaRPr>
-          </a:p>
-          <a:p>
-            <a:pPr lvl="6" marL="3024000" indent="-216000">
-              <a:spcBef>
-                <a:spcPts val="283"/>
-              </a:spcBef>
-              <a:buClr>
-                <a:srgbClr val="000000"/>
-              </a:buClr>
-              <a:buSzPct val="45000"/>
-              <a:buFont typeface="Wingdings" charset="2"/>
-              <a:buChar char=""/>
-            </a:pPr>
-            <a:r>
-              <a:rPr b="0" lang="en-US" sz="2000" spc="-1" strike="noStrike">
-                <a:solidFill>
-                  <a:srgbClr val="000000"/>
-                </a:solidFill>
-                <a:latin typeface="Calibri"/>
-              </a:rPr>
-              <a:t>Seventh Outline Level</a:t>
-            </a:r>
-            <a:endParaRPr b="0" lang="en-US" sz="2000" spc="-1" strike="noStrike">
-              <a:solidFill>
-                <a:srgbClr val="000000"/>
-              </a:solidFill>
-              <a:latin typeface="Calibri"/>
-            </a:endParaRPr>
-          </a:p>
-        </p:txBody>
-      </p:sp>
     </p:spTree>
   </p:cSld>
   <p:clrMap bg1="lt1" bg2="lt2" tx1="dk1" tx2="dk2" accent1="accent1" accent2="accent2" accent3="accent3" accent4="accent4" accent5="accent5" accent6="accent6" hlink="hlink" folHlink="folHlink"/>
@@ -1904,14 +1431,14 @@
       </p:grpSpPr>
       <p:sp>
         <p:nvSpPr>
-          <p:cNvPr id="41" name="CustomShape 1"/>
+          <p:cNvPr id="36" name="CustomShape 1"/>
           <p:cNvSpPr/>
           <p:nvPr/>
         </p:nvSpPr>
         <p:spPr>
           <a:xfrm>
-            <a:off x="1800000" y="4932000"/>
-            <a:ext cx="4140000" cy="1004760"/>
+            <a:off x="360000" y="5220000"/>
+            <a:ext cx="5579280" cy="807480"/>
           </a:xfrm>
           <a:prstGeom prst="rect">
             <a:avLst/>
@@ -1925,7 +1452,7 @@
             </a:solidFill>
           </a:ln>
           <a:effectLst>
-            <a:outerShdw dist="101823" dir="2700000">
+            <a:outerShdw dir="2700000" dist="101823">
               <a:srgbClr val="808080"/>
             </a:outerShdw>
           </a:effectLst>
@@ -1949,7 +1476,7 @@
             <a:noAutofit/>
           </a:bodyPr>
           <a:p>
-            <a:pPr algn="r">
+            <a:pPr>
               <a:lnSpc>
                 <a:spcPct val="100000"/>
               </a:lnSpc>
@@ -1960,28 +1487,46 @@
                   <a:srgbClr val="336633"/>
                 </a:solidFill>
                 <a:latin typeface="Calibri"/>
-              </a:rPr>
-              <a:t>App Specific Event Subscribers</a:t>
+                <a:ea typeface="DejaVu Sans"/>
+              </a:rPr>
+              <a:t>App Specific Event </a:t>
             </a:r>
             <a:endParaRPr b="0" lang="en-US" sz="1600" spc="-1" strike="noStrike">
-              <a:solidFill>
-                <a:srgbClr val="336633"/>
-              </a:solidFill>
-              <a:latin typeface="Arial"/>
-            </a:endParaRPr>
-          </a:p>
-        </p:txBody>
-      </p:sp>
-      <p:sp>
-        <p:nvSpPr>
-          <p:cNvPr id="42" name="CustomShape 2"/>
+              <a:latin typeface="Arial"/>
+            </a:endParaRPr>
+          </a:p>
+          <a:p>
+            <a:pPr>
+              <a:lnSpc>
+                <a:spcPct val="100000"/>
+              </a:lnSpc>
+            </a:pPr>
+            <a:r>
+              <a:rPr b="0" i="1" lang="en-GB" sz="1600" spc="-1" strike="noStrike">
+                <a:solidFill>
+                  <a:srgbClr val="336633"/>
+                </a:solidFill>
+                <a:latin typeface="Calibri"/>
+                <a:ea typeface="DejaVu Sans"/>
+              </a:rPr>
+              <a:t>Subscribers</a:t>
+            </a:r>
+            <a:endParaRPr b="0" lang="en-US" sz="1600" spc="-1" strike="noStrike">
+              <a:latin typeface="Arial"/>
+            </a:endParaRPr>
+          </a:p>
+        </p:txBody>
+      </p:sp>
+      <p:sp>
+        <p:nvSpPr>
+          <p:cNvPr id="37" name="CustomShape 2"/>
           <p:cNvSpPr/>
           <p:nvPr/>
         </p:nvSpPr>
         <p:spPr>
           <a:xfrm>
             <a:off x="2233440" y="504000"/>
-            <a:ext cx="3706560" cy="1980000"/>
+            <a:ext cx="3705840" cy="1979280"/>
           </a:xfrm>
           <a:prstGeom prst="rect">
             <a:avLst/>
@@ -2002,6 +1547,13 @@
               <a:srgbClr val="4f81bd"/>
             </a:solidFill>
           </a:ln>
+          <a:effectLst>
+            <a:outerShdw blurRad="40000" dir="5400000" dist="20160" rotWithShape="0">
+              <a:srgbClr val="000000">
+                <a:alpha val="38000"/>
+              </a:srgbClr>
+            </a:outerShdw>
+          </a:effectLst>
         </p:spPr>
         <p:style>
           <a:lnRef idx="1">
@@ -2031,6 +1583,7 @@
                   <a:srgbClr val="1f497d"/>
                 </a:solidFill>
                 <a:latin typeface="Calibri"/>
+                <a:ea typeface="DejaVu Sans"/>
               </a:rPr>
               <a:t>Interaction</a:t>
             </a:r>
@@ -2042,14 +1595,14 @@
       </p:sp>
       <p:sp>
         <p:nvSpPr>
-          <p:cNvPr id="43" name="CustomShape 3"/>
+          <p:cNvPr id="38" name="CustomShape 3"/>
           <p:cNvSpPr/>
           <p:nvPr/>
         </p:nvSpPr>
         <p:spPr>
           <a:xfrm>
             <a:off x="335520" y="504000"/>
-            <a:ext cx="1408680" cy="1980000"/>
+            <a:ext cx="1407960" cy="1979280"/>
           </a:xfrm>
           <a:prstGeom prst="rect">
             <a:avLst/>
@@ -2070,6 +1623,13 @@
               <a:srgbClr val="000000"/>
             </a:solidFill>
           </a:ln>
+          <a:effectLst>
+            <a:outerShdw blurRad="40000" dir="5400000" dist="20160" rotWithShape="0">
+              <a:srgbClr val="000000">
+                <a:alpha val="38000"/>
+              </a:srgbClr>
+            </a:outerShdw>
+          </a:effectLst>
         </p:spPr>
         <p:style>
           <a:lnRef idx="1">
@@ -2099,6 +1659,7 @@
                   <a:srgbClr val="ffffff"/>
                 </a:solidFill>
                 <a:latin typeface="Calibri"/>
+                <a:ea typeface="DejaVu Sans"/>
               </a:rPr>
               <a:t>Command</a:t>
             </a:r>
@@ -2128,6 +1689,7 @@
                   <a:srgbClr val="ffffff"/>
                 </a:solidFill>
                 <a:latin typeface="Calibri"/>
+                <a:ea typeface="DejaVu Sans"/>
               </a:rPr>
               <a:t>(intention to execute)</a:t>
             </a:r>
@@ -2139,14 +1701,14 @@
       </p:sp>
       <p:sp>
         <p:nvSpPr>
-          <p:cNvPr id="44" name="CustomShape 4"/>
+          <p:cNvPr id="39" name="CustomShape 4"/>
           <p:cNvSpPr/>
           <p:nvPr/>
         </p:nvSpPr>
         <p:spPr>
           <a:xfrm>
             <a:off x="2520000" y="864000"/>
-            <a:ext cx="1496520" cy="1440000"/>
+            <a:ext cx="1495800" cy="1439280"/>
           </a:xfrm>
           <a:prstGeom prst="rect">
             <a:avLst/>
@@ -2190,6 +1752,7 @@
                   <a:srgbClr val="ffffff"/>
                 </a:solidFill>
                 <a:latin typeface="Calibri"/>
+                <a:ea typeface="DejaVu Sans"/>
               </a:rPr>
               <a:t>Member</a:t>
             </a:r>
@@ -2200,6 +1763,7 @@
                   <a:srgbClr val="ffffff"/>
                 </a:solidFill>
                 <a:latin typeface="Calibri"/>
+                <a:ea typeface="DejaVu Sans"/>
               </a:rPr>
               <a:t>Execution</a:t>
             </a:r>
@@ -2229,6 +1793,7 @@
                   <a:srgbClr val="ffffff"/>
                 </a:solidFill>
                 <a:latin typeface="Calibri"/>
+                <a:ea typeface="DejaVu Sans"/>
               </a:rPr>
               <a:t>action invocation</a:t>
             </a:r>
@@ -2239,6 +1804,7 @@
                   <a:srgbClr val="ffffff"/>
                 </a:solidFill>
                 <a:latin typeface="Calibri"/>
+                <a:ea typeface="DejaVu Sans"/>
               </a:rPr>
               <a:t>or</a:t>
             </a:r>
@@ -2249,6 +1815,7 @@
                   <a:srgbClr val="ffffff"/>
                 </a:solidFill>
                 <a:latin typeface="Calibri"/>
+                <a:ea typeface="DejaVu Sans"/>
               </a:rPr>
               <a:t>property edit</a:t>
             </a:r>
@@ -2260,14 +1827,14 @@
       </p:sp>
       <p:sp>
         <p:nvSpPr>
-          <p:cNvPr id="45" name="CustomShape 5"/>
+          <p:cNvPr id="40" name="CustomShape 5"/>
           <p:cNvSpPr/>
           <p:nvPr/>
         </p:nvSpPr>
         <p:spPr>
           <a:xfrm>
-            <a:off x="1944000" y="5221440"/>
-            <a:ext cx="936000" cy="522000"/>
+            <a:off x="4572000" y="5365440"/>
+            <a:ext cx="1115640" cy="574200"/>
           </a:xfrm>
           <a:prstGeom prst="rect">
             <a:avLst/>
@@ -2277,7 +1844,7 @@
           </a:solidFill>
           <a:ln>
             <a:solidFill>
-              <a:srgbClr val="377f92"/>
+              <a:srgbClr val="663399"/>
             </a:solidFill>
           </a:ln>
         </p:spPr>
@@ -2306,15 +1873,16 @@
               </a:lnSpc>
             </a:pPr>
             <a:r>
-              <a:rPr b="0" lang="en-GB" sz="1400" spc="-1" strike="noStrike">
+              <a:rPr b="0" lang="en-GB" sz="1200" spc="-1" strike="noStrike">
                 <a:solidFill>
                   <a:srgbClr val="ffffff"/>
                 </a:solidFill>
                 <a:latin typeface="Calibri"/>
-              </a:rPr>
-              <a:t>Domain</a:t>
-            </a:r>
-            <a:endParaRPr b="0" lang="en-US" sz="1400" spc="-1" strike="noStrike">
+                <a:ea typeface="DejaVu Sans"/>
+              </a:rPr>
+              <a:t>Abstract</a:t>
+            </a:r>
+            <a:endParaRPr b="0" lang="en-US" sz="1200" spc="-1" strike="noStrike">
               <a:latin typeface="Arial"/>
             </a:endParaRPr>
           </a:p>
@@ -2325,30 +1893,31 @@
               </a:lnSpc>
             </a:pPr>
             <a:r>
-              <a:rPr b="0" lang="en-GB" sz="1400" spc="-1" strike="noStrike">
+              <a:rPr b="0" lang="en-GB" sz="1200" spc="-1" strike="noStrike">
                 <a:solidFill>
                   <a:srgbClr val="ffffff"/>
                 </a:solidFill>
                 <a:latin typeface="Calibri"/>
-              </a:rPr>
-              <a:t>Event</a:t>
-            </a:r>
-            <a:endParaRPr b="0" lang="en-US" sz="1400" spc="-1" strike="noStrike">
-              <a:latin typeface="Arial"/>
-            </a:endParaRPr>
-          </a:p>
-        </p:txBody>
-      </p:sp>
-      <p:sp>
-        <p:nvSpPr>
-          <p:cNvPr id="46" name="CustomShape 6"/>
+                <a:ea typeface="DejaVu Sans"/>
+              </a:rPr>
+              <a:t>LifecycleEvent</a:t>
+            </a:r>
+            <a:endParaRPr b="0" lang="en-US" sz="1200" spc="-1" strike="noStrike">
+              <a:latin typeface="Arial"/>
+            </a:endParaRPr>
+          </a:p>
+        </p:txBody>
+      </p:sp>
+      <p:sp>
+        <p:nvSpPr>
+          <p:cNvPr id="41" name="CustomShape 6"/>
           <p:cNvSpPr/>
           <p:nvPr/>
         </p:nvSpPr>
         <p:spPr>
           <a:xfrm>
-            <a:off x="3060000" y="3751920"/>
-            <a:ext cx="2880000" cy="837720"/>
+            <a:off x="2880000" y="3787920"/>
+            <a:ext cx="3059280" cy="837000"/>
           </a:xfrm>
           <a:prstGeom prst="rect">
             <a:avLst/>
@@ -2390,28 +1959,26 @@
                   <a:srgbClr val="663399"/>
                 </a:solidFill>
                 <a:latin typeface="Calibri"/>
+                <a:ea typeface="DejaVu Sans"/>
               </a:rPr>
               <a:t>EntityChangeTracker</a:t>
             </a:r>
             <a:endParaRPr b="0" lang="en-US" sz="1600" spc="-1" strike="noStrike">
-              <a:solidFill>
-                <a:srgbClr val="663399"/>
-              </a:solidFill>
-              <a:latin typeface="Arial"/>
-            </a:endParaRPr>
-          </a:p>
-        </p:txBody>
-      </p:sp>
-      <p:sp>
-        <p:nvSpPr>
-          <p:cNvPr id="47" name="CustomShape 7"/>
+              <a:latin typeface="Arial"/>
+            </a:endParaRPr>
+          </a:p>
+        </p:txBody>
+      </p:sp>
+      <p:sp>
+        <p:nvSpPr>
+          <p:cNvPr id="42" name="CustomShape 7"/>
           <p:cNvSpPr/>
           <p:nvPr/>
         </p:nvSpPr>
         <p:spPr>
           <a:xfrm>
-            <a:off x="3420000" y="4120920"/>
-            <a:ext cx="2067120" cy="379080"/>
+            <a:off x="3420000" y="4156920"/>
+            <a:ext cx="2066400" cy="378360"/>
           </a:xfrm>
           <a:prstGeom prst="rect">
             <a:avLst/>
@@ -2444,7 +2011,11 @@
             <a:noAutofit/>
           </a:bodyPr>
           <a:p>
-            <a:pPr algn="ctr"/>
+            <a:pPr algn="ctr">
+              <a:lnSpc>
+                <a:spcPct val="100000"/>
+              </a:lnSpc>
+            </a:pPr>
             <a:r>
               <a:rPr b="0" lang="en-GB" sz="1600" spc="-1" strike="noStrike">
                 <a:solidFill>
@@ -2463,14 +2034,14 @@
       </p:sp>
       <p:sp>
         <p:nvSpPr>
-          <p:cNvPr id="48" name="CustomShape 8"/>
+          <p:cNvPr id="43" name="CustomShape 8"/>
           <p:cNvSpPr/>
           <p:nvPr/>
         </p:nvSpPr>
         <p:spPr>
           <a:xfrm>
-            <a:off x="3060360" y="3438720"/>
-            <a:ext cx="2138040" cy="257760"/>
+            <a:off x="3017520" y="3438720"/>
+            <a:ext cx="2138040" cy="257040"/>
           </a:xfrm>
           <a:prstGeom prst="rect">
             <a:avLst/>
@@ -2502,28 +2073,26 @@
                   <a:srgbClr val="f79646"/>
                 </a:solidFill>
                 <a:latin typeface="Calibri"/>
+                <a:ea typeface="DejaVu Sans"/>
               </a:rPr>
               <a:t>enlist entities as they are modified</a:t>
             </a:r>
             <a:endParaRPr b="0" lang="en-US" sz="1100" spc="-1" strike="noStrike">
-              <a:solidFill>
-                <a:srgbClr val="f79646"/>
-              </a:solidFill>
-              <a:latin typeface="Arial"/>
-            </a:endParaRPr>
-          </a:p>
-        </p:txBody>
-      </p:sp>
-      <p:sp>
-        <p:nvSpPr>
-          <p:cNvPr id="49" name="CustomShape 9"/>
+              <a:latin typeface="Arial"/>
+            </a:endParaRPr>
+          </a:p>
+        </p:txBody>
+      </p:sp>
+      <p:sp>
+        <p:nvSpPr>
+          <p:cNvPr id="44" name="CustomShape 9"/>
           <p:cNvSpPr/>
           <p:nvPr/>
         </p:nvSpPr>
         <p:spPr>
           <a:xfrm>
             <a:off x="213840" y="144000"/>
-            <a:ext cx="5906160" cy="2520000"/>
+            <a:ext cx="5905440" cy="2519280"/>
           </a:xfrm>
           <a:prstGeom prst="rect">
             <a:avLst/>
@@ -2565,25 +2134,26 @@
                   <a:srgbClr val="1f497d"/>
                 </a:solidFill>
                 <a:latin typeface="Calibri"/>
+                <a:ea typeface="DejaVu Sans"/>
               </a:rPr>
               <a:t>InteractionContext</a:t>
             </a:r>
-            <a:endParaRPr b="0" i="1" lang="en-US" sz="1600" spc="-1" strike="noStrike">
-              <a:latin typeface="Arial"/>
-            </a:endParaRPr>
-          </a:p>
-        </p:txBody>
-      </p:sp>
-      <p:sp>
-        <p:nvSpPr>
-          <p:cNvPr id="50" name="CustomShape 10"/>
+            <a:endParaRPr b="0" lang="en-US" sz="1600" spc="-1" strike="noStrike">
+              <a:latin typeface="Arial"/>
+            </a:endParaRPr>
+          </a:p>
+        </p:txBody>
+      </p:sp>
+      <p:sp>
+        <p:nvSpPr>
+          <p:cNvPr id="45" name="CustomShape 10"/>
           <p:cNvSpPr/>
           <p:nvPr/>
         </p:nvSpPr>
         <p:spPr>
           <a:xfrm>
             <a:off x="6294600" y="833760"/>
-            <a:ext cx="1589400" cy="498240"/>
+            <a:ext cx="1588680" cy="497520"/>
           </a:xfrm>
           <a:prstGeom prst="rect">
             <a:avLst/>
@@ -2593,7 +2163,7 @@
           </a:solidFill>
           <a:ln>
             <a:solidFill>
-              <a:srgbClr val="c0504d"/>
+              <a:srgbClr val="336699"/>
             </a:solidFill>
           </a:ln>
         </p:spPr>
@@ -2622,9 +2192,10 @@
             <a:r>
               <a:rPr b="0" i="1" lang="en-GB" sz="1200" spc="-1" strike="noStrike">
                 <a:solidFill>
-                  <a:srgbClr val="c0504d"/>
-                </a:solidFill>
-                <a:latin typeface="Calibri"/>
+                  <a:srgbClr val="336699"/>
+                </a:solidFill>
+                <a:latin typeface="Calibri"/>
+                <a:ea typeface="DejaVu Sans"/>
               </a:rPr>
               <a:t>Execution</a:t>
             </a:r>
@@ -2641,9 +2212,10 @@
             <a:r>
               <a:rPr b="0" i="1" lang="en-GB" sz="1600" spc="-1" strike="noStrike">
                 <a:solidFill>
-                  <a:srgbClr val="c0504d"/>
-                </a:solidFill>
-                <a:latin typeface="Calibri"/>
+                  <a:srgbClr val="336699"/>
+                </a:solidFill>
+                <a:latin typeface="Calibri"/>
+                <a:ea typeface="DejaVu Sans"/>
               </a:rPr>
               <a:t>Publisher</a:t>
             </a:r>
@@ -2656,14 +2228,14 @@
       </p:sp>
       <p:sp>
         <p:nvSpPr>
-          <p:cNvPr id="51" name="CustomShape 11"/>
+          <p:cNvPr id="46" name="CustomShape 11"/>
           <p:cNvSpPr/>
           <p:nvPr/>
         </p:nvSpPr>
         <p:spPr>
           <a:xfrm>
             <a:off x="6330600" y="3205440"/>
-            <a:ext cx="1633680" cy="550440"/>
+            <a:ext cx="1632960" cy="549720"/>
           </a:xfrm>
           <a:prstGeom prst="rect">
             <a:avLst/>
@@ -2705,6 +2277,7 @@
                   <a:srgbClr val="8064a2"/>
                 </a:solidFill>
                 <a:latin typeface="Calibri"/>
+                <a:ea typeface="DejaVu Sans"/>
               </a:rPr>
               <a:t>EntityPropertyChange</a:t>
             </a:r>
@@ -2724,6 +2297,7 @@
                   <a:srgbClr val="8064a2"/>
                 </a:solidFill>
                 <a:latin typeface="Calibri"/>
+                <a:ea typeface="DejaVu Sans"/>
               </a:rPr>
               <a:t>Publisher</a:t>
             </a:r>
@@ -2735,14 +2309,14 @@
       </p:sp>
       <p:sp>
         <p:nvSpPr>
-          <p:cNvPr id="52" name="CustomShape 12"/>
+          <p:cNvPr id="47" name="CustomShape 12"/>
           <p:cNvSpPr/>
           <p:nvPr/>
         </p:nvSpPr>
         <p:spPr>
           <a:xfrm>
             <a:off x="6201000" y="233280"/>
-            <a:ext cx="1478160" cy="592560"/>
+            <a:ext cx="1477440" cy="591840"/>
           </a:xfrm>
           <a:prstGeom prst="rect">
             <a:avLst/>
@@ -2771,9 +2345,10 @@
             <a:r>
               <a:rPr b="0" lang="en-GB" sz="1100" spc="-1" strike="noStrike">
                 <a:solidFill>
-                  <a:srgbClr val="c0504d"/>
-                </a:solidFill>
-                <a:latin typeface="Calibri"/>
+                  <a:srgbClr val="336699"/>
+                </a:solidFill>
+                <a:latin typeface="Calibri"/>
+                <a:ea typeface="DejaVu Sans"/>
               </a:rPr>
               <a:t>publish each execution</a:t>
             </a:r>
@@ -2781,9 +2356,10 @@
             <a:r>
               <a:rPr b="0" lang="en-GB" sz="1100" spc="-1" strike="noStrike">
                 <a:solidFill>
-                  <a:srgbClr val="c0504d"/>
-                </a:solidFill>
-                <a:latin typeface="Calibri"/>
+                  <a:srgbClr val="336699"/>
+                </a:solidFill>
+                <a:latin typeface="Calibri"/>
+                <a:ea typeface="DejaVu Sans"/>
               </a:rPr>
               <a:t>immediately after it</a:t>
             </a:r>
@@ -2800,9 +2376,10 @@
             <a:r>
               <a:rPr b="0" lang="en-GB" sz="1100" spc="-1" strike="noStrike">
                 <a:solidFill>
-                  <a:srgbClr val="c0504d"/>
-                </a:solidFill>
-                <a:latin typeface="Calibri"/>
+                  <a:srgbClr val="336699"/>
+                </a:solidFill>
+                <a:latin typeface="Calibri"/>
+                <a:ea typeface="DejaVu Sans"/>
               </a:rPr>
               <a:t>completes</a:t>
             </a:r>
@@ -2814,14 +2391,14 @@
       </p:sp>
       <p:sp>
         <p:nvSpPr>
-          <p:cNvPr id="53" name="CustomShape 13"/>
+          <p:cNvPr id="48" name="CustomShape 13"/>
           <p:cNvSpPr/>
           <p:nvPr/>
         </p:nvSpPr>
         <p:spPr>
           <a:xfrm flipV="1">
-            <a:off x="5400000" y="3708000"/>
-            <a:ext cx="1080000" cy="432000"/>
+            <a:off x="5400000" y="3743280"/>
+            <a:ext cx="1079280" cy="431280"/>
           </a:xfrm>
           <a:prstGeom prst="curvedConnector2">
             <a:avLst/>
@@ -2850,14 +2427,14 @@
       </p:sp>
       <p:sp>
         <p:nvSpPr>
-          <p:cNvPr id="54" name="CustomShape 14"/>
+          <p:cNvPr id="49" name="CustomShape 14"/>
           <p:cNvSpPr/>
           <p:nvPr/>
         </p:nvSpPr>
         <p:spPr>
           <a:xfrm>
-            <a:off x="6237000" y="3910320"/>
-            <a:ext cx="1531440" cy="592560"/>
+            <a:off x="6237000" y="3946320"/>
+            <a:ext cx="1530720" cy="591840"/>
           </a:xfrm>
           <a:prstGeom prst="rect">
             <a:avLst/>
@@ -2889,6 +2466,7 @@
                   <a:srgbClr val="8064a2"/>
                 </a:solidFill>
                 <a:latin typeface="Calibri"/>
+                <a:ea typeface="DejaVu Sans"/>
               </a:rPr>
               <a:t>publish enlisted records</a:t>
             </a:r>
@@ -2899,6 +2477,7 @@
                   <a:srgbClr val="8064a2"/>
                 </a:solidFill>
                 <a:latin typeface="Calibri"/>
+                <a:ea typeface="DejaVu Sans"/>
               </a:rPr>
               <a:t>during pre-commit</a:t>
             </a:r>
@@ -2918,6 +2497,7 @@
                   <a:srgbClr val="8064a2"/>
                 </a:solidFill>
                 <a:latin typeface="Calibri"/>
+                <a:ea typeface="DejaVu Sans"/>
               </a:rPr>
               <a:t>of current transaction</a:t>
             </a:r>
@@ -2929,14 +2509,14 @@
       </p:sp>
       <p:sp>
         <p:nvSpPr>
-          <p:cNvPr id="55" name="CustomShape 15"/>
+          <p:cNvPr id="50" name="CustomShape 15"/>
           <p:cNvSpPr/>
           <p:nvPr/>
         </p:nvSpPr>
         <p:spPr>
           <a:xfrm>
-            <a:off x="546840" y="4412880"/>
-            <a:ext cx="1964880" cy="425160"/>
+            <a:off x="3024000" y="4697280"/>
+            <a:ext cx="2015640" cy="424440"/>
           </a:xfrm>
           <a:prstGeom prst="rect">
             <a:avLst/>
@@ -2965,31 +2545,49 @@
             <a:r>
               <a:rPr b="0" lang="en-GB" sz="1100" spc="-1" strike="noStrike">
                 <a:solidFill>
-                  <a:srgbClr val="f79646"/>
-                </a:solidFill>
-                <a:latin typeface="Calibri"/>
-              </a:rPr>
-              <a:t>broadcast pre- and post- events through EventBus</a:t>
+                  <a:srgbClr val="666699"/>
+                </a:solidFill>
+                <a:latin typeface="Calibri"/>
+                <a:ea typeface="DejaVu Sans"/>
+              </a:rPr>
+              <a:t>broadcast pre- and post-events</a:t>
             </a:r>
             <a:endParaRPr b="0" lang="en-US" sz="1100" spc="-1" strike="noStrike">
-              <a:solidFill>
-                <a:srgbClr val="f79646"/>
-              </a:solidFill>
-              <a:latin typeface="Arial"/>
-            </a:endParaRPr>
-          </a:p>
-        </p:txBody>
-      </p:sp>
-      <p:sp>
-        <p:nvSpPr>
-          <p:cNvPr id="56" name="CustomShape 16"/>
+              <a:latin typeface="Arial"/>
+            </a:endParaRPr>
+          </a:p>
+          <a:p>
+            <a:pPr algn="ctr">
+              <a:lnSpc>
+                <a:spcPct val="100000"/>
+              </a:lnSpc>
+            </a:pPr>
+            <a:r>
+              <a:rPr b="0" lang="en-GB" sz="1100" spc="-1" strike="noStrike">
+                <a:solidFill>
+                  <a:srgbClr val="666699"/>
+                </a:solidFill>
+                <a:latin typeface="Calibri"/>
+                <a:ea typeface="DejaVu Sans"/>
+              </a:rPr>
+              <a:t>through EventBus</a:t>
+            </a:r>
+            <a:endParaRPr b="0" lang="en-US" sz="1100" spc="-1" strike="noStrike">
+              <a:latin typeface="Arial"/>
+            </a:endParaRPr>
+          </a:p>
+        </p:txBody>
+      </p:sp>
+      <p:sp>
+        <p:nvSpPr>
+          <p:cNvPr id="51" name="CustomShape 16"/>
           <p:cNvSpPr/>
           <p:nvPr/>
         </p:nvSpPr>
         <p:spPr>
           <a:xfrm>
             <a:off x="6216120" y="1554840"/>
-            <a:ext cx="1339560" cy="425160"/>
+            <a:ext cx="1339560" cy="424440"/>
           </a:xfrm>
           <a:prstGeom prst="rect">
             <a:avLst/>
@@ -3021,13 +2619,11 @@
                   <a:srgbClr val="666666"/>
                 </a:solidFill>
                 <a:latin typeface="Calibri"/>
+                <a:ea typeface="DejaVu Sans"/>
               </a:rPr>
               <a:t>publish command</a:t>
             </a:r>
             <a:endParaRPr b="0" lang="en-US" sz="1100" spc="-1" strike="noStrike">
-              <a:solidFill>
-                <a:srgbClr val="666666"/>
-              </a:solidFill>
               <a:latin typeface="Arial"/>
             </a:endParaRPr>
           </a:p>
@@ -3043,28 +2639,26 @@
                   <a:srgbClr val="666666"/>
                 </a:solidFill>
                 <a:latin typeface="Calibri"/>
+                <a:ea typeface="DejaVu Sans"/>
               </a:rPr>
               <a:t>at end of interaction</a:t>
             </a:r>
             <a:endParaRPr b="0" lang="en-US" sz="1100" spc="-1" strike="noStrike">
-              <a:solidFill>
-                <a:srgbClr val="666666"/>
-              </a:solidFill>
-              <a:latin typeface="Arial"/>
-            </a:endParaRPr>
-          </a:p>
-        </p:txBody>
-      </p:sp>
-      <p:sp>
-        <p:nvSpPr>
-          <p:cNvPr id="57" name="CustomShape 17"/>
+              <a:latin typeface="Arial"/>
+            </a:endParaRPr>
+          </a:p>
+        </p:txBody>
+      </p:sp>
+      <p:sp>
+        <p:nvSpPr>
+          <p:cNvPr id="52" name="CustomShape 17"/>
           <p:cNvSpPr/>
           <p:nvPr/>
         </p:nvSpPr>
         <p:spPr>
           <a:xfrm>
             <a:off x="4802400" y="1387440"/>
-            <a:ext cx="1100160" cy="592560"/>
+            <a:ext cx="1100160" cy="591840"/>
           </a:xfrm>
           <a:prstGeom prst="rect">
             <a:avLst/>
@@ -3096,6 +2690,7 @@
                   <a:srgbClr val="003366"/>
                 </a:solidFill>
                 <a:latin typeface="Calibri"/>
+                <a:ea typeface="DejaVu Sans"/>
               </a:rPr>
               <a:t>Sub-executions</a:t>
             </a:r>
@@ -3106,6 +2701,7 @@
                   <a:srgbClr val="003366"/>
                 </a:solidFill>
                 <a:latin typeface="Calibri"/>
+                <a:ea typeface="DejaVu Sans"/>
               </a:rPr>
               <a:t>via</a:t>
             </a:r>
@@ -3116,28 +2712,26 @@
                   <a:srgbClr val="003366"/>
                 </a:solidFill>
                 <a:latin typeface="Calibri"/>
+                <a:ea typeface="DejaVu Sans"/>
               </a:rPr>
               <a:t>WrapperFactory</a:t>
             </a:r>
             <a:endParaRPr b="0" lang="en-US" sz="1100" spc="-1" strike="noStrike">
-              <a:solidFill>
-                <a:srgbClr val="003366"/>
-              </a:solidFill>
-              <a:latin typeface="Arial"/>
-            </a:endParaRPr>
-          </a:p>
-        </p:txBody>
-      </p:sp>
-      <p:sp>
-        <p:nvSpPr>
-          <p:cNvPr id="58" name="CustomShape 18"/>
+              <a:latin typeface="Arial"/>
+            </a:endParaRPr>
+          </a:p>
+        </p:txBody>
+      </p:sp>
+      <p:sp>
+        <p:nvSpPr>
+          <p:cNvPr id="53" name="CustomShape 18"/>
           <p:cNvSpPr/>
           <p:nvPr/>
         </p:nvSpPr>
         <p:spPr>
           <a:xfrm>
             <a:off x="7784640" y="3516840"/>
-            <a:ext cx="495360" cy="577440"/>
+            <a:ext cx="494640" cy="576720"/>
           </a:xfrm>
           <a:prstGeom prst="curvedConnector2">
             <a:avLst/>
@@ -3168,14 +2762,14 @@
       </p:sp>
       <p:sp>
         <p:nvSpPr>
-          <p:cNvPr id="59" name="CustomShape 19"/>
+          <p:cNvPr id="54" name="CustomShape 19"/>
           <p:cNvSpPr/>
           <p:nvPr/>
         </p:nvSpPr>
         <p:spPr>
           <a:xfrm flipV="1" rot="5400000">
             <a:off x="3855960" y="1347840"/>
-            <a:ext cx="1126800" cy="694080"/>
+            <a:ext cx="1126080" cy="693360"/>
           </a:xfrm>
           <a:prstGeom prst="curvedUpArrow">
             <a:avLst>
@@ -3208,14 +2802,14 @@
       </p:sp>
       <p:sp>
         <p:nvSpPr>
-          <p:cNvPr id="60" name="CustomShape 20"/>
+          <p:cNvPr id="55" name="CustomShape 20"/>
           <p:cNvSpPr/>
           <p:nvPr/>
         </p:nvSpPr>
         <p:spPr>
           <a:xfrm flipH="1">
-            <a:off x="1744200" y="1159200"/>
-            <a:ext cx="488880" cy="360"/>
+            <a:off x="1743480" y="1159200"/>
+            <a:ext cx="488160" cy="360"/>
           </a:xfrm>
           <a:custGeom>
             <a:avLst/>
@@ -3256,14 +2850,14 @@
       </p:sp>
       <p:sp>
         <p:nvSpPr>
-          <p:cNvPr id="61" name="CustomShape 21"/>
+          <p:cNvPr id="56" name="CustomShape 21"/>
           <p:cNvSpPr/>
           <p:nvPr/>
         </p:nvSpPr>
         <p:spPr>
           <a:xfrm>
             <a:off x="332640" y="3287160"/>
-            <a:ext cx="1048680" cy="720000"/>
+            <a:ext cx="1047960" cy="719280"/>
           </a:xfrm>
           <a:prstGeom prst="rect">
             <a:avLst/>
@@ -3284,6 +2878,13 @@
               <a:srgbClr val="000000"/>
             </a:solidFill>
           </a:ln>
+          <a:effectLst>
+            <a:outerShdw blurRad="40000" dir="5400000" dist="20160" rotWithShape="0">
+              <a:srgbClr val="000000">
+                <a:alpha val="38000"/>
+              </a:srgbClr>
+            </a:outerShdw>
+          </a:effectLst>
         </p:spPr>
         <p:style>
           <a:lnRef idx="1">
@@ -3313,6 +2914,7 @@
                   <a:srgbClr val="ffffff"/>
                 </a:solidFill>
                 <a:latin typeface="Calibri"/>
+                <a:ea typeface="DejaVu Sans"/>
               </a:rPr>
               <a:t>Child</a:t>
             </a:r>
@@ -3323,6 +2925,7 @@
                   <a:srgbClr val="ffffff"/>
                 </a:solidFill>
                 <a:latin typeface="Calibri"/>
+                <a:ea typeface="DejaVu Sans"/>
               </a:rPr>
               <a:t>Command</a:t>
             </a:r>
@@ -3334,14 +2937,14 @@
       </p:sp>
       <p:sp>
         <p:nvSpPr>
-          <p:cNvPr id="62" name="CustomShape 22"/>
+          <p:cNvPr id="57" name="CustomShape 22"/>
           <p:cNvSpPr/>
           <p:nvPr/>
         </p:nvSpPr>
         <p:spPr>
           <a:xfrm>
             <a:off x="4196520" y="972000"/>
-            <a:ext cx="2103480" cy="149760"/>
+            <a:ext cx="2102760" cy="149040"/>
           </a:xfrm>
           <a:prstGeom prst="curvedConnector2">
             <a:avLst/>
@@ -3349,9 +2952,7 @@
           <a:noFill/>
           <a:ln w="19050">
             <a:solidFill>
-              <a:schemeClr val="accent2">
-                <a:lumMod val="75000"/>
-              </a:schemeClr>
+              <a:srgbClr val="336699"/>
             </a:solidFill>
             <a:prstDash val="sysDash"/>
             <a:tailEnd len="med" type="triangle" w="med"/>
@@ -3372,14 +2973,14 @@
       </p:sp>
       <p:sp>
         <p:nvSpPr>
-          <p:cNvPr id="63" name="TextShape 23"/>
-          <p:cNvSpPr txBox="1"/>
+          <p:cNvPr id="58" name="CustomShape 23"/>
+          <p:cNvSpPr/>
           <p:nvPr/>
         </p:nvSpPr>
         <p:spPr>
           <a:xfrm>
             <a:off x="8640000" y="6012000"/>
-            <a:ext cx="180720" cy="346320"/>
+            <a:ext cx="180000" cy="345600"/>
           </a:xfrm>
           <a:prstGeom prst="rect">
             <a:avLst/>
@@ -3389,17 +2990,23 @@
             <a:noFill/>
           </a:ln>
         </p:spPr>
-      </p:sp>
-      <p:sp>
-        <p:nvSpPr>
-          <p:cNvPr id="64" name="CustomShape 24"/>
+        <p:style>
+          <a:lnRef idx="0"/>
+          <a:fillRef idx="0"/>
+          <a:effectRef idx="0"/>
+          <a:fontRef idx="minor"/>
+        </p:style>
+      </p:sp>
+      <p:sp>
+        <p:nvSpPr>
+          <p:cNvPr id="59" name="CustomShape 24"/>
           <p:cNvSpPr/>
           <p:nvPr/>
         </p:nvSpPr>
         <p:spPr>
           <a:xfrm>
             <a:off x="6300000" y="4705560"/>
-            <a:ext cx="1633680" cy="550440"/>
+            <a:ext cx="1632960" cy="549720"/>
           </a:xfrm>
           <a:prstGeom prst="rect">
             <a:avLst/>
@@ -3441,6 +3048,7 @@
                   <a:srgbClr val="8064a2"/>
                 </a:solidFill>
                 <a:latin typeface="Calibri"/>
+                <a:ea typeface="DejaVu Sans"/>
               </a:rPr>
               <a:t>EntityChanges</a:t>
             </a:r>
@@ -3460,6 +3068,7 @@
                   <a:srgbClr val="8064a2"/>
                 </a:solidFill>
                 <a:latin typeface="Calibri"/>
+                <a:ea typeface="DejaVu Sans"/>
               </a:rPr>
               <a:t>Publisher</a:t>
             </a:r>
@@ -3471,14 +3080,14 @@
       </p:sp>
       <p:sp>
         <p:nvSpPr>
-          <p:cNvPr id="65" name="CustomShape 25"/>
+          <p:cNvPr id="60" name="CustomShape 25"/>
           <p:cNvSpPr/>
           <p:nvPr/>
         </p:nvSpPr>
         <p:spPr>
           <a:xfrm>
             <a:off x="5487120" y="4320000"/>
-            <a:ext cx="920880" cy="385560"/>
+            <a:ext cx="920160" cy="384840"/>
           </a:xfrm>
           <a:prstGeom prst="curvedConnector2">
             <a:avLst/>
@@ -3507,14 +3116,14 @@
       </p:sp>
       <p:sp>
         <p:nvSpPr>
-          <p:cNvPr id="66" name="CustomShape 26"/>
+          <p:cNvPr id="61" name="CustomShape 26"/>
           <p:cNvSpPr/>
           <p:nvPr/>
         </p:nvSpPr>
         <p:spPr>
           <a:xfrm>
             <a:off x="6300000" y="1980000"/>
-            <a:ext cx="1575360" cy="498240"/>
+            <a:ext cx="1574640" cy="497520"/>
           </a:xfrm>
           <a:prstGeom prst="rect">
             <a:avLst/>
@@ -3556,6 +3165,7 @@
                   <a:srgbClr val="666666"/>
                 </a:solidFill>
                 <a:latin typeface="Calibri"/>
+                <a:ea typeface="DejaVu Sans"/>
               </a:rPr>
               <a:t>Command</a:t>
             </a:r>
@@ -3575,6 +3185,7 @@
                   <a:srgbClr val="666666"/>
                 </a:solidFill>
                 <a:latin typeface="Calibri"/>
+                <a:ea typeface="DejaVu Sans"/>
               </a:rPr>
               <a:t>Publisher</a:t>
             </a:r>
@@ -3587,14 +3198,14 @@
       </p:sp>
       <p:sp>
         <p:nvSpPr>
-          <p:cNvPr id="67" name="CustomShape 27"/>
+          <p:cNvPr id="62" name="CustomShape 27"/>
           <p:cNvSpPr/>
           <p:nvPr/>
         </p:nvSpPr>
         <p:spPr>
           <a:xfrm>
             <a:off x="8208000" y="4094280"/>
-            <a:ext cx="1633680" cy="550440"/>
+            <a:ext cx="1632960" cy="549720"/>
           </a:xfrm>
           <a:prstGeom prst="rect">
             <a:avLst/>
@@ -3618,7 +3229,7 @@
             </a:solidFill>
           </a:ln>
           <a:effectLst>
-            <a:outerShdw dist="101823" dir="2700000">
+            <a:outerShdw dir="2700000" dist="101823">
               <a:srgbClr val="808080"/>
             </a:outerShdw>
           </a:effectLst>
@@ -3651,6 +3262,7 @@
                   <a:srgbClr val="8064a2"/>
                 </a:solidFill>
                 <a:latin typeface="Calibri"/>
+                <a:ea typeface="DejaVu Sans"/>
               </a:rPr>
               <a:t>EntityPropertyChange</a:t>
             </a:r>
@@ -3670,6 +3282,7 @@
                   <a:srgbClr val="8064a2"/>
                 </a:solidFill>
                 <a:latin typeface="Calibri"/>
+                <a:ea typeface="DejaVu Sans"/>
               </a:rPr>
               <a:t>Subscriber - SPI</a:t>
             </a:r>
@@ -3681,14 +3294,14 @@
       </p:sp>
       <p:sp>
         <p:nvSpPr>
-          <p:cNvPr id="68" name="CustomShape 28"/>
+          <p:cNvPr id="63" name="CustomShape 28"/>
           <p:cNvSpPr/>
           <p:nvPr/>
         </p:nvSpPr>
         <p:spPr>
           <a:xfrm>
             <a:off x="8230320" y="5724000"/>
-            <a:ext cx="1633680" cy="550440"/>
+            <a:ext cx="1632960" cy="549720"/>
           </a:xfrm>
           <a:prstGeom prst="rect">
             <a:avLst/>
@@ -3712,7 +3325,7 @@
             </a:solidFill>
           </a:ln>
           <a:effectLst>
-            <a:outerShdw dist="101823" dir="2700000">
+            <a:outerShdw dir="2700000" dist="101823">
               <a:srgbClr val="808080"/>
             </a:outerShdw>
           </a:effectLst>
@@ -3745,6 +3358,7 @@
                   <a:srgbClr val="8064a2"/>
                 </a:solidFill>
                 <a:latin typeface="Calibri"/>
+                <a:ea typeface="DejaVu Sans"/>
               </a:rPr>
               <a:t>EntityChanges</a:t>
             </a:r>
@@ -3764,6 +3378,7 @@
                   <a:srgbClr val="8064a2"/>
                 </a:solidFill>
                 <a:latin typeface="Calibri"/>
+                <a:ea typeface="DejaVu Sans"/>
               </a:rPr>
               <a:t>Subscriber - SPI</a:t>
             </a:r>
@@ -3775,14 +3390,14 @@
       </p:sp>
       <p:sp>
         <p:nvSpPr>
-          <p:cNvPr id="69" name="CustomShape 29"/>
+          <p:cNvPr id="64" name="CustomShape 29"/>
           <p:cNvSpPr/>
           <p:nvPr/>
         </p:nvSpPr>
         <p:spPr>
           <a:xfrm>
             <a:off x="7790400" y="5152680"/>
-            <a:ext cx="489600" cy="571320"/>
+            <a:ext cx="488880" cy="570600"/>
           </a:xfrm>
           <a:prstGeom prst="curvedConnector2">
             <a:avLst/>
@@ -3813,14 +3428,14 @@
       </p:sp>
       <p:sp>
         <p:nvSpPr>
-          <p:cNvPr id="70" name="CustomShape 30"/>
+          <p:cNvPr id="65" name="CustomShape 30"/>
           <p:cNvSpPr/>
           <p:nvPr/>
         </p:nvSpPr>
         <p:spPr>
           <a:xfrm>
             <a:off x="8136000" y="1332000"/>
-            <a:ext cx="1589400" cy="498240"/>
+            <a:ext cx="1588680" cy="497520"/>
           </a:xfrm>
           <a:prstGeom prst="rect">
             <a:avLst/>
@@ -3830,11 +3445,11 @@
           </a:solidFill>
           <a:ln>
             <a:solidFill>
-              <a:srgbClr val="c0504d"/>
+              <a:srgbClr val="336699"/>
             </a:solidFill>
           </a:ln>
           <a:effectLst>
-            <a:outerShdw dist="101823" dir="2700000">
+            <a:outerShdw dir="2700000" dist="101823">
               <a:srgbClr val="808080"/>
             </a:outerShdw>
           </a:effectLst>
@@ -3864,9 +3479,10 @@
             <a:r>
               <a:rPr b="0" i="1" lang="en-GB" sz="1200" spc="-1" strike="noStrike">
                 <a:solidFill>
-                  <a:srgbClr val="c0504d"/>
-                </a:solidFill>
-                <a:latin typeface="Calibri"/>
+                  <a:srgbClr val="336699"/>
+                </a:solidFill>
+                <a:latin typeface="Calibri"/>
+                <a:ea typeface="DejaVu Sans"/>
               </a:rPr>
               <a:t>Execution</a:t>
             </a:r>
@@ -3883,9 +3499,10 @@
             <a:r>
               <a:rPr b="0" i="1" lang="en-GB" sz="1600" spc="-1" strike="noStrike">
                 <a:solidFill>
-                  <a:srgbClr val="c0504d"/>
-                </a:solidFill>
-                <a:latin typeface="Calibri"/>
+                  <a:srgbClr val="336699"/>
+                </a:solidFill>
+                <a:latin typeface="Calibri"/>
+                <a:ea typeface="DejaVu Sans"/>
               </a:rPr>
               <a:t>Subscriber - SPI</a:t>
             </a:r>
@@ -3898,14 +3515,14 @@
       </p:sp>
       <p:sp>
         <p:nvSpPr>
-          <p:cNvPr id="71" name="CustomShape 31"/>
+          <p:cNvPr id="66" name="CustomShape 31"/>
           <p:cNvSpPr/>
           <p:nvPr/>
         </p:nvSpPr>
         <p:spPr>
           <a:xfrm>
             <a:off x="7691760" y="2048760"/>
-            <a:ext cx="1200240" cy="429480"/>
+            <a:ext cx="1199520" cy="428760"/>
           </a:xfrm>
           <a:prstGeom prst="curvedConnector2">
             <a:avLst/>
@@ -3934,14 +3551,14 @@
       </p:sp>
       <p:sp>
         <p:nvSpPr>
-          <p:cNvPr id="72" name="CustomShape 32"/>
+          <p:cNvPr id="67" name="CustomShape 32"/>
           <p:cNvSpPr/>
           <p:nvPr/>
         </p:nvSpPr>
         <p:spPr>
           <a:xfrm>
             <a:off x="8138880" y="2464920"/>
-            <a:ext cx="1581120" cy="498240"/>
+            <a:ext cx="1580400" cy="497520"/>
           </a:xfrm>
           <a:prstGeom prst="rect">
             <a:avLst/>
@@ -3955,7 +3572,7 @@
             </a:solidFill>
           </a:ln>
           <a:effectLst>
-            <a:outerShdw dist="101823" dir="2700000">
+            <a:outerShdw dir="2700000" dist="101823">
               <a:srgbClr val="808080"/>
             </a:outerShdw>
           </a:effectLst>
@@ -3988,6 +3605,7 @@
                   <a:srgbClr val="666666"/>
                 </a:solidFill>
                 <a:latin typeface="Calibri"/>
+                <a:ea typeface="DejaVu Sans"/>
               </a:rPr>
               <a:t>Command</a:t>
             </a:r>
@@ -4007,6 +3625,7 @@
                   <a:srgbClr val="666666"/>
                 </a:solidFill>
                 <a:latin typeface="Calibri"/>
+                <a:ea typeface="DejaVu Sans"/>
               </a:rPr>
               <a:t>Subscriber - SPI</a:t>
             </a:r>
@@ -4019,14 +3638,14 @@
       </p:sp>
       <p:sp>
         <p:nvSpPr>
-          <p:cNvPr id="73" name="CustomShape 33"/>
+          <p:cNvPr id="68" name="CustomShape 33"/>
           <p:cNvSpPr/>
           <p:nvPr/>
         </p:nvSpPr>
         <p:spPr>
           <a:xfrm rot="16206000">
-            <a:off x="5777280" y="1960560"/>
-            <a:ext cx="144000" cy="899640"/>
+            <a:off x="5776560" y="1960560"/>
+            <a:ext cx="143280" cy="898920"/>
           </a:xfrm>
           <a:prstGeom prst="curvedConnector3">
             <a:avLst>
@@ -4057,14 +3676,14 @@
       </p:sp>
       <p:sp>
         <p:nvSpPr>
-          <p:cNvPr id="74" name="CustomShape 34"/>
+          <p:cNvPr id="69" name="CustomShape 34"/>
           <p:cNvSpPr/>
           <p:nvPr/>
         </p:nvSpPr>
         <p:spPr>
           <a:xfrm>
             <a:off x="8263800" y="3475440"/>
-            <a:ext cx="1668600" cy="591840"/>
+            <a:ext cx="1667880" cy="591840"/>
           </a:xfrm>
           <a:prstGeom prst="rect">
             <a:avLst/>
@@ -4096,6 +3715,7 @@
                   <a:srgbClr val="8064a2"/>
                 </a:solidFill>
                 <a:latin typeface="Calibri"/>
+                <a:ea typeface="DejaVu Sans"/>
               </a:rPr>
               <a:t>receive pre-post property </a:t>
             </a:r>
@@ -4115,6 +3735,7 @@
                   <a:srgbClr val="8064a2"/>
                 </a:solidFill>
                 <a:latin typeface="Calibri"/>
+                <a:ea typeface="DejaVu Sans"/>
               </a:rPr>
               <a:t>values for each </a:t>
             </a:r>
@@ -4134,6 +3755,7 @@
                   <a:srgbClr val="8064a2"/>
                 </a:solidFill>
                 <a:latin typeface="Calibri"/>
+                <a:ea typeface="DejaVu Sans"/>
               </a:rPr>
               <a:t>changed entity</a:t>
             </a:r>
@@ -4145,14 +3767,14 @@
       </p:sp>
       <p:sp>
         <p:nvSpPr>
-          <p:cNvPr id="75" name="CustomShape 35"/>
+          <p:cNvPr id="70" name="CustomShape 35"/>
           <p:cNvSpPr/>
           <p:nvPr/>
         </p:nvSpPr>
         <p:spPr>
           <a:xfrm>
             <a:off x="8203320" y="5023440"/>
-            <a:ext cx="1685160" cy="591840"/>
+            <a:ext cx="1684440" cy="591840"/>
           </a:xfrm>
           <a:prstGeom prst="rect">
             <a:avLst/>
@@ -4184,6 +3806,7 @@
                   <a:srgbClr val="8064a2"/>
                 </a:solidFill>
                 <a:latin typeface="Calibri"/>
+                <a:ea typeface="DejaVu Sans"/>
               </a:rPr>
               <a:t>receive the entire set of </a:t>
             </a:r>
@@ -4203,6 +3826,7 @@
                   <a:srgbClr val="8064a2"/>
                 </a:solidFill>
                 <a:latin typeface="Calibri"/>
+                <a:ea typeface="DejaVu Sans"/>
               </a:rPr>
               <a:t>changed entities, </a:t>
             </a:r>
@@ -4222,6 +3846,7 @@
                   <a:srgbClr val="8064a2"/>
                 </a:solidFill>
                 <a:latin typeface="Calibri"/>
+                <a:ea typeface="DejaVu Sans"/>
               </a:rPr>
               <a:t>serializable as ChangesDto</a:t>
             </a:r>
@@ -4233,14 +3858,14 @@
       </p:sp>
       <p:sp>
         <p:nvSpPr>
-          <p:cNvPr id="76" name="CustomShape 36"/>
+          <p:cNvPr id="71" name="CustomShape 36"/>
           <p:cNvSpPr/>
           <p:nvPr/>
         </p:nvSpPr>
         <p:spPr>
           <a:xfrm>
-            <a:off x="1800000" y="2880000"/>
-            <a:ext cx="4140000" cy="540000"/>
+            <a:off x="2880000" y="2880000"/>
+            <a:ext cx="3059280" cy="539280"/>
           </a:xfrm>
           <a:prstGeom prst="rect">
             <a:avLst/>
@@ -4282,6 +3907,7 @@
                   <a:srgbClr val="f79646"/>
                 </a:solidFill>
                 <a:latin typeface="Calibri"/>
+                <a:ea typeface="DejaVu Sans"/>
               </a:rPr>
               <a:t>Persistence Layer</a:t>
             </a:r>
@@ -4293,14 +3919,14 @@
       </p:sp>
       <p:sp>
         <p:nvSpPr>
-          <p:cNvPr id="77" name="CustomShape 37"/>
+          <p:cNvPr id="72" name="CustomShape 37"/>
           <p:cNvSpPr/>
           <p:nvPr/>
         </p:nvSpPr>
         <p:spPr>
           <a:xfrm flipH="1">
-            <a:off x="5150160" y="3420000"/>
-            <a:ext cx="360" cy="700920"/>
+            <a:off x="5112720" y="3420000"/>
+            <a:ext cx="360" cy="700200"/>
           </a:xfrm>
           <a:custGeom>
             <a:avLst/>
@@ -4342,14 +3968,14 @@
       </p:sp>
       <p:sp>
         <p:nvSpPr>
-          <p:cNvPr id="78" name="CustomShape 38"/>
+          <p:cNvPr id="73" name="CustomShape 38"/>
           <p:cNvSpPr/>
           <p:nvPr/>
         </p:nvSpPr>
         <p:spPr>
           <a:xfrm>
             <a:off x="180360" y="2678760"/>
-            <a:ext cx="1139760" cy="591840"/>
+            <a:ext cx="1139040" cy="591840"/>
           </a:xfrm>
           <a:prstGeom prst="rect">
             <a:avLst/>
@@ -4381,13 +4007,11 @@
                   <a:srgbClr val="666666"/>
                 </a:solidFill>
                 <a:latin typeface="Calibri"/>
+                <a:ea typeface="DejaVu Sans"/>
               </a:rPr>
               <a:t>async execuction</a:t>
             </a:r>
             <a:endParaRPr b="0" lang="en-US" sz="1100" spc="-1" strike="noStrike">
-              <a:solidFill>
-                <a:srgbClr val="666666"/>
-              </a:solidFill>
               <a:latin typeface="Arial"/>
             </a:endParaRPr>
           </a:p>
@@ -4403,13 +4027,11 @@
                   <a:srgbClr val="666666"/>
                 </a:solidFill>
                 <a:latin typeface="Calibri"/>
+                <a:ea typeface="DejaVu Sans"/>
               </a:rPr>
               <a:t>via</a:t>
             </a:r>
             <a:endParaRPr b="0" lang="en-US" sz="1100" spc="-1" strike="noStrike">
-              <a:solidFill>
-                <a:srgbClr val="666666"/>
-              </a:solidFill>
               <a:latin typeface="Arial"/>
             </a:endParaRPr>
           </a:p>
@@ -4425,28 +4047,26 @@
                   <a:srgbClr val="666666"/>
                 </a:solidFill>
                 <a:latin typeface="Calibri"/>
+                <a:ea typeface="DejaVu Sans"/>
               </a:rPr>
               <a:t>WrapperFactory</a:t>
             </a:r>
             <a:endParaRPr b="0" lang="en-US" sz="1100" spc="-1" strike="noStrike">
-              <a:solidFill>
-                <a:srgbClr val="666666"/>
-              </a:solidFill>
-              <a:latin typeface="Arial"/>
-            </a:endParaRPr>
-          </a:p>
-        </p:txBody>
-      </p:sp>
-      <p:sp>
-        <p:nvSpPr>
-          <p:cNvPr id="79" name="CustomShape 39"/>
+              <a:latin typeface="Arial"/>
+            </a:endParaRPr>
+          </a:p>
+        </p:txBody>
+      </p:sp>
+      <p:sp>
+        <p:nvSpPr>
+          <p:cNvPr id="74" name="CustomShape 39"/>
           <p:cNvSpPr/>
           <p:nvPr/>
         </p:nvSpPr>
         <p:spPr>
           <a:xfrm rot="5400000">
-            <a:off x="929520" y="2874240"/>
-            <a:ext cx="786600" cy="5760"/>
+            <a:off x="930240" y="2874240"/>
+            <a:ext cx="785880" cy="5040"/>
           </a:xfrm>
           <a:prstGeom prst="curvedConnector3">
             <a:avLst>
@@ -4477,14 +4097,14 @@
       </p:sp>
       <p:sp>
         <p:nvSpPr>
-          <p:cNvPr id="80" name="CustomShape 40"/>
+          <p:cNvPr id="75" name="CustomShape 40"/>
           <p:cNvSpPr/>
           <p:nvPr/>
         </p:nvSpPr>
         <p:spPr>
           <a:xfrm>
             <a:off x="3888000" y="2664000"/>
-            <a:ext cx="360" cy="216000"/>
+            <a:ext cx="360" cy="215280"/>
           </a:xfrm>
           <a:custGeom>
             <a:avLst/>
@@ -4525,14 +4145,14 @@
       </p:sp>
       <p:sp>
         <p:nvSpPr>
-          <p:cNvPr id="81" name="CustomShape 41"/>
+          <p:cNvPr id="76" name="CustomShape 41"/>
           <p:cNvSpPr/>
           <p:nvPr/>
         </p:nvSpPr>
         <p:spPr>
           <a:xfrm>
             <a:off x="7747560" y="895320"/>
-            <a:ext cx="1200240" cy="429480"/>
+            <a:ext cx="1199520" cy="428760"/>
           </a:xfrm>
           <a:prstGeom prst="curvedConnector2">
             <a:avLst/>
@@ -4540,9 +4160,7 @@
           <a:noFill/>
           <a:ln w="19050">
             <a:solidFill>
-              <a:schemeClr val="accent2">
-                <a:lumMod val="75000"/>
-              </a:schemeClr>
+              <a:srgbClr val="336699"/>
             </a:solidFill>
             <a:prstDash val="sysDash"/>
             <a:tailEnd len="med" type="triangle" w="med"/>
@@ -4563,35 +4181,22 @@
       </p:sp>
       <p:sp>
         <p:nvSpPr>
-          <p:cNvPr id="82" name="CustomShape 42"/>
+          <p:cNvPr id="77" name="CustomShape 42"/>
           <p:cNvSpPr/>
           <p:nvPr/>
         </p:nvSpPr>
         <p:spPr>
           <a:xfrm flipH="1">
-            <a:off x="2555640" y="3420000"/>
-            <a:ext cx="360" cy="1801440"/>
-          </a:xfrm>
-          <a:custGeom>
-            <a:avLst/>
-            <a:gdLst/>
-            <a:ahLst/>
-            <a:rect l="l" t="t" r="r" b="b"/>
-            <a:pathLst>
-              <a:path w="21600" h="21600">
-                <a:moveTo>
-                  <a:pt x="0" y="0"/>
-                </a:moveTo>
-                <a:lnTo>
-                  <a:pt x="21600" y="21600"/>
-                </a:lnTo>
-              </a:path>
-            </a:pathLst>
-          </a:custGeom>
+            <a:off x="4967280" y="4639680"/>
+            <a:ext cx="7200" cy="725400"/>
+          </a:xfrm>
+          <a:prstGeom prst="curvedConnector2">
+            <a:avLst/>
+          </a:prstGeom>
           <a:noFill/>
           <a:ln w="19050">
             <a:solidFill>
-              <a:srgbClr val="f79646"/>
+              <a:schemeClr val="accent4"/>
             </a:solidFill>
             <a:prstDash val="sysDash"/>
             <a:tailEnd len="med" type="triangle" w="med"/>
@@ -4612,35 +4217,248 @@
       </p:sp>
       <p:sp>
         <p:nvSpPr>
-          <p:cNvPr id="83" name="CustomShape 43"/>
+          <p:cNvPr id="78" name="CustomShape 43"/>
           <p:cNvSpPr/>
           <p:nvPr/>
         </p:nvSpPr>
         <p:spPr>
           <a:xfrm flipH="1">
-            <a:off x="2339640" y="3420000"/>
-            <a:ext cx="360" cy="1801440"/>
-          </a:xfrm>
-          <a:custGeom>
-            <a:avLst/>
-            <a:gdLst/>
-            <a:ahLst/>
-            <a:rect l="l" t="t" r="r" b="b"/>
-            <a:pathLst>
-              <a:path w="21600" h="21600">
-                <a:moveTo>
-                  <a:pt x="0" y="0"/>
-                </a:moveTo>
-                <a:lnTo>
-                  <a:pt x="21600" y="21600"/>
-                </a:lnTo>
-              </a:path>
-            </a:pathLst>
-          </a:custGeom>
+            <a:off x="5286960" y="4635000"/>
+            <a:ext cx="360" cy="730080"/>
+          </a:xfrm>
+          <a:prstGeom prst="curvedConnector2">
+            <a:avLst/>
+          </a:prstGeom>
           <a:noFill/>
           <a:ln w="19050">
             <a:solidFill>
-              <a:srgbClr val="f79646"/>
+              <a:schemeClr val="accent4"/>
+            </a:solidFill>
+            <a:prstDash val="sysDash"/>
+            <a:tailEnd len="med" type="triangle" w="med"/>
+          </a:ln>
+        </p:spPr>
+        <p:style>
+          <a:lnRef idx="1">
+            <a:schemeClr val="accent1"/>
+          </a:lnRef>
+          <a:fillRef idx="0">
+            <a:schemeClr val="accent1"/>
+          </a:fillRef>
+          <a:effectRef idx="0">
+            <a:schemeClr val="accent1"/>
+          </a:effectRef>
+          <a:fontRef idx="minor"/>
+        </p:style>
+      </p:sp>
+      <p:sp>
+        <p:nvSpPr>
+          <p:cNvPr id="79" name="CustomShape 44"/>
+          <p:cNvSpPr/>
+          <p:nvPr/>
+        </p:nvSpPr>
+        <p:spPr>
+          <a:xfrm flipH="1">
+            <a:off x="2374920" y="2520000"/>
+            <a:ext cx="360" cy="2840400"/>
+          </a:xfrm>
+          <a:prstGeom prst="curvedConnector2">
+            <a:avLst/>
+          </a:prstGeom>
+          <a:noFill/>
+          <a:ln w="19050">
+            <a:solidFill>
+              <a:srgbClr val="336699"/>
+            </a:solidFill>
+            <a:prstDash val="sysDash"/>
+            <a:tailEnd len="med" type="triangle" w="med"/>
+          </a:ln>
+        </p:spPr>
+        <p:style>
+          <a:lnRef idx="1">
+            <a:schemeClr val="accent1"/>
+          </a:lnRef>
+          <a:fillRef idx="0">
+            <a:schemeClr val="accent1"/>
+          </a:fillRef>
+          <a:effectRef idx="0">
+            <a:schemeClr val="accent1"/>
+          </a:effectRef>
+          <a:fontRef idx="minor"/>
+        </p:style>
+      </p:sp>
+      <p:sp>
+        <p:nvSpPr>
+          <p:cNvPr id="80" name="CustomShape 45"/>
+          <p:cNvSpPr/>
+          <p:nvPr/>
+        </p:nvSpPr>
+        <p:spPr>
+          <a:xfrm>
+            <a:off x="2052000" y="5365440"/>
+            <a:ext cx="935280" cy="574200"/>
+          </a:xfrm>
+          <a:prstGeom prst="rect">
+            <a:avLst/>
+          </a:prstGeom>
+          <a:solidFill>
+            <a:srgbClr val="669966"/>
+          </a:solidFill>
+          <a:ln>
+            <a:solidFill>
+              <a:srgbClr val="377f92"/>
+            </a:solidFill>
+          </a:ln>
+        </p:spPr>
+        <p:style>
+          <a:lnRef idx="2">
+            <a:schemeClr val="accent5">
+              <a:shade val="50000"/>
+            </a:schemeClr>
+          </a:lnRef>
+          <a:fillRef idx="1">
+            <a:schemeClr val="accent5"/>
+          </a:fillRef>
+          <a:effectRef idx="0">
+            <a:schemeClr val="accent5"/>
+          </a:effectRef>
+          <a:fontRef idx="minor"/>
+        </p:style>
+        <p:txBody>
+          <a:bodyPr lIns="90000" rIns="90000" tIns="45000" bIns="45000" anchor="ctr">
+            <a:noAutofit/>
+          </a:bodyPr>
+          <a:p>
+            <a:pPr algn="ctr">
+              <a:lnSpc>
+                <a:spcPct val="100000"/>
+              </a:lnSpc>
+            </a:pPr>
+            <a:r>
+              <a:rPr b="0" lang="en-GB" sz="1200" spc="-1" strike="noStrike">
+                <a:solidFill>
+                  <a:srgbClr val="ffffff"/>
+                </a:solidFill>
+                <a:latin typeface="Calibri"/>
+                <a:ea typeface="DejaVu Sans"/>
+              </a:rPr>
+              <a:t>Domain</a:t>
+            </a:r>
+            <a:endParaRPr b="0" lang="en-US" sz="1200" spc="-1" strike="noStrike">
+              <a:latin typeface="Arial"/>
+            </a:endParaRPr>
+          </a:p>
+          <a:p>
+            <a:pPr algn="ctr">
+              <a:lnSpc>
+                <a:spcPct val="100000"/>
+              </a:lnSpc>
+            </a:pPr>
+            <a:r>
+              <a:rPr b="0" lang="en-GB" sz="1200" spc="-1" strike="noStrike">
+                <a:solidFill>
+                  <a:srgbClr val="ffffff"/>
+                </a:solidFill>
+                <a:latin typeface="Calibri"/>
+                <a:ea typeface="DejaVu Sans"/>
+              </a:rPr>
+              <a:t>Event</a:t>
+            </a:r>
+            <a:endParaRPr b="0" lang="en-US" sz="1200" spc="-1" strike="noStrike">
+              <a:latin typeface="Arial"/>
+            </a:endParaRPr>
+          </a:p>
+        </p:txBody>
+      </p:sp>
+      <p:sp>
+        <p:nvSpPr>
+          <p:cNvPr id="81" name="CustomShape 46"/>
+          <p:cNvSpPr/>
+          <p:nvPr/>
+        </p:nvSpPr>
+        <p:spPr>
+          <a:xfrm>
+            <a:off x="684000" y="4716000"/>
+            <a:ext cx="1799640" cy="424440"/>
+          </a:xfrm>
+          <a:prstGeom prst="rect">
+            <a:avLst/>
+          </a:prstGeom>
+          <a:noFill/>
+          <a:ln w="0">
+            <a:noFill/>
+          </a:ln>
+        </p:spPr>
+        <p:style>
+          <a:lnRef idx="0"/>
+          <a:fillRef idx="0"/>
+          <a:effectRef idx="0"/>
+          <a:fontRef idx="minor"/>
+        </p:style>
+        <p:txBody>
+          <a:bodyPr lIns="90000" rIns="90000" tIns="45000" bIns="45000">
+            <a:spAutoFit/>
+          </a:bodyPr>
+          <a:p>
+            <a:pPr algn="ctr">
+              <a:lnSpc>
+                <a:spcPct val="100000"/>
+              </a:lnSpc>
+            </a:pPr>
+            <a:r>
+              <a:rPr b="0" lang="en-GB" sz="1100" spc="-1" strike="noStrike">
+                <a:solidFill>
+                  <a:srgbClr val="336699"/>
+                </a:solidFill>
+                <a:latin typeface="Calibri"/>
+                <a:ea typeface="DejaVu Sans"/>
+              </a:rPr>
+              <a:t>broadcast domain-events</a:t>
+            </a:r>
+            <a:endParaRPr b="0" lang="en-US" sz="1100" spc="-1" strike="noStrike">
+              <a:latin typeface="Arial"/>
+            </a:endParaRPr>
+          </a:p>
+          <a:p>
+            <a:pPr algn="ctr">
+              <a:lnSpc>
+                <a:spcPct val="100000"/>
+              </a:lnSpc>
+            </a:pPr>
+            <a:r>
+              <a:rPr b="0" lang="en-GB" sz="1100" spc="-1" strike="noStrike">
+                <a:solidFill>
+                  <a:srgbClr val="336699"/>
+                </a:solidFill>
+                <a:latin typeface="Calibri"/>
+                <a:ea typeface="DejaVu Sans"/>
+              </a:rPr>
+              <a:t>through EventBus</a:t>
+            </a:r>
+            <a:endParaRPr b="0" lang="en-US" sz="1100" spc="-1" strike="noStrike">
+              <a:latin typeface="Arial"/>
+            </a:endParaRPr>
+          </a:p>
+        </p:txBody>
+      </p:sp>
+      <p:sp>
+        <p:nvSpPr>
+          <p:cNvPr id="82" name="CustomShape 47"/>
+          <p:cNvSpPr/>
+          <p:nvPr/>
+        </p:nvSpPr>
+        <p:spPr>
+          <a:xfrm flipH="1">
+            <a:off x="2662920" y="2515320"/>
+            <a:ext cx="360" cy="2840400"/>
+          </a:xfrm>
+          <a:prstGeom prst="curvedConnector2">
+            <a:avLst/>
+          </a:prstGeom>
+          <a:noFill/>
+          <a:ln w="19050">
+            <a:solidFill>
+              <a:srgbClr val="336699"/>
             </a:solidFill>
             <a:prstDash val="sysDash"/>
             <a:tailEnd len="med" type="triangle" w="med"/>

</xml_diff>

<commit_message>
ISIS-2464: adoc: fix (and add additional) system overview links
commands-and-events diagram polishing
also more renaming
</commit_message>
<xml_diff>
--- a/api/applib/src/main/adoc/modules/applib-svc/images/reference-services/commands-and-events.pptx
+++ b/api/applib/src/main/adoc/modules/applib-svc/images/reference-services/commands-and-events.pptx
@@ -53,7 +53,7 @@
       </p:grpSpPr>
       <p:sp>
         <p:nvSpPr>
-          <p:cNvPr id="21" name="PlaceHolder 1"/>
+          <p:cNvPr id="23" name="PlaceHolder 1"/>
           <p:cNvSpPr>
             <a:spLocks noGrp="1"/>
           </p:cNvSpPr>
@@ -84,7 +84,7 @@
       </p:sp>
       <p:sp>
         <p:nvSpPr>
-          <p:cNvPr id="22" name="PlaceHolder 2"/>
+          <p:cNvPr id="24" name="PlaceHolder 2"/>
           <p:cNvSpPr>
             <a:spLocks noGrp="1"/>
           </p:cNvSpPr>
@@ -114,7 +114,7 @@
       </p:sp>
       <p:sp>
         <p:nvSpPr>
-          <p:cNvPr id="23" name="PlaceHolder 3"/>
+          <p:cNvPr id="25" name="PlaceHolder 3"/>
           <p:cNvSpPr>
             <a:spLocks noGrp="1"/>
           </p:cNvSpPr>
@@ -166,7 +166,7 @@
       </p:grpSpPr>
       <p:sp>
         <p:nvSpPr>
-          <p:cNvPr id="24" name="PlaceHolder 1"/>
+          <p:cNvPr id="26" name="PlaceHolder 1"/>
           <p:cNvSpPr>
             <a:spLocks noGrp="1"/>
           </p:cNvSpPr>
@@ -197,7 +197,7 @@
       </p:sp>
       <p:sp>
         <p:nvSpPr>
-          <p:cNvPr id="25" name="PlaceHolder 2"/>
+          <p:cNvPr id="27" name="PlaceHolder 2"/>
           <p:cNvSpPr>
             <a:spLocks noGrp="1"/>
           </p:cNvSpPr>
@@ -227,7 +227,7 @@
       </p:sp>
       <p:sp>
         <p:nvSpPr>
-          <p:cNvPr id="26" name="PlaceHolder 3"/>
+          <p:cNvPr id="28" name="PlaceHolder 3"/>
           <p:cNvSpPr>
             <a:spLocks noGrp="1"/>
           </p:cNvSpPr>
@@ -257,7 +257,7 @@
       </p:sp>
       <p:sp>
         <p:nvSpPr>
-          <p:cNvPr id="27" name="PlaceHolder 4"/>
+          <p:cNvPr id="29" name="PlaceHolder 4"/>
           <p:cNvSpPr>
             <a:spLocks noGrp="1"/>
           </p:cNvSpPr>
@@ -287,7 +287,7 @@
       </p:sp>
       <p:sp>
         <p:nvSpPr>
-          <p:cNvPr id="28" name="PlaceHolder 5"/>
+          <p:cNvPr id="30" name="PlaceHolder 5"/>
           <p:cNvSpPr>
             <a:spLocks noGrp="1"/>
           </p:cNvSpPr>
@@ -339,7 +339,7 @@
       </p:grpSpPr>
       <p:sp>
         <p:nvSpPr>
-          <p:cNvPr id="29" name="PlaceHolder 1"/>
+          <p:cNvPr id="31" name="PlaceHolder 1"/>
           <p:cNvSpPr>
             <a:spLocks noGrp="1"/>
           </p:cNvSpPr>
@@ -370,7 +370,7 @@
       </p:sp>
       <p:sp>
         <p:nvSpPr>
-          <p:cNvPr id="30" name="PlaceHolder 2"/>
+          <p:cNvPr id="32" name="PlaceHolder 2"/>
           <p:cNvSpPr>
             <a:spLocks noGrp="1"/>
           </p:cNvSpPr>
@@ -400,7 +400,7 @@
       </p:sp>
       <p:sp>
         <p:nvSpPr>
-          <p:cNvPr id="31" name="PlaceHolder 3"/>
+          <p:cNvPr id="33" name="PlaceHolder 3"/>
           <p:cNvSpPr>
             <a:spLocks noGrp="1"/>
           </p:cNvSpPr>
@@ -430,7 +430,7 @@
       </p:sp>
       <p:sp>
         <p:nvSpPr>
-          <p:cNvPr id="32" name="PlaceHolder 4"/>
+          <p:cNvPr id="34" name="PlaceHolder 4"/>
           <p:cNvSpPr>
             <a:spLocks noGrp="1"/>
           </p:cNvSpPr>
@@ -460,7 +460,7 @@
       </p:sp>
       <p:sp>
         <p:nvSpPr>
-          <p:cNvPr id="33" name="PlaceHolder 5"/>
+          <p:cNvPr id="35" name="PlaceHolder 5"/>
           <p:cNvSpPr>
             <a:spLocks noGrp="1"/>
           </p:cNvSpPr>
@@ -490,7 +490,7 @@
       </p:sp>
       <p:sp>
         <p:nvSpPr>
-          <p:cNvPr id="34" name="PlaceHolder 6"/>
+          <p:cNvPr id="36" name="PlaceHolder 6"/>
           <p:cNvSpPr>
             <a:spLocks noGrp="1"/>
           </p:cNvSpPr>
@@ -520,7 +520,7 @@
       </p:sp>
       <p:sp>
         <p:nvSpPr>
-          <p:cNvPr id="35" name="PlaceHolder 7"/>
+          <p:cNvPr id="37" name="PlaceHolder 7"/>
           <p:cNvSpPr>
             <a:spLocks noGrp="1"/>
           </p:cNvSpPr>
@@ -572,7 +572,7 @@
       </p:grpSpPr>
       <p:sp>
         <p:nvSpPr>
-          <p:cNvPr id="0" name="PlaceHolder 1"/>
+          <p:cNvPr id="2" name="PlaceHolder 1"/>
           <p:cNvSpPr>
             <a:spLocks noGrp="1"/>
           </p:cNvSpPr>
@@ -603,7 +603,7 @@
       </p:sp>
       <p:sp>
         <p:nvSpPr>
-          <p:cNvPr id="1" name="PlaceHolder 2"/>
+          <p:cNvPr id="3" name="PlaceHolder 2"/>
           <p:cNvSpPr>
             <a:spLocks noGrp="1"/>
           </p:cNvSpPr>
@@ -656,7 +656,7 @@
       </p:grpSpPr>
       <p:sp>
         <p:nvSpPr>
-          <p:cNvPr id="2" name="PlaceHolder 1"/>
+          <p:cNvPr id="4" name="PlaceHolder 1"/>
           <p:cNvSpPr>
             <a:spLocks noGrp="1"/>
           </p:cNvSpPr>
@@ -687,7 +687,7 @@
       </p:sp>
       <p:sp>
         <p:nvSpPr>
-          <p:cNvPr id="3" name="PlaceHolder 2"/>
+          <p:cNvPr id="5" name="PlaceHolder 2"/>
           <p:cNvSpPr>
             <a:spLocks noGrp="1"/>
           </p:cNvSpPr>
@@ -739,7 +739,7 @@
       </p:grpSpPr>
       <p:sp>
         <p:nvSpPr>
-          <p:cNvPr id="4" name="PlaceHolder 1"/>
+          <p:cNvPr id="6" name="PlaceHolder 1"/>
           <p:cNvSpPr>
             <a:spLocks noGrp="1"/>
           </p:cNvSpPr>
@@ -770,7 +770,7 @@
       </p:sp>
       <p:sp>
         <p:nvSpPr>
-          <p:cNvPr id="5" name="PlaceHolder 2"/>
+          <p:cNvPr id="7" name="PlaceHolder 2"/>
           <p:cNvSpPr>
             <a:spLocks noGrp="1"/>
           </p:cNvSpPr>
@@ -800,7 +800,7 @@
       </p:sp>
       <p:sp>
         <p:nvSpPr>
-          <p:cNvPr id="6" name="PlaceHolder 3"/>
+          <p:cNvPr id="8" name="PlaceHolder 3"/>
           <p:cNvSpPr>
             <a:spLocks noGrp="1"/>
           </p:cNvSpPr>
@@ -852,7 +852,7 @@
       </p:grpSpPr>
       <p:sp>
         <p:nvSpPr>
-          <p:cNvPr id="7" name="PlaceHolder 1"/>
+          <p:cNvPr id="9" name="PlaceHolder 1"/>
           <p:cNvSpPr>
             <a:spLocks noGrp="1"/>
           </p:cNvSpPr>
@@ -905,7 +905,7 @@
       </p:grpSpPr>
       <p:sp>
         <p:nvSpPr>
-          <p:cNvPr id="8" name="PlaceHolder 1"/>
+          <p:cNvPr id="10" name="PlaceHolder 1"/>
           <p:cNvSpPr>
             <a:spLocks noGrp="1"/>
           </p:cNvSpPr>
@@ -958,7 +958,7 @@
       </p:grpSpPr>
       <p:sp>
         <p:nvSpPr>
-          <p:cNvPr id="9" name="PlaceHolder 1"/>
+          <p:cNvPr id="11" name="PlaceHolder 1"/>
           <p:cNvSpPr>
             <a:spLocks noGrp="1"/>
           </p:cNvSpPr>
@@ -989,7 +989,7 @@
       </p:sp>
       <p:sp>
         <p:nvSpPr>
-          <p:cNvPr id="10" name="PlaceHolder 2"/>
+          <p:cNvPr id="12" name="PlaceHolder 2"/>
           <p:cNvSpPr>
             <a:spLocks noGrp="1"/>
           </p:cNvSpPr>
@@ -1019,7 +1019,7 @@
       </p:sp>
       <p:sp>
         <p:nvSpPr>
-          <p:cNvPr id="11" name="PlaceHolder 3"/>
+          <p:cNvPr id="13" name="PlaceHolder 3"/>
           <p:cNvSpPr>
             <a:spLocks noGrp="1"/>
           </p:cNvSpPr>
@@ -1049,7 +1049,7 @@
       </p:sp>
       <p:sp>
         <p:nvSpPr>
-          <p:cNvPr id="12" name="PlaceHolder 4"/>
+          <p:cNvPr id="14" name="PlaceHolder 4"/>
           <p:cNvSpPr>
             <a:spLocks noGrp="1"/>
           </p:cNvSpPr>
@@ -1101,7 +1101,7 @@
       </p:grpSpPr>
       <p:sp>
         <p:nvSpPr>
-          <p:cNvPr id="13" name="PlaceHolder 1"/>
+          <p:cNvPr id="15" name="PlaceHolder 1"/>
           <p:cNvSpPr>
             <a:spLocks noGrp="1"/>
           </p:cNvSpPr>
@@ -1132,7 +1132,7 @@
       </p:sp>
       <p:sp>
         <p:nvSpPr>
-          <p:cNvPr id="14" name="PlaceHolder 2"/>
+          <p:cNvPr id="16" name="PlaceHolder 2"/>
           <p:cNvSpPr>
             <a:spLocks noGrp="1"/>
           </p:cNvSpPr>
@@ -1162,7 +1162,7 @@
       </p:sp>
       <p:sp>
         <p:nvSpPr>
-          <p:cNvPr id="15" name="PlaceHolder 3"/>
+          <p:cNvPr id="17" name="PlaceHolder 3"/>
           <p:cNvSpPr>
             <a:spLocks noGrp="1"/>
           </p:cNvSpPr>
@@ -1192,7 +1192,7 @@
       </p:sp>
       <p:sp>
         <p:nvSpPr>
-          <p:cNvPr id="16" name="PlaceHolder 4"/>
+          <p:cNvPr id="18" name="PlaceHolder 4"/>
           <p:cNvSpPr>
             <a:spLocks noGrp="1"/>
           </p:cNvSpPr>
@@ -1244,7 +1244,7 @@
       </p:grpSpPr>
       <p:sp>
         <p:nvSpPr>
-          <p:cNvPr id="17" name="PlaceHolder 1"/>
+          <p:cNvPr id="19" name="PlaceHolder 1"/>
           <p:cNvSpPr>
             <a:spLocks noGrp="1"/>
           </p:cNvSpPr>
@@ -1275,7 +1275,7 @@
       </p:sp>
       <p:sp>
         <p:nvSpPr>
-          <p:cNvPr id="18" name="PlaceHolder 2"/>
+          <p:cNvPr id="20" name="PlaceHolder 2"/>
           <p:cNvSpPr>
             <a:spLocks noGrp="1"/>
           </p:cNvSpPr>
@@ -1305,7 +1305,7 @@
       </p:sp>
       <p:sp>
         <p:nvSpPr>
-          <p:cNvPr id="19" name="PlaceHolder 3"/>
+          <p:cNvPr id="21" name="PlaceHolder 3"/>
           <p:cNvSpPr>
             <a:spLocks noGrp="1"/>
           </p:cNvSpPr>
@@ -1335,7 +1335,7 @@
       </p:sp>
       <p:sp>
         <p:nvSpPr>
-          <p:cNvPr id="20" name="PlaceHolder 4"/>
+          <p:cNvPr id="22" name="PlaceHolder 4"/>
           <p:cNvSpPr>
             <a:spLocks noGrp="1"/>
           </p:cNvSpPr>
@@ -1392,6 +1392,222 @@
           <a:chExt cx="0" cy="0"/>
         </a:xfrm>
       </p:grpSpPr>
+      <p:sp>
+        <p:nvSpPr>
+          <p:cNvPr id="0" name="PlaceHolder 1"/>
+          <p:cNvSpPr>
+            <a:spLocks noGrp="1"/>
+          </p:cNvSpPr>
+          <p:nvPr>
+            <p:ph type="title"/>
+          </p:nvPr>
+        </p:nvSpPr>
+        <p:spPr>
+          <a:xfrm>
+            <a:off x="504000" y="258480"/>
+            <a:ext cx="9072000" cy="1081800"/>
+          </a:xfrm>
+          <a:prstGeom prst="rect">
+            <a:avLst/>
+          </a:prstGeom>
+        </p:spPr>
+        <p:txBody>
+          <a:bodyPr lIns="0" rIns="0" tIns="0" bIns="0" anchor="ctr">
+            <a:noAutofit/>
+          </a:bodyPr>
+          <a:p>
+            <a:pPr algn="ctr"/>
+            <a:r>
+              <a:rPr b="0" lang="en-US" sz="4400" spc="-1" strike="noStrike">
+                <a:latin typeface="Arial"/>
+              </a:rPr>
+              <a:t>Click to edit the title text format</a:t>
+            </a:r>
+            <a:endParaRPr b="0" lang="en-US" sz="4400" spc="-1" strike="noStrike">
+              <a:latin typeface="Arial"/>
+            </a:endParaRPr>
+          </a:p>
+        </p:txBody>
+      </p:sp>
+      <p:sp>
+        <p:nvSpPr>
+          <p:cNvPr id="1" name="PlaceHolder 2"/>
+          <p:cNvSpPr>
+            <a:spLocks noGrp="1"/>
+          </p:cNvSpPr>
+          <p:nvPr>
+            <p:ph type="body"/>
+          </p:nvPr>
+        </p:nvSpPr>
+        <p:spPr>
+          <a:xfrm>
+            <a:off x="504000" y="1516320"/>
+            <a:ext cx="9072000" cy="3758040"/>
+          </a:xfrm>
+          <a:prstGeom prst="rect">
+            <a:avLst/>
+          </a:prstGeom>
+        </p:spPr>
+        <p:txBody>
+          <a:bodyPr lIns="0" rIns="0" tIns="0" bIns="0">
+            <a:normAutofit/>
+          </a:bodyPr>
+          <a:p>
+            <a:pPr marL="432000" indent="-324000">
+              <a:spcBef>
+                <a:spcPts val="1417"/>
+              </a:spcBef>
+              <a:buClr>
+                <a:srgbClr val="000000"/>
+              </a:buClr>
+              <a:buSzPct val="45000"/>
+              <a:buFont typeface="Wingdings" charset="2"/>
+              <a:buChar char=""/>
+            </a:pPr>
+            <a:r>
+              <a:rPr b="0" lang="en-US" sz="3200" spc="-1" strike="noStrike">
+                <a:latin typeface="Arial"/>
+              </a:rPr>
+              <a:t>Click to edit the outline text format</a:t>
+            </a:r>
+            <a:endParaRPr b="0" lang="en-US" sz="3200" spc="-1" strike="noStrike">
+              <a:latin typeface="Arial"/>
+            </a:endParaRPr>
+          </a:p>
+          <a:p>
+            <a:pPr lvl="1" marL="864000" indent="-324000">
+              <a:spcBef>
+                <a:spcPts val="1134"/>
+              </a:spcBef>
+              <a:buClr>
+                <a:srgbClr val="000000"/>
+              </a:buClr>
+              <a:buSzPct val="75000"/>
+              <a:buFont typeface="Symbol" charset="2"/>
+              <a:buChar char=""/>
+            </a:pPr>
+            <a:r>
+              <a:rPr b="0" lang="en-US" sz="2800" spc="-1" strike="noStrike">
+                <a:latin typeface="Arial"/>
+              </a:rPr>
+              <a:t>Second Outline Level</a:t>
+            </a:r>
+            <a:endParaRPr b="0" lang="en-US" sz="2800" spc="-1" strike="noStrike">
+              <a:latin typeface="Arial"/>
+            </a:endParaRPr>
+          </a:p>
+          <a:p>
+            <a:pPr lvl="2" marL="1296000" indent="-288000">
+              <a:spcBef>
+                <a:spcPts val="850"/>
+              </a:spcBef>
+              <a:buClr>
+                <a:srgbClr val="000000"/>
+              </a:buClr>
+              <a:buSzPct val="45000"/>
+              <a:buFont typeface="Wingdings" charset="2"/>
+              <a:buChar char=""/>
+            </a:pPr>
+            <a:r>
+              <a:rPr b="0" lang="en-US" sz="2400" spc="-1" strike="noStrike">
+                <a:latin typeface="Arial"/>
+              </a:rPr>
+              <a:t>Third Outline Level</a:t>
+            </a:r>
+            <a:endParaRPr b="0" lang="en-US" sz="2400" spc="-1" strike="noStrike">
+              <a:latin typeface="Arial"/>
+            </a:endParaRPr>
+          </a:p>
+          <a:p>
+            <a:pPr lvl="3" marL="1728000" indent="-216000">
+              <a:spcBef>
+                <a:spcPts val="567"/>
+              </a:spcBef>
+              <a:buClr>
+                <a:srgbClr val="000000"/>
+              </a:buClr>
+              <a:buSzPct val="75000"/>
+              <a:buFont typeface="Symbol" charset="2"/>
+              <a:buChar char=""/>
+            </a:pPr>
+            <a:r>
+              <a:rPr b="0" lang="en-US" sz="2000" spc="-1" strike="noStrike">
+                <a:latin typeface="Arial"/>
+              </a:rPr>
+              <a:t>Fourth Outline Level</a:t>
+            </a:r>
+            <a:endParaRPr b="0" lang="en-US" sz="2000" spc="-1" strike="noStrike">
+              <a:latin typeface="Arial"/>
+            </a:endParaRPr>
+          </a:p>
+          <a:p>
+            <a:pPr lvl="4" marL="2160000" indent="-216000">
+              <a:spcBef>
+                <a:spcPts val="283"/>
+              </a:spcBef>
+              <a:buClr>
+                <a:srgbClr val="000000"/>
+              </a:buClr>
+              <a:buSzPct val="45000"/>
+              <a:buFont typeface="Wingdings" charset="2"/>
+              <a:buChar char=""/>
+            </a:pPr>
+            <a:r>
+              <a:rPr b="0" lang="en-US" sz="2000" spc="-1" strike="noStrike">
+                <a:latin typeface="Arial"/>
+              </a:rPr>
+              <a:t>Fifth Outline Level</a:t>
+            </a:r>
+            <a:endParaRPr b="0" lang="en-US" sz="2000" spc="-1" strike="noStrike">
+              <a:latin typeface="Arial"/>
+            </a:endParaRPr>
+          </a:p>
+          <a:p>
+            <a:pPr lvl="5" marL="2592000" indent="-216000">
+              <a:spcBef>
+                <a:spcPts val="283"/>
+              </a:spcBef>
+              <a:buClr>
+                <a:srgbClr val="000000"/>
+              </a:buClr>
+              <a:buSzPct val="45000"/>
+              <a:buFont typeface="Wingdings" charset="2"/>
+              <a:buChar char=""/>
+            </a:pPr>
+            <a:r>
+              <a:rPr b="0" lang="en-US" sz="2000" spc="-1" strike="noStrike">
+                <a:latin typeface="Arial"/>
+              </a:rPr>
+              <a:t>Sixth Outline Level</a:t>
+            </a:r>
+            <a:endParaRPr b="0" lang="en-US" sz="2000" spc="-1" strike="noStrike">
+              <a:latin typeface="Arial"/>
+            </a:endParaRPr>
+          </a:p>
+          <a:p>
+            <a:pPr lvl="6" marL="3024000" indent="-216000">
+              <a:spcBef>
+                <a:spcPts val="283"/>
+              </a:spcBef>
+              <a:buClr>
+                <a:srgbClr val="000000"/>
+              </a:buClr>
+              <a:buSzPct val="45000"/>
+              <a:buFont typeface="Wingdings" charset="2"/>
+              <a:buChar char=""/>
+            </a:pPr>
+            <a:r>
+              <a:rPr b="0" lang="en-US" sz="2000" spc="-1" strike="noStrike">
+                <a:latin typeface="Arial"/>
+              </a:rPr>
+              <a:t>Seventh Outline Level</a:t>
+            </a:r>
+            <a:endParaRPr b="0" lang="en-US" sz="2000" spc="-1" strike="noStrike">
+              <a:latin typeface="Arial"/>
+            </a:endParaRPr>
+          </a:p>
+        </p:txBody>
+      </p:sp>
     </p:spTree>
   </p:cSld>
   <p:clrMap bg1="lt1" bg2="lt2" tx1="dk1" tx2="dk2" accent1="accent1" accent2="accent2" accent3="accent3" accent4="accent4" accent5="accent5" accent6="accent6" hlink="hlink" folHlink="folHlink"/>
@@ -1431,14 +1647,14 @@
       </p:grpSpPr>
       <p:sp>
         <p:nvSpPr>
-          <p:cNvPr id="36" name="CustomShape 1"/>
+          <p:cNvPr id="38" name="CustomShape 1"/>
           <p:cNvSpPr/>
           <p:nvPr/>
         </p:nvSpPr>
         <p:spPr>
           <a:xfrm>
-            <a:off x="360000" y="5220000"/>
-            <a:ext cx="5579280" cy="807480"/>
+            <a:off x="360000" y="4932000"/>
+            <a:ext cx="5578200" cy="806400"/>
           </a:xfrm>
           <a:prstGeom prst="rect">
             <a:avLst/>
@@ -1519,14 +1735,14 @@
       </p:sp>
       <p:sp>
         <p:nvSpPr>
-          <p:cNvPr id="37" name="CustomShape 2"/>
+          <p:cNvPr id="39" name="CustomShape 2"/>
           <p:cNvSpPr/>
           <p:nvPr/>
         </p:nvSpPr>
         <p:spPr>
           <a:xfrm>
             <a:off x="2233440" y="504000"/>
-            <a:ext cx="3705840" cy="1979280"/>
+            <a:ext cx="3704760" cy="1765800"/>
           </a:xfrm>
           <a:prstGeom prst="rect">
             <a:avLst/>
@@ -1595,14 +1811,14 @@
       </p:sp>
       <p:sp>
         <p:nvSpPr>
-          <p:cNvPr id="38" name="CustomShape 3"/>
+          <p:cNvPr id="40" name="CustomShape 3"/>
           <p:cNvSpPr/>
           <p:nvPr/>
         </p:nvSpPr>
         <p:spPr>
           <a:xfrm>
             <a:off x="335520" y="504000"/>
-            <a:ext cx="1407960" cy="1979280"/>
+            <a:ext cx="1406880" cy="1779120"/>
           </a:xfrm>
           <a:prstGeom prst="rect">
             <a:avLst/>
@@ -1701,14 +1917,14 @@
       </p:sp>
       <p:sp>
         <p:nvSpPr>
-          <p:cNvPr id="39" name="CustomShape 4"/>
+          <p:cNvPr id="41" name="CustomShape 4"/>
           <p:cNvSpPr/>
           <p:nvPr/>
         </p:nvSpPr>
         <p:spPr>
           <a:xfrm>
             <a:off x="2520000" y="864000"/>
-            <a:ext cx="1495800" cy="1439280"/>
+            <a:ext cx="1494720" cy="1296000"/>
           </a:xfrm>
           <a:prstGeom prst="rect">
             <a:avLst/>
@@ -1827,14 +2043,14 @@
       </p:sp>
       <p:sp>
         <p:nvSpPr>
-          <p:cNvPr id="40" name="CustomShape 5"/>
+          <p:cNvPr id="42" name="CustomShape 5"/>
           <p:cNvSpPr/>
           <p:nvPr/>
         </p:nvSpPr>
         <p:spPr>
           <a:xfrm>
-            <a:off x="4572000" y="5365440"/>
-            <a:ext cx="1115640" cy="574200"/>
+            <a:off x="4572000" y="5077440"/>
+            <a:ext cx="1114560" cy="573120"/>
           </a:xfrm>
           <a:prstGeom prst="rect">
             <a:avLst/>
@@ -1910,14 +2126,14 @@
       </p:sp>
       <p:sp>
         <p:nvSpPr>
-          <p:cNvPr id="41" name="CustomShape 6"/>
+          <p:cNvPr id="43" name="CustomShape 6"/>
           <p:cNvSpPr/>
           <p:nvPr/>
         </p:nvSpPr>
         <p:spPr>
           <a:xfrm>
-            <a:off x="2880000" y="3787920"/>
-            <a:ext cx="3059280" cy="837000"/>
+            <a:off x="2880000" y="3535920"/>
+            <a:ext cx="3058200" cy="835920"/>
           </a:xfrm>
           <a:prstGeom prst="rect">
             <a:avLst/>
@@ -1971,14 +2187,14 @@
       </p:sp>
       <p:sp>
         <p:nvSpPr>
-          <p:cNvPr id="42" name="CustomShape 7"/>
+          <p:cNvPr id="44" name="CustomShape 7"/>
           <p:cNvSpPr/>
           <p:nvPr/>
         </p:nvSpPr>
         <p:spPr>
           <a:xfrm>
-            <a:off x="3420000" y="4156920"/>
-            <a:ext cx="2066400" cy="378360"/>
+            <a:off x="3420000" y="3904920"/>
+            <a:ext cx="2065320" cy="377280"/>
           </a:xfrm>
           <a:prstGeom prst="rect">
             <a:avLst/>
@@ -2034,14 +2250,14 @@
       </p:sp>
       <p:sp>
         <p:nvSpPr>
-          <p:cNvPr id="43" name="CustomShape 8"/>
+          <p:cNvPr id="45" name="CustomShape 8"/>
           <p:cNvSpPr/>
           <p:nvPr/>
         </p:nvSpPr>
         <p:spPr>
           <a:xfrm>
-            <a:off x="3017520" y="3438720"/>
-            <a:ext cx="2138040" cy="257040"/>
+            <a:off x="2996280" y="3186720"/>
+            <a:ext cx="2180520" cy="257760"/>
           </a:xfrm>
           <a:prstGeom prst="rect">
             <a:avLst/>
@@ -2075,7 +2291,27 @@
                 <a:latin typeface="Calibri"/>
                 <a:ea typeface="DejaVu Sans"/>
               </a:rPr>
-              <a:t>enlist entities as they are modified</a:t>
+              <a:t>enlist</a:t>
+            </a:r>
+            <a:r>
+              <a:rPr b="0" lang="en-GB" sz="1100" spc="-1" strike="noStrike" baseline="33000">
+                <a:solidFill>
+                  <a:srgbClr val="f79646"/>
+                </a:solidFill>
+                <a:latin typeface="Calibri"/>
+                <a:ea typeface="DejaVu Sans"/>
+              </a:rPr>
+              <a:t>3</a:t>
+            </a:r>
+            <a:r>
+              <a:rPr b="0" lang="en-GB" sz="1100" spc="-1" strike="noStrike">
+                <a:solidFill>
+                  <a:srgbClr val="f79646"/>
+                </a:solidFill>
+                <a:latin typeface="Calibri"/>
+                <a:ea typeface="DejaVu Sans"/>
+              </a:rPr>
+              <a:t> entities as they are modified</a:t>
             </a:r>
             <a:endParaRPr b="0" lang="en-US" sz="1100" spc="-1" strike="noStrike">
               <a:latin typeface="Arial"/>
@@ -2085,14 +2321,14 @@
       </p:sp>
       <p:sp>
         <p:nvSpPr>
-          <p:cNvPr id="44" name="CustomShape 9"/>
+          <p:cNvPr id="46" name="CustomShape 9"/>
           <p:cNvSpPr/>
           <p:nvPr/>
         </p:nvSpPr>
         <p:spPr>
           <a:xfrm>
             <a:off x="213840" y="144000"/>
-            <a:ext cx="5905440" cy="2519280"/>
+            <a:ext cx="5904360" cy="2280960"/>
           </a:xfrm>
           <a:prstGeom prst="rect">
             <a:avLst/>
@@ -2146,14 +2382,14 @@
       </p:sp>
       <p:sp>
         <p:nvSpPr>
-          <p:cNvPr id="45" name="CustomShape 10"/>
+          <p:cNvPr id="47" name="CustomShape 10"/>
           <p:cNvSpPr/>
           <p:nvPr/>
         </p:nvSpPr>
         <p:spPr>
           <a:xfrm>
             <a:off x="6294600" y="833760"/>
-            <a:ext cx="1588680" cy="497520"/>
+            <a:ext cx="1587600" cy="496440"/>
           </a:xfrm>
           <a:prstGeom prst="rect">
             <a:avLst/>
@@ -2228,14 +2464,14 @@
       </p:sp>
       <p:sp>
         <p:nvSpPr>
-          <p:cNvPr id="46" name="CustomShape 11"/>
+          <p:cNvPr id="48" name="CustomShape 11"/>
           <p:cNvSpPr/>
           <p:nvPr/>
         </p:nvSpPr>
         <p:spPr>
           <a:xfrm>
             <a:off x="6330600" y="3205440"/>
-            <a:ext cx="1632960" cy="549720"/>
+            <a:ext cx="1631880" cy="548640"/>
           </a:xfrm>
           <a:prstGeom prst="rect">
             <a:avLst/>
@@ -2309,14 +2545,14 @@
       </p:sp>
       <p:sp>
         <p:nvSpPr>
-          <p:cNvPr id="47" name="CustomShape 12"/>
+          <p:cNvPr id="49" name="CustomShape 12"/>
           <p:cNvSpPr/>
           <p:nvPr/>
         </p:nvSpPr>
         <p:spPr>
           <a:xfrm>
-            <a:off x="6201000" y="233280"/>
-            <a:ext cx="1477440" cy="591840"/>
+            <a:off x="6179760" y="233280"/>
+            <a:ext cx="1519200" cy="591840"/>
           </a:xfrm>
           <a:prstGeom prst="rect">
             <a:avLst/>
@@ -2350,7 +2586,27 @@
                 <a:latin typeface="Calibri"/>
                 <a:ea typeface="DejaVu Sans"/>
               </a:rPr>
-              <a:t>publish each execution</a:t>
+              <a:t>publish</a:t>
+            </a:r>
+            <a:r>
+              <a:rPr b="0" lang="en-GB" sz="1100" spc="-1" strike="noStrike" baseline="33000">
+                <a:solidFill>
+                  <a:srgbClr val="336699"/>
+                </a:solidFill>
+                <a:latin typeface="Calibri"/>
+                <a:ea typeface="DejaVu Sans"/>
+              </a:rPr>
+              <a:t>1</a:t>
+            </a:r>
+            <a:r>
+              <a:rPr b="0" lang="en-GB" sz="1100" spc="-1" strike="noStrike">
+                <a:solidFill>
+                  <a:srgbClr val="336699"/>
+                </a:solidFill>
+                <a:latin typeface="Calibri"/>
+                <a:ea typeface="DejaVu Sans"/>
+              </a:rPr>
+              <a:t> each execution</a:t>
             </a:r>
             <a:br/>
             <a:r>
@@ -2361,7 +2617,7 @@
                 <a:latin typeface="Calibri"/>
                 <a:ea typeface="DejaVu Sans"/>
               </a:rPr>
-              <a:t>immediately after it</a:t>
+              <a:t>immediately when it</a:t>
             </a:r>
             <a:endParaRPr b="0" lang="en-US" sz="1100" spc="-1" strike="noStrike">
               <a:latin typeface="Arial"/>
@@ -2391,14 +2647,14 @@
       </p:sp>
       <p:sp>
         <p:nvSpPr>
-          <p:cNvPr id="48" name="CustomShape 13"/>
+          <p:cNvPr id="50" name="CustomShape 13"/>
           <p:cNvSpPr/>
           <p:nvPr/>
         </p:nvSpPr>
         <p:spPr>
           <a:xfrm flipV="1">
-            <a:off x="5400000" y="3743280"/>
-            <a:ext cx="1079280" cy="431280"/>
+            <a:off x="5485320" y="3741840"/>
+            <a:ext cx="992880" cy="397800"/>
           </a:xfrm>
           <a:prstGeom prst="curvedConnector2">
             <a:avLst/>
@@ -2427,14 +2683,14 @@
       </p:sp>
       <p:sp>
         <p:nvSpPr>
-          <p:cNvPr id="49" name="CustomShape 14"/>
+          <p:cNvPr id="51" name="CustomShape 14"/>
           <p:cNvSpPr/>
           <p:nvPr/>
         </p:nvSpPr>
         <p:spPr>
           <a:xfrm>
             <a:off x="6237000" y="3946320"/>
-            <a:ext cx="1530720" cy="591840"/>
+            <a:ext cx="1530000" cy="591840"/>
           </a:xfrm>
           <a:prstGeom prst="rect">
             <a:avLst/>
@@ -2509,14 +2765,14 @@
       </p:sp>
       <p:sp>
         <p:nvSpPr>
-          <p:cNvPr id="50" name="CustomShape 15"/>
+          <p:cNvPr id="52" name="CustomShape 15"/>
           <p:cNvSpPr/>
           <p:nvPr/>
         </p:nvSpPr>
         <p:spPr>
           <a:xfrm>
-            <a:off x="3024000" y="4697280"/>
-            <a:ext cx="2015640" cy="424440"/>
+            <a:off x="3024000" y="4409280"/>
+            <a:ext cx="2014560" cy="424440"/>
           </a:xfrm>
           <a:prstGeom prst="rect">
             <a:avLst/>
@@ -2580,14 +2836,14 @@
       </p:sp>
       <p:sp>
         <p:nvSpPr>
-          <p:cNvPr id="51" name="CustomShape 16"/>
+          <p:cNvPr id="53" name="CustomShape 16"/>
           <p:cNvSpPr/>
           <p:nvPr/>
         </p:nvSpPr>
         <p:spPr>
           <a:xfrm>
-            <a:off x="6216120" y="1554840"/>
-            <a:ext cx="1339560" cy="424440"/>
+            <a:off x="6215400" y="1554840"/>
+            <a:ext cx="1340280" cy="424440"/>
           </a:xfrm>
           <a:prstGeom prst="rect">
             <a:avLst/>
@@ -2621,7 +2877,27 @@
                 <a:latin typeface="Calibri"/>
                 <a:ea typeface="DejaVu Sans"/>
               </a:rPr>
-              <a:t>publish command</a:t>
+              <a:t>publish</a:t>
+            </a:r>
+            <a:r>
+              <a:rPr b="0" lang="en-GB" sz="1100" spc="-1" strike="noStrike" baseline="33000">
+                <a:solidFill>
+                  <a:srgbClr val="666666"/>
+                </a:solidFill>
+                <a:latin typeface="Calibri"/>
+                <a:ea typeface="DejaVu Sans"/>
+              </a:rPr>
+              <a:t>2</a:t>
+            </a:r>
+            <a:r>
+              <a:rPr b="0" lang="en-GB" sz="1100" spc="-1" strike="noStrike">
+                <a:solidFill>
+                  <a:srgbClr val="666666"/>
+                </a:solidFill>
+                <a:latin typeface="Calibri"/>
+                <a:ea typeface="DejaVu Sans"/>
+              </a:rPr>
+              <a:t> command</a:t>
             </a:r>
             <a:endParaRPr b="0" lang="en-US" sz="1100" spc="-1" strike="noStrike">
               <a:latin typeface="Arial"/>
@@ -2651,7 +2927,7 @@
       </p:sp>
       <p:sp>
         <p:nvSpPr>
-          <p:cNvPr id="52" name="CustomShape 17"/>
+          <p:cNvPr id="54" name="CustomShape 17"/>
           <p:cNvSpPr/>
           <p:nvPr/>
         </p:nvSpPr>
@@ -2724,14 +3000,14 @@
       </p:sp>
       <p:sp>
         <p:nvSpPr>
-          <p:cNvPr id="53" name="CustomShape 18"/>
+          <p:cNvPr id="55" name="CustomShape 18"/>
           <p:cNvSpPr/>
           <p:nvPr/>
         </p:nvSpPr>
         <p:spPr>
           <a:xfrm>
             <a:off x="7784640" y="3516840"/>
-            <a:ext cx="494640" cy="576720"/>
+            <a:ext cx="493560" cy="575640"/>
           </a:xfrm>
           <a:prstGeom prst="curvedConnector2">
             <a:avLst/>
@@ -2762,14 +3038,14 @@
       </p:sp>
       <p:sp>
         <p:nvSpPr>
-          <p:cNvPr id="54" name="CustomShape 19"/>
+          <p:cNvPr id="56" name="CustomShape 19"/>
           <p:cNvSpPr/>
           <p:nvPr/>
         </p:nvSpPr>
         <p:spPr>
           <a:xfrm flipV="1" rot="5400000">
-            <a:off x="3855960" y="1347840"/>
-            <a:ext cx="1126080" cy="693360"/>
+            <a:off x="3855960" y="1239480"/>
+            <a:ext cx="1125000" cy="692280"/>
           </a:xfrm>
           <a:prstGeom prst="curvedUpArrow">
             <a:avLst>
@@ -2802,14 +3078,14 @@
       </p:sp>
       <p:sp>
         <p:nvSpPr>
-          <p:cNvPr id="55" name="CustomShape 20"/>
+          <p:cNvPr id="57" name="CustomShape 20"/>
           <p:cNvSpPr/>
           <p:nvPr/>
         </p:nvSpPr>
         <p:spPr>
           <a:xfrm flipH="1">
-            <a:off x="1743480" y="1159200"/>
-            <a:ext cx="488160" cy="360"/>
+            <a:off x="1742040" y="1159200"/>
+            <a:ext cx="487080" cy="360"/>
           </a:xfrm>
           <a:custGeom>
             <a:avLst/>
@@ -2850,14 +3126,14 @@
       </p:sp>
       <p:sp>
         <p:nvSpPr>
-          <p:cNvPr id="56" name="CustomShape 21"/>
+          <p:cNvPr id="58" name="CustomShape 21"/>
           <p:cNvSpPr/>
           <p:nvPr/>
         </p:nvSpPr>
         <p:spPr>
           <a:xfrm>
-            <a:off x="332640" y="3287160"/>
-            <a:ext cx="1047960" cy="719280"/>
+            <a:off x="332640" y="3107160"/>
+            <a:ext cx="1046880" cy="718200"/>
           </a:xfrm>
           <a:prstGeom prst="rect">
             <a:avLst/>
@@ -2937,14 +3213,14 @@
       </p:sp>
       <p:sp>
         <p:nvSpPr>
-          <p:cNvPr id="57" name="CustomShape 22"/>
+          <p:cNvPr id="59" name="CustomShape 22"/>
           <p:cNvSpPr/>
           <p:nvPr/>
         </p:nvSpPr>
         <p:spPr>
           <a:xfrm>
             <a:off x="4196520" y="972000"/>
-            <a:ext cx="2102760" cy="149040"/>
+            <a:ext cx="2101680" cy="147960"/>
           </a:xfrm>
           <a:prstGeom prst="curvedConnector2">
             <a:avLst/>
@@ -2973,14 +3249,14 @@
       </p:sp>
       <p:sp>
         <p:nvSpPr>
-          <p:cNvPr id="58" name="CustomShape 23"/>
+          <p:cNvPr id="60" name="CustomShape 23"/>
           <p:cNvSpPr/>
           <p:nvPr/>
         </p:nvSpPr>
         <p:spPr>
           <a:xfrm>
             <a:off x="8640000" y="6012000"/>
-            <a:ext cx="180000" cy="345600"/>
+            <a:ext cx="178920" cy="344520"/>
           </a:xfrm>
           <a:prstGeom prst="rect">
             <a:avLst/>
@@ -2999,14 +3275,14 @@
       </p:sp>
       <p:sp>
         <p:nvSpPr>
-          <p:cNvPr id="59" name="CustomShape 24"/>
+          <p:cNvPr id="61" name="CustomShape 24"/>
           <p:cNvSpPr/>
           <p:nvPr/>
         </p:nvSpPr>
         <p:spPr>
           <a:xfrm>
             <a:off x="6300000" y="4705560"/>
-            <a:ext cx="1632960" cy="549720"/>
+            <a:ext cx="1631880" cy="548640"/>
           </a:xfrm>
           <a:prstGeom prst="rect">
             <a:avLst/>
@@ -3080,14 +3356,14 @@
       </p:sp>
       <p:sp>
         <p:nvSpPr>
-          <p:cNvPr id="60" name="CustomShape 25"/>
+          <p:cNvPr id="62" name="CustomShape 25"/>
           <p:cNvSpPr/>
           <p:nvPr/>
         </p:nvSpPr>
         <p:spPr>
           <a:xfrm>
-            <a:off x="5487120" y="4320000"/>
-            <a:ext cx="920160" cy="384840"/>
+            <a:off x="5505480" y="4215240"/>
+            <a:ext cx="900720" cy="488520"/>
           </a:xfrm>
           <a:prstGeom prst="curvedConnector2">
             <a:avLst/>
@@ -3116,14 +3392,14 @@
       </p:sp>
       <p:sp>
         <p:nvSpPr>
-          <p:cNvPr id="61" name="CustomShape 26"/>
+          <p:cNvPr id="63" name="CustomShape 26"/>
           <p:cNvSpPr/>
           <p:nvPr/>
         </p:nvSpPr>
         <p:spPr>
           <a:xfrm>
             <a:off x="6300000" y="1980000"/>
-            <a:ext cx="1574640" cy="497520"/>
+            <a:ext cx="1573560" cy="496440"/>
           </a:xfrm>
           <a:prstGeom prst="rect">
             <a:avLst/>
@@ -3198,14 +3474,14 @@
       </p:sp>
       <p:sp>
         <p:nvSpPr>
-          <p:cNvPr id="62" name="CustomShape 27"/>
+          <p:cNvPr id="64" name="CustomShape 27"/>
           <p:cNvSpPr/>
           <p:nvPr/>
         </p:nvSpPr>
         <p:spPr>
           <a:xfrm>
             <a:off x="8208000" y="4094280"/>
-            <a:ext cx="1632960" cy="549720"/>
+            <a:ext cx="1631880" cy="548640"/>
           </a:xfrm>
           <a:prstGeom prst="rect">
             <a:avLst/>
@@ -3213,10 +3489,10 @@
           <a:gradFill rotWithShape="0">
             <a:gsLst>
               <a:gs pos="0">
-                <a:srgbClr val="ffffff"/>
+                <a:srgbClr val="eeeeee"/>
               </a:gs>
               <a:gs pos="100000">
-                <a:srgbClr val="ffffff">
+                <a:srgbClr val="eeeeee">
                   <a:alpha val="0"/>
                 </a:srgbClr>
               </a:gs>
@@ -3294,14 +3570,14 @@
       </p:sp>
       <p:sp>
         <p:nvSpPr>
-          <p:cNvPr id="63" name="CustomShape 28"/>
+          <p:cNvPr id="65" name="CustomShape 28"/>
           <p:cNvSpPr/>
           <p:nvPr/>
         </p:nvSpPr>
         <p:spPr>
           <a:xfrm>
             <a:off x="8230320" y="5724000"/>
-            <a:ext cx="1632960" cy="549720"/>
+            <a:ext cx="1631880" cy="548640"/>
           </a:xfrm>
           <a:prstGeom prst="rect">
             <a:avLst/>
@@ -3309,10 +3585,10 @@
           <a:gradFill rotWithShape="0">
             <a:gsLst>
               <a:gs pos="0">
-                <a:srgbClr val="ffffff"/>
+                <a:srgbClr val="eeeeee"/>
               </a:gs>
               <a:gs pos="100000">
-                <a:srgbClr val="ffffff">
+                <a:srgbClr val="eeeeee">
                   <a:alpha val="0"/>
                 </a:srgbClr>
               </a:gs>
@@ -3390,14 +3666,14 @@
       </p:sp>
       <p:sp>
         <p:nvSpPr>
-          <p:cNvPr id="64" name="CustomShape 29"/>
+          <p:cNvPr id="66" name="CustomShape 29"/>
           <p:cNvSpPr/>
           <p:nvPr/>
         </p:nvSpPr>
         <p:spPr>
           <a:xfrm>
             <a:off x="7790400" y="5152680"/>
-            <a:ext cx="488880" cy="570600"/>
+            <a:ext cx="487800" cy="569520"/>
           </a:xfrm>
           <a:prstGeom prst="curvedConnector2">
             <a:avLst/>
@@ -3428,20 +3704,20 @@
       </p:sp>
       <p:sp>
         <p:nvSpPr>
-          <p:cNvPr id="65" name="CustomShape 30"/>
+          <p:cNvPr id="67" name="CustomShape 30"/>
           <p:cNvSpPr/>
           <p:nvPr/>
         </p:nvSpPr>
         <p:spPr>
           <a:xfrm>
             <a:off x="8136000" y="1332000"/>
-            <a:ext cx="1588680" cy="497520"/>
+            <a:ext cx="1587600" cy="496440"/>
           </a:xfrm>
           <a:prstGeom prst="rect">
             <a:avLst/>
           </a:prstGeom>
           <a:solidFill>
-            <a:srgbClr val="ffffff"/>
+            <a:srgbClr val="eeeeee"/>
           </a:solidFill>
           <a:ln>
             <a:solidFill>
@@ -3515,14 +3791,14 @@
       </p:sp>
       <p:sp>
         <p:nvSpPr>
-          <p:cNvPr id="66" name="CustomShape 31"/>
+          <p:cNvPr id="68" name="CustomShape 31"/>
           <p:cNvSpPr/>
           <p:nvPr/>
         </p:nvSpPr>
         <p:spPr>
           <a:xfrm>
             <a:off x="7691760" y="2048760"/>
-            <a:ext cx="1199520" cy="428760"/>
+            <a:ext cx="1198440" cy="427680"/>
           </a:xfrm>
           <a:prstGeom prst="curvedConnector2">
             <a:avLst/>
@@ -3551,20 +3827,20 @@
       </p:sp>
       <p:sp>
         <p:nvSpPr>
-          <p:cNvPr id="67" name="CustomShape 32"/>
+          <p:cNvPr id="69" name="CustomShape 32"/>
           <p:cNvSpPr/>
           <p:nvPr/>
         </p:nvSpPr>
         <p:spPr>
           <a:xfrm>
             <a:off x="8138880" y="2464920"/>
-            <a:ext cx="1580400" cy="497520"/>
+            <a:ext cx="1579320" cy="496440"/>
           </a:xfrm>
           <a:prstGeom prst="rect">
             <a:avLst/>
           </a:prstGeom>
           <a:solidFill>
-            <a:srgbClr val="ffffff"/>
+            <a:srgbClr val="eeeeee"/>
           </a:solidFill>
           <a:ln>
             <a:solidFill>
@@ -3638,14 +3914,14 @@
       </p:sp>
       <p:sp>
         <p:nvSpPr>
-          <p:cNvPr id="68" name="CustomShape 33"/>
+          <p:cNvPr id="70" name="CustomShape 33"/>
           <p:cNvSpPr/>
           <p:nvPr/>
         </p:nvSpPr>
         <p:spPr>
           <a:xfrm rot="16206000">
-            <a:off x="5776560" y="1960560"/>
-            <a:ext cx="143280" cy="898920"/>
+            <a:off x="5758920" y="1751760"/>
+            <a:ext cx="177840" cy="896400"/>
           </a:xfrm>
           <a:prstGeom prst="curvedConnector3">
             <a:avLst>
@@ -3676,14 +3952,14 @@
       </p:sp>
       <p:sp>
         <p:nvSpPr>
-          <p:cNvPr id="69" name="CustomShape 34"/>
+          <p:cNvPr id="71" name="CustomShape 34"/>
           <p:cNvSpPr/>
           <p:nvPr/>
         </p:nvSpPr>
         <p:spPr>
           <a:xfrm>
             <a:off x="8263800" y="3475440"/>
-            <a:ext cx="1667880" cy="591840"/>
+            <a:ext cx="1667160" cy="591840"/>
           </a:xfrm>
           <a:prstGeom prst="rect">
             <a:avLst/>
@@ -3767,14 +4043,14 @@
       </p:sp>
       <p:sp>
         <p:nvSpPr>
-          <p:cNvPr id="70" name="CustomShape 35"/>
+          <p:cNvPr id="72" name="CustomShape 35"/>
           <p:cNvSpPr/>
           <p:nvPr/>
         </p:nvSpPr>
         <p:spPr>
           <a:xfrm>
             <a:off x="8203320" y="5023440"/>
-            <a:ext cx="1684440" cy="591840"/>
+            <a:ext cx="1683720" cy="591840"/>
           </a:xfrm>
           <a:prstGeom prst="rect">
             <a:avLst/>
@@ -3858,14 +4134,14 @@
       </p:sp>
       <p:sp>
         <p:nvSpPr>
-          <p:cNvPr id="71" name="CustomShape 36"/>
+          <p:cNvPr id="73" name="CustomShape 36"/>
           <p:cNvSpPr/>
           <p:nvPr/>
         </p:nvSpPr>
         <p:spPr>
           <a:xfrm>
-            <a:off x="2880000" y="2880000"/>
-            <a:ext cx="3059280" cy="539280"/>
+            <a:off x="2880000" y="2628000"/>
+            <a:ext cx="3058200" cy="538200"/>
           </a:xfrm>
           <a:prstGeom prst="rect">
             <a:avLst/>
@@ -3919,14 +4195,14 @@
       </p:sp>
       <p:sp>
         <p:nvSpPr>
-          <p:cNvPr id="72" name="CustomShape 37"/>
+          <p:cNvPr id="74" name="CustomShape 37"/>
           <p:cNvSpPr/>
           <p:nvPr/>
         </p:nvSpPr>
         <p:spPr>
           <a:xfrm flipH="1">
-            <a:off x="5112720" y="3420000"/>
-            <a:ext cx="360" cy="700200"/>
+            <a:off x="5110560" y="3168000"/>
+            <a:ext cx="360" cy="699120"/>
           </a:xfrm>
           <a:custGeom>
             <a:avLst/>
@@ -3968,14 +4244,14 @@
       </p:sp>
       <p:sp>
         <p:nvSpPr>
-          <p:cNvPr id="73" name="CustomShape 38"/>
+          <p:cNvPr id="75" name="CustomShape 38"/>
           <p:cNvSpPr/>
           <p:nvPr/>
         </p:nvSpPr>
         <p:spPr>
           <a:xfrm>
-            <a:off x="180360" y="2678760"/>
-            <a:ext cx="1139040" cy="591840"/>
+            <a:off x="180360" y="2498760"/>
+            <a:ext cx="1138320" cy="591840"/>
           </a:xfrm>
           <a:prstGeom prst="rect">
             <a:avLst/>
@@ -4059,14 +4335,14 @@
       </p:sp>
       <p:sp>
         <p:nvSpPr>
-          <p:cNvPr id="74" name="CustomShape 39"/>
+          <p:cNvPr id="76" name="CustomShape 39"/>
           <p:cNvSpPr/>
           <p:nvPr/>
         </p:nvSpPr>
         <p:spPr>
           <a:xfrm rot="5400000">
-            <a:off x="930240" y="2874240"/>
-            <a:ext cx="785880" cy="5040"/>
+            <a:off x="931320" y="2694240"/>
+            <a:ext cx="784800" cy="3960"/>
           </a:xfrm>
           <a:prstGeom prst="curvedConnector3">
             <a:avLst>
@@ -4097,14 +4373,14 @@
       </p:sp>
       <p:sp>
         <p:nvSpPr>
-          <p:cNvPr id="75" name="CustomShape 40"/>
+          <p:cNvPr id="77" name="CustomShape 40"/>
           <p:cNvSpPr/>
           <p:nvPr/>
         </p:nvSpPr>
         <p:spPr>
           <a:xfrm>
-            <a:off x="3888000" y="2664000"/>
-            <a:ext cx="360" cy="215280"/>
+            <a:off x="3888000" y="2412000"/>
+            <a:ext cx="360" cy="214200"/>
           </a:xfrm>
           <a:custGeom>
             <a:avLst/>
@@ -4145,14 +4421,14 @@
       </p:sp>
       <p:sp>
         <p:nvSpPr>
-          <p:cNvPr id="76" name="CustomShape 41"/>
+          <p:cNvPr id="78" name="CustomShape 41"/>
           <p:cNvSpPr/>
           <p:nvPr/>
         </p:nvSpPr>
         <p:spPr>
           <a:xfrm>
             <a:off x="7747560" y="895320"/>
-            <a:ext cx="1199520" cy="428760"/>
+            <a:ext cx="1198440" cy="427680"/>
           </a:xfrm>
           <a:prstGeom prst="curvedConnector2">
             <a:avLst/>
@@ -4181,14 +4457,14 @@
       </p:sp>
       <p:sp>
         <p:nvSpPr>
-          <p:cNvPr id="77" name="CustomShape 42"/>
+          <p:cNvPr id="79" name="CustomShape 42"/>
           <p:cNvSpPr/>
           <p:nvPr/>
         </p:nvSpPr>
         <p:spPr>
-          <a:xfrm flipH="1">
-            <a:off x="4967280" y="4639680"/>
-            <a:ext cx="7200" cy="725400"/>
+          <a:xfrm>
+            <a:off x="4964760" y="4397760"/>
+            <a:ext cx="1080" cy="678240"/>
           </a:xfrm>
           <a:prstGeom prst="curvedConnector2">
             <a:avLst/>
@@ -4217,14 +4493,14 @@
       </p:sp>
       <p:sp>
         <p:nvSpPr>
-          <p:cNvPr id="78" name="CustomShape 43"/>
+          <p:cNvPr id="80" name="CustomShape 43"/>
           <p:cNvSpPr/>
           <p:nvPr/>
         </p:nvSpPr>
         <p:spPr>
           <a:xfrm flipH="1">
-            <a:off x="5286960" y="4635000"/>
-            <a:ext cx="360" cy="730080"/>
+            <a:off x="5285160" y="4397760"/>
+            <a:ext cx="4320" cy="678240"/>
           </a:xfrm>
           <a:prstGeom prst="curvedConnector2">
             <a:avLst/>
@@ -4253,14 +4529,14 @@
       </p:sp>
       <p:sp>
         <p:nvSpPr>
-          <p:cNvPr id="79" name="CustomShape 44"/>
+          <p:cNvPr id="81" name="CustomShape 44"/>
           <p:cNvSpPr/>
           <p:nvPr/>
         </p:nvSpPr>
         <p:spPr>
           <a:xfrm flipH="1">
-            <a:off x="2374920" y="2520000"/>
-            <a:ext cx="360" cy="2840400"/>
+            <a:off x="2373120" y="2296800"/>
+            <a:ext cx="11520" cy="2774520"/>
           </a:xfrm>
           <a:prstGeom prst="curvedConnector2">
             <a:avLst/>
@@ -4289,14 +4565,14 @@
       </p:sp>
       <p:sp>
         <p:nvSpPr>
-          <p:cNvPr id="80" name="CustomShape 45"/>
+          <p:cNvPr id="82" name="CustomShape 45"/>
           <p:cNvSpPr/>
           <p:nvPr/>
         </p:nvSpPr>
         <p:spPr>
           <a:xfrm>
-            <a:off x="2052000" y="5365440"/>
-            <a:ext cx="935280" cy="574200"/>
+            <a:off x="2052000" y="5077440"/>
+            <a:ext cx="934200" cy="573120"/>
           </a:xfrm>
           <a:prstGeom prst="rect">
             <a:avLst/>
@@ -4372,14 +4648,14 @@
       </p:sp>
       <p:sp>
         <p:nvSpPr>
-          <p:cNvPr id="81" name="CustomShape 46"/>
+          <p:cNvPr id="83" name="CustomShape 46"/>
           <p:cNvSpPr/>
           <p:nvPr/>
         </p:nvSpPr>
         <p:spPr>
           <a:xfrm>
-            <a:off x="684000" y="4716000"/>
-            <a:ext cx="1799640" cy="424440"/>
+            <a:off x="684000" y="4428000"/>
+            <a:ext cx="1798560" cy="424440"/>
           </a:xfrm>
           <a:prstGeom prst="rect">
             <a:avLst/>
@@ -4443,14 +4719,14 @@
       </p:sp>
       <p:sp>
         <p:nvSpPr>
-          <p:cNvPr id="82" name="CustomShape 47"/>
+          <p:cNvPr id="84" name="CustomShape 47"/>
           <p:cNvSpPr/>
           <p:nvPr/>
         </p:nvSpPr>
         <p:spPr>
           <a:xfrm flipH="1">
-            <a:off x="2662920" y="2515320"/>
-            <a:ext cx="360" cy="2840400"/>
+            <a:off x="2660760" y="2289960"/>
+            <a:ext cx="360" cy="2776680"/>
           </a:xfrm>
           <a:prstGeom prst="curvedConnector2">
             <a:avLst/>
@@ -4476,6 +4752,189 @@
           </a:effectRef>
           <a:fontRef idx="minor"/>
         </p:style>
+      </p:sp>
+      <p:sp>
+        <p:nvSpPr>
+          <p:cNvPr id="85" name="CustomShape 48"/>
+          <p:cNvSpPr/>
+          <p:nvPr/>
+        </p:nvSpPr>
+        <p:spPr>
+          <a:xfrm>
+            <a:off x="8019000" y="180000"/>
+            <a:ext cx="1340280" cy="424440"/>
+          </a:xfrm>
+          <a:prstGeom prst="rect">
+            <a:avLst/>
+          </a:prstGeom>
+          <a:noFill/>
+          <a:ln w="0">
+            <a:noFill/>
+          </a:ln>
+        </p:spPr>
+        <p:style>
+          <a:lnRef idx="0"/>
+          <a:fillRef idx="0"/>
+          <a:effectRef idx="0"/>
+          <a:fontRef idx="minor"/>
+        </p:style>
+        <p:txBody>
+          <a:bodyPr wrap="none" lIns="90000" rIns="90000" tIns="45000" bIns="45000">
+            <a:spAutoFit/>
+          </a:bodyPr>
+          <a:p>
+            <a:pPr>
+              <a:lnSpc>
+                <a:spcPct val="100000"/>
+              </a:lnSpc>
+            </a:pPr>
+            <a:r>
+              <a:rPr b="0" lang="en-GB" sz="1100" spc="-1" strike="noStrike">
+                <a:solidFill>
+                  <a:srgbClr val="666666"/>
+                </a:solidFill>
+                <a:latin typeface="Calibri"/>
+                <a:ea typeface="DejaVu Sans"/>
+              </a:rPr>
+              <a:t>publish command</a:t>
+            </a:r>
+            <a:endParaRPr b="0" lang="en-US" sz="1100" spc="-1" strike="noStrike">
+              <a:latin typeface="Arial"/>
+            </a:endParaRPr>
+          </a:p>
+          <a:p>
+            <a:pPr>
+              <a:lnSpc>
+                <a:spcPct val="100000"/>
+              </a:lnSpc>
+            </a:pPr>
+            <a:r>
+              <a:rPr b="0" lang="en-GB" sz="1100" spc="-1" strike="noStrike">
+                <a:solidFill>
+                  <a:srgbClr val="666666"/>
+                </a:solidFill>
+                <a:latin typeface="Calibri"/>
+                <a:ea typeface="DejaVu Sans"/>
+              </a:rPr>
+              <a:t>at end of interaction</a:t>
+            </a:r>
+            <a:endParaRPr b="0" lang="en-US" sz="1100" spc="-1" strike="noStrike">
+              <a:latin typeface="Arial"/>
+            </a:endParaRPr>
+          </a:p>
+        </p:txBody>
+      </p:sp>
+      <p:sp>
+        <p:nvSpPr>
+          <p:cNvPr id="86" name="TextShape 49"/>
+          <p:cNvSpPr txBox="1"/>
+          <p:nvPr/>
+        </p:nvSpPr>
+        <p:spPr>
+          <a:xfrm>
+            <a:off x="360000" y="5904000"/>
+            <a:ext cx="7200000" cy="479160"/>
+          </a:xfrm>
+          <a:prstGeom prst="rect">
+            <a:avLst/>
+          </a:prstGeom>
+          <a:noFill/>
+          <a:ln w="0">
+            <a:noFill/>
+          </a:ln>
+        </p:spPr>
+        <p:txBody>
+          <a:bodyPr lIns="90000" rIns="90000" tIns="45000" bIns="45000">
+            <a:noAutofit/>
+          </a:bodyPr>
+          <a:p>
+            <a:r>
+              <a:rPr b="0" lang="en-US" sz="900" spc="-1" strike="noStrike" baseline="33000">
+                <a:latin typeface="Courier New"/>
+              </a:rPr>
+              <a:t>1</a:t>
+            </a:r>
+            <a:r>
+              <a:rPr b="0" lang="en-US" sz="900" spc="-1" strike="noStrike">
+                <a:latin typeface="Courier New"/>
+              </a:rPr>
+              <a:t> @Action/@Property(commandPublishing=ENABLED/DISABLED)</a:t>
+            </a:r>
+            <a:r>
+              <a:rPr b="0" lang="en-US" sz="900" spc="-1" strike="noStrike">
+                <a:latin typeface="Consolas"/>
+              </a:rPr>
+              <a:t> </a:t>
+            </a:r>
+            <a:r>
+              <a:rPr b="0" lang="en-US" sz="900" spc="-1" strike="noStrike">
+                <a:latin typeface="Calibri Light"/>
+              </a:rPr>
+              <a:t>... affects Command publishing</a:t>
+            </a:r>
+            <a:endParaRPr b="0" lang="en-US" sz="900" spc="-1" strike="noStrike">
+              <a:latin typeface="Consolas"/>
+            </a:endParaRPr>
+          </a:p>
+          <a:p>
+            <a:r>
+              <a:rPr b="0" lang="en-US" sz="900" spc="-1" strike="noStrike" baseline="33000">
+                <a:latin typeface="Courier New"/>
+              </a:rPr>
+              <a:t>2</a:t>
+            </a:r>
+            <a:r>
+              <a:rPr b="0" lang="en-US" sz="900" spc="-1" strike="noStrike">
+                <a:latin typeface="Courier New"/>
+              </a:rPr>
+              <a:t> @Action/@Property(executionPublishing=ENABLED/DISABLED)</a:t>
+            </a:r>
+            <a:r>
+              <a:rPr b="0" lang="en-US" sz="900" spc="-1" strike="noStrike">
+                <a:latin typeface="Consolas"/>
+              </a:rPr>
+              <a:t> </a:t>
+            </a:r>
+            <a:r>
+              <a:rPr b="0" lang="en-US" sz="900" spc="-1" strike="noStrike">
+                <a:latin typeface="Calibri Light"/>
+              </a:rPr>
+              <a:t>... affects Execution publishing</a:t>
+            </a:r>
+            <a:endParaRPr b="0" lang="en-US" sz="900" spc="-1" strike="noStrike">
+              <a:latin typeface="Consolas"/>
+            </a:endParaRPr>
+          </a:p>
+          <a:p>
+            <a:r>
+              <a:rPr b="0" lang="en-US" sz="900" spc="-1" strike="noStrike" baseline="33000">
+                <a:latin typeface="Courier New"/>
+              </a:rPr>
+              <a:t>3</a:t>
+            </a:r>
+            <a:r>
+              <a:rPr b="0" lang="en-US" sz="900" spc="-1" strike="noStrike">
+                <a:latin typeface="Courier New"/>
+              </a:rPr>
+              <a:t> @DomainObject(entityChangePublishing=ENABLED/DISABLED)</a:t>
+            </a:r>
+            <a:r>
+              <a:rPr b="0" lang="en-US" sz="900" spc="-1" strike="noStrike">
+                <a:latin typeface="Consolas"/>
+              </a:rPr>
+              <a:t> </a:t>
+            </a:r>
+            <a:r>
+              <a:rPr b="0" lang="en-US" sz="900" spc="-1" strike="noStrike">
+                <a:latin typeface="Calibri Light"/>
+              </a:rPr>
+              <a:t>... affects publishing of entity changes</a:t>
+            </a:r>
+            <a:endParaRPr b="0" lang="en-US" sz="900" spc="-1" strike="noStrike">
+              <a:latin typeface="Consolas"/>
+            </a:endParaRPr>
+          </a:p>
+        </p:txBody>
       </p:sp>
     </p:spTree>
   </p:cSld>

</xml_diff>